<commit_message>
Completed the learning goals for the course.
</commit_message>
<xml_diff>
--- a/Learning_goals_overview.pptx
+++ b/Learning_goals_overview.pptx
@@ -8,22 +8,22 @@
     <p:sldId id="256" r:id="rId2"/>
     <p:sldId id="257" r:id="rId3"/>
     <p:sldId id="258" r:id="rId4"/>
-    <p:sldId id="259" r:id="rId5"/>
-    <p:sldId id="260" r:id="rId6"/>
-    <p:sldId id="261" r:id="rId7"/>
-    <p:sldId id="262" r:id="rId8"/>
-    <p:sldId id="263" r:id="rId9"/>
-    <p:sldId id="264" r:id="rId10"/>
-    <p:sldId id="265" r:id="rId11"/>
-    <p:sldId id="266" r:id="rId12"/>
-    <p:sldId id="267" r:id="rId13"/>
-    <p:sldId id="268" r:id="rId14"/>
-    <p:sldId id="269" r:id="rId15"/>
-    <p:sldId id="270" r:id="rId16"/>
-    <p:sldId id="271" r:id="rId17"/>
-    <p:sldId id="272" r:id="rId18"/>
-    <p:sldId id="273" r:id="rId19"/>
-    <p:sldId id="274" r:id="rId20"/>
+    <p:sldId id="275" r:id="rId5"/>
+    <p:sldId id="276" r:id="rId6"/>
+    <p:sldId id="259" r:id="rId7"/>
+    <p:sldId id="260" r:id="rId8"/>
+    <p:sldId id="261" r:id="rId9"/>
+    <p:sldId id="262" r:id="rId10"/>
+    <p:sldId id="263" r:id="rId11"/>
+    <p:sldId id="264" r:id="rId12"/>
+    <p:sldId id="265" r:id="rId13"/>
+    <p:sldId id="266" r:id="rId14"/>
+    <p:sldId id="267" r:id="rId15"/>
+    <p:sldId id="268" r:id="rId16"/>
+    <p:sldId id="269" r:id="rId17"/>
+    <p:sldId id="270" r:id="rId18"/>
+    <p:sldId id="271" r:id="rId19"/>
+    <p:sldId id="272" r:id="rId20"/>
   </p:sldIdLst>
   <p:sldSz cx="12192000" cy="6858000"/>
   <p:notesSz cx="6858000" cy="9144000"/>
@@ -2907,6 +2907,42 @@
           </a:p>
         </p:txBody>
       </p:sp>
+      <p:sp>
+        <p:nvSpPr>
+          <p:cNvPr id="4" name="TextBox 3">
+            <a:extLst>
+              <a:ext uri="{FF2B5EF4-FFF2-40B4-BE49-F238E27FC236}">
+                <a16:creationId xmlns:a16="http://schemas.microsoft.com/office/drawing/2014/main" id="{1DCB6AD4-B6A7-413F-9D7A-B844C4F8FDD9}"/>
+              </a:ext>
+            </a:extLst>
+          </p:cNvPr>
+          <p:cNvSpPr txBox="1"/>
+          <p:nvPr/>
+        </p:nvSpPr>
+        <p:spPr>
+          <a:xfrm>
+            <a:off x="748145" y="5868785"/>
+            <a:ext cx="3607724" cy="370706"/>
+          </a:xfrm>
+          <a:prstGeom prst="rect">
+            <a:avLst/>
+          </a:prstGeom>
+          <a:noFill/>
+        </p:spPr>
+        <p:txBody>
+          <a:bodyPr wrap="square" rtlCol="0">
+            <a:spAutoFit/>
+          </a:bodyPr>
+          <a:lstStyle/>
+          <a:p>
+            <a:r>
+              <a:rPr lang="de-CH" dirty="0"/>
+              <a:t>© U. Michelucci 2018</a:t>
+            </a:r>
+            <a:endParaRPr lang="LID4096" dirty="0"/>
+          </a:p>
+        </p:txBody>
+      </p:sp>
     </p:spTree>
     <p:extLst>
       <p:ext uri="{BB962C8B-B14F-4D97-AF65-F5344CB8AC3E}">
@@ -2974,7 +3010,7 @@
             </a:br>
             <a:r>
               <a:rPr lang="en-GB" sz="4400" b="1" dirty="0"/>
-              <a:t>Introduction to linear algebra and numpy/Python</a:t>
+              <a:t>Fully connected networks</a:t>
             </a:r>
             <a:endParaRPr lang="en-CH" sz="7200" dirty="0"/>
           </a:p>
@@ -3017,20 +3053,20 @@
       </p:sp>
       <p:sp>
         <p:nvSpPr>
-          <p:cNvPr id="4" name="Rectangle 3">
-            <a:extLst>
-              <a:ext uri="{FF2B5EF4-FFF2-40B4-BE49-F238E27FC236}">
-                <a16:creationId xmlns:a16="http://schemas.microsoft.com/office/drawing/2014/main" id="{92D50B9A-AB9F-4ED8-BC97-580BFE85826B}"/>
-              </a:ext>
-            </a:extLst>
-          </p:cNvPr>
-          <p:cNvSpPr/>
+          <p:cNvPr id="5" name="TextBox 4">
+            <a:extLst>
+              <a:ext uri="{FF2B5EF4-FFF2-40B4-BE49-F238E27FC236}">
+                <a16:creationId xmlns:a16="http://schemas.microsoft.com/office/drawing/2014/main" id="{455D8D42-BA29-4B4C-87F2-632E0DF27E90}"/>
+              </a:ext>
+            </a:extLst>
+          </p:cNvPr>
+          <p:cNvSpPr txBox="1"/>
           <p:nvPr/>
         </p:nvSpPr>
         <p:spPr>
-          <a:xfrm rot="1860278">
-            <a:off x="7074869" y="893210"/>
-            <a:ext cx="5091458" cy="2215991"/>
+          <a:xfrm>
+            <a:off x="88669" y="6035039"/>
+            <a:ext cx="3607724" cy="370706"/>
           </a:xfrm>
           <a:prstGeom prst="rect">
             <a:avLst/>
@@ -3038,42 +3074,23 @@
           <a:noFill/>
         </p:spPr>
         <p:txBody>
-          <a:bodyPr wrap="none" lIns="91440" tIns="45720" rIns="91440" bIns="45720">
+          <a:bodyPr wrap="square" rtlCol="0">
             <a:spAutoFit/>
           </a:bodyPr>
           <a:lstStyle/>
           <a:p>
-            <a:pPr algn="ctr"/>
-            <a:r>
-              <a:rPr lang="en-US" sz="13800" b="1" cap="none" spc="50" dirty="0">
-                <a:ln w="9525" cmpd="sng">
-                  <a:solidFill>
-                    <a:schemeClr val="accent1"/>
-                  </a:solidFill>
-                  <a:prstDash val="solid"/>
-                </a:ln>
-                <a:solidFill>
-                  <a:srgbClr val="70AD47">
-                    <a:tint val="1000"/>
-                  </a:srgbClr>
-                </a:solidFill>
-                <a:effectLst>
-                  <a:glow rad="38100">
-                    <a:schemeClr val="accent1">
-                      <a:alpha val="40000"/>
-                    </a:schemeClr>
-                  </a:glow>
-                </a:effectLst>
-              </a:rPr>
-              <a:t>DRAFT</a:t>
-            </a:r>
+            <a:r>
+              <a:rPr lang="de-CH" dirty="0"/>
+              <a:t>© U. Michelucci 2018</a:t>
+            </a:r>
+            <a:endParaRPr lang="LID4096" dirty="0"/>
           </a:p>
         </p:txBody>
       </p:sp>
     </p:spTree>
     <p:extLst>
       <p:ext uri="{BB962C8B-B14F-4D97-AF65-F5344CB8AC3E}">
-        <p14:creationId xmlns:p14="http://schemas.microsoft.com/office/powerpoint/2010/main" val="1571486009"/>
+        <p14:creationId xmlns:p14="http://schemas.microsoft.com/office/powerpoint/2010/main" val="504162336"/>
       </p:ext>
     </p:extLst>
   </p:cSld>
@@ -3147,13 +3164,13 @@
         </p:nvSpPr>
         <p:spPr>
           <a:xfrm>
-            <a:off x="838200" y="1690688"/>
-            <a:ext cx="10515600" cy="4486275"/>
+            <a:off x="838200" y="1760220"/>
+            <a:ext cx="10515600" cy="4416743"/>
           </a:xfrm>
         </p:spPr>
         <p:txBody>
           <a:bodyPr>
-            <a:normAutofit lnSpcReduction="10000"/>
+            <a:normAutofit/>
           </a:bodyPr>
           <a:lstStyle/>
           <a:p>
@@ -3162,46 +3179,14 @@
               <a:buChar char="q"/>
             </a:pPr>
             <a:r>
-              <a:rPr lang="de-CH" dirty="0"/>
-              <a:t> The </a:t>
-            </a:r>
-            <a:r>
-              <a:rPr lang="de-CH" dirty="0" err="1"/>
-              <a:t>student</a:t>
-            </a:r>
-            <a:r>
-              <a:rPr lang="de-CH" dirty="0"/>
-              <a:t> is </a:t>
-            </a:r>
-            <a:r>
-              <a:rPr lang="de-CH" dirty="0" err="1"/>
-              <a:t>able</a:t>
-            </a:r>
-            <a:r>
-              <a:rPr lang="de-CH" dirty="0"/>
-              <a:t> to </a:t>
-            </a:r>
-            <a:r>
-              <a:rPr lang="de-CH" dirty="0" err="1"/>
-              <a:t>explain</a:t>
-            </a:r>
-            <a:r>
-              <a:rPr lang="de-CH" dirty="0"/>
-              <a:t> what is a </a:t>
-            </a:r>
-            <a:r>
-              <a:rPr lang="de-CH" dirty="0" err="1"/>
-              <a:t>vector</a:t>
-            </a:r>
-            <a:r>
-              <a:rPr lang="de-CH" dirty="0"/>
-              <a:t> and a </a:t>
-            </a:r>
-            <a:r>
-              <a:rPr lang="de-CH" dirty="0" err="1"/>
-              <a:t>matrix</a:t>
-            </a:r>
-            <a:endParaRPr lang="de-CH" dirty="0"/>
+              <a:rPr lang="de-CH" sz="4000" dirty="0"/>
+              <a:t> Matrix </a:t>
+            </a:r>
+            <a:r>
+              <a:rPr lang="de-CH" sz="4000" dirty="0" err="1"/>
+              <a:t>notation</a:t>
+            </a:r>
+            <a:endParaRPr lang="de-CH" sz="4000" dirty="0"/>
           </a:p>
           <a:p>
             <a:pPr>
@@ -3209,78 +3194,9 @@
               <a:buChar char="q"/>
             </a:pPr>
             <a:r>
-              <a:rPr lang="de-CH" dirty="0"/>
-              <a:t> The </a:t>
-            </a:r>
-            <a:r>
-              <a:rPr lang="de-CH" dirty="0" err="1"/>
-              <a:t>student</a:t>
-            </a:r>
-            <a:r>
-              <a:rPr lang="de-CH" dirty="0"/>
-              <a:t> is </a:t>
-            </a:r>
-            <a:r>
-              <a:rPr lang="de-CH" dirty="0" err="1"/>
-              <a:t>able</a:t>
-            </a:r>
-            <a:r>
-              <a:rPr lang="de-CH" dirty="0"/>
-              <a:t> to </a:t>
-            </a:r>
-            <a:r>
-              <a:rPr lang="de-CH" dirty="0" err="1"/>
-              <a:t>understand</a:t>
-            </a:r>
-            <a:r>
-              <a:rPr lang="de-CH" dirty="0"/>
-              <a:t> </a:t>
-            </a:r>
-            <a:r>
-              <a:rPr lang="de-CH" dirty="0" err="1"/>
-              <a:t>the</a:t>
-            </a:r>
-            <a:r>
-              <a:rPr lang="de-CH" dirty="0"/>
-              <a:t> </a:t>
-            </a:r>
-            <a:r>
-              <a:rPr lang="de-CH" dirty="0" err="1"/>
-              <a:t>main</a:t>
-            </a:r>
-            <a:r>
-              <a:rPr lang="de-CH" dirty="0"/>
-              <a:t> </a:t>
-            </a:r>
-            <a:r>
-              <a:rPr lang="de-CH" dirty="0" err="1"/>
-              <a:t>operations</a:t>
-            </a:r>
-            <a:r>
-              <a:rPr lang="de-CH" dirty="0"/>
-              <a:t> you </a:t>
-            </a:r>
-            <a:r>
-              <a:rPr lang="de-CH" dirty="0" err="1"/>
-              <a:t>can</a:t>
-            </a:r>
-            <a:r>
-              <a:rPr lang="de-CH" dirty="0"/>
-              <a:t> perform on a </a:t>
-            </a:r>
-            <a:r>
-              <a:rPr lang="de-CH" dirty="0" err="1"/>
-              <a:t>vector</a:t>
-            </a:r>
-            <a:r>
-              <a:rPr lang="de-CH" dirty="0"/>
-              <a:t> and a </a:t>
-            </a:r>
-            <a:r>
-              <a:rPr lang="de-CH" dirty="0" err="1"/>
-              <a:t>matrix</a:t>
-            </a:r>
-            <a:endParaRPr lang="de-CH" dirty="0"/>
+              <a:rPr lang="de-CH" sz="4000" dirty="0"/>
+              <a:t> Hyperparameters</a:t>
+            </a:r>
           </a:p>
           <a:p>
             <a:pPr>
@@ -3288,65 +3204,30 @@
               <a:buChar char="q"/>
             </a:pPr>
             <a:r>
-              <a:rPr lang="de-CH" dirty="0"/>
-              <a:t> The </a:t>
-            </a:r>
-            <a:r>
-              <a:rPr lang="de-CH" dirty="0" err="1"/>
-              <a:t>student</a:t>
-            </a:r>
-            <a:r>
-              <a:rPr lang="de-CH" dirty="0"/>
-              <a:t> is </a:t>
-            </a:r>
-            <a:r>
-              <a:rPr lang="de-CH" dirty="0" err="1"/>
-              <a:t>able</a:t>
-            </a:r>
-            <a:r>
-              <a:rPr lang="de-CH" dirty="0"/>
-              <a:t> to </a:t>
-            </a:r>
-            <a:r>
-              <a:rPr lang="de-CH" dirty="0" err="1"/>
-              <a:t>implement</a:t>
-            </a:r>
-            <a:r>
-              <a:rPr lang="de-CH" dirty="0"/>
+              <a:rPr lang="de-CH" sz="4000" dirty="0"/>
               <a:t> </a:t>
             </a:r>
             <a:r>
-              <a:rPr lang="de-CH" dirty="0" err="1"/>
-              <a:t>the</a:t>
-            </a:r>
-            <a:r>
-              <a:rPr lang="de-CH" dirty="0"/>
+              <a:rPr lang="de-CH" sz="4000" dirty="0" err="1"/>
+              <a:t>Softmax</a:t>
+            </a:r>
+            <a:r>
+              <a:rPr lang="de-CH" sz="4000" dirty="0"/>
+              <a:t> function for </a:t>
+            </a:r>
+            <a:r>
+              <a:rPr lang="de-CH" sz="4000" dirty="0" err="1"/>
+              <a:t>multiclass</a:t>
+            </a:r>
+            <a:r>
+              <a:rPr lang="de-CH" sz="4000" dirty="0"/>
               <a:t> </a:t>
             </a:r>
             <a:r>
-              <a:rPr lang="de-CH" dirty="0" err="1"/>
-              <a:t>main</a:t>
-            </a:r>
-            <a:r>
-              <a:rPr lang="de-CH" dirty="0"/>
-              <a:t> </a:t>
-            </a:r>
-            <a:r>
-              <a:rPr lang="de-CH" dirty="0" err="1"/>
-              <a:t>operations</a:t>
-            </a:r>
-            <a:r>
-              <a:rPr lang="de-CH" dirty="0"/>
-              <a:t> in </a:t>
-            </a:r>
-            <a:r>
-              <a:rPr lang="de-CH" dirty="0" err="1"/>
-              <a:t>basic</a:t>
-            </a:r>
-            <a:r>
-              <a:rPr lang="de-CH" dirty="0"/>
-              <a:t> Python</a:t>
-            </a:r>
+              <a:rPr lang="de-CH" sz="4000" dirty="0" err="1"/>
+              <a:t>classification</a:t>
+            </a:r>
+            <a:endParaRPr lang="de-CH" sz="4000" dirty="0"/>
           </a:p>
           <a:p>
             <a:pPr>
@@ -3354,57 +3235,30 @@
               <a:buChar char="q"/>
             </a:pPr>
             <a:r>
-              <a:rPr lang="de-CH" dirty="0"/>
-              <a:t> The </a:t>
-            </a:r>
-            <a:r>
-              <a:rPr lang="de-CH" dirty="0" err="1"/>
-              <a:t>student</a:t>
-            </a:r>
-            <a:r>
-              <a:rPr lang="de-CH" dirty="0"/>
-              <a:t> is </a:t>
-            </a:r>
-            <a:r>
-              <a:rPr lang="de-CH" dirty="0" err="1"/>
-              <a:t>able</a:t>
-            </a:r>
-            <a:r>
-              <a:rPr lang="de-CH" dirty="0"/>
-              <a:t> to </a:t>
-            </a:r>
-            <a:r>
-              <a:rPr lang="de-CH" dirty="0" err="1"/>
-              <a:t>implement</a:t>
-            </a:r>
-            <a:r>
-              <a:rPr lang="de-CH" dirty="0"/>
+              <a:rPr lang="de-CH" sz="4000" dirty="0"/>
+              <a:t> Overfitting and </a:t>
+            </a:r>
+            <a:r>
+              <a:rPr lang="de-CH" sz="4000" dirty="0" err="1"/>
+              <a:t>basic</a:t>
+            </a:r>
+            <a:r>
+              <a:rPr lang="de-CH" sz="4000" dirty="0"/>
               <a:t> </a:t>
             </a:r>
             <a:r>
-              <a:rPr lang="de-CH" dirty="0" err="1"/>
-              <a:t>the</a:t>
-            </a:r>
-            <a:r>
-              <a:rPr lang="de-CH" dirty="0"/>
+              <a:rPr lang="de-CH" sz="4000" dirty="0" err="1"/>
+              <a:t>error</a:t>
+            </a:r>
+            <a:r>
+              <a:rPr lang="de-CH" sz="4000" dirty="0"/>
               <a:t> </a:t>
             </a:r>
             <a:r>
-              <a:rPr lang="de-CH" dirty="0" err="1"/>
-              <a:t>main</a:t>
-            </a:r>
-            <a:r>
-              <a:rPr lang="de-CH" dirty="0"/>
-              <a:t> </a:t>
-            </a:r>
-            <a:r>
-              <a:rPr lang="de-CH" dirty="0" err="1"/>
-              <a:t>operations</a:t>
-            </a:r>
-            <a:r>
-              <a:rPr lang="de-CH" dirty="0"/>
-              <a:t> in numpy</a:t>
-            </a:r>
+              <a:rPr lang="de-CH" sz="4000" dirty="0" err="1"/>
+              <a:t>analysis</a:t>
+            </a:r>
+            <a:endParaRPr lang="de-CH" sz="4000" dirty="0"/>
           </a:p>
           <a:p>
             <a:pPr>
@@ -3412,62 +3266,22 @@
               <a:buChar char="q"/>
             </a:pPr>
             <a:r>
-              <a:rPr lang="de-CH" dirty="0"/>
-              <a:t> The </a:t>
-            </a:r>
-            <a:r>
-              <a:rPr lang="de-CH" dirty="0" err="1"/>
-              <a:t>student</a:t>
-            </a:r>
-            <a:r>
-              <a:rPr lang="de-CH" dirty="0"/>
-              <a:t> is </a:t>
-            </a:r>
-            <a:r>
-              <a:rPr lang="de-CH" dirty="0" err="1"/>
-              <a:t>able</a:t>
-            </a:r>
-            <a:r>
-              <a:rPr lang="de-CH" dirty="0"/>
-              <a:t> to </a:t>
-            </a:r>
-            <a:r>
-              <a:rPr lang="de-CH" dirty="0" err="1"/>
-              <a:t>understand</a:t>
-            </a:r>
-            <a:r>
-              <a:rPr lang="de-CH" dirty="0"/>
+              <a:rPr lang="de-CH" sz="4000" dirty="0"/>
+              <a:t> One-</a:t>
+            </a:r>
+            <a:r>
+              <a:rPr lang="de-CH" sz="4000" dirty="0" err="1"/>
+              <a:t>hot</a:t>
+            </a:r>
+            <a:r>
+              <a:rPr lang="de-CH" sz="4000" dirty="0"/>
               <a:t> </a:t>
             </a:r>
             <a:r>
-              <a:rPr lang="de-CH" dirty="0" err="1"/>
-              <a:t>the</a:t>
-            </a:r>
-            <a:r>
-              <a:rPr lang="de-CH" dirty="0"/>
-              <a:t> </a:t>
-            </a:r>
-            <a:r>
-              <a:rPr lang="de-CH" dirty="0" err="1"/>
-              <a:t>difference</a:t>
-            </a:r>
-            <a:r>
-              <a:rPr lang="de-CH" dirty="0"/>
-              <a:t> in how numpy </a:t>
-            </a:r>
-            <a:r>
-              <a:rPr lang="de-CH" dirty="0" err="1"/>
-              <a:t>operates</a:t>
-            </a:r>
-            <a:r>
-              <a:rPr lang="de-CH" dirty="0"/>
-              <a:t> on </a:t>
-            </a:r>
-            <a:r>
-              <a:rPr lang="de-CH" dirty="0" err="1"/>
-              <a:t>arrays</a:t>
-            </a:r>
-            <a:endParaRPr lang="de-CH" dirty="0"/>
+              <a:rPr lang="de-CH" sz="4000" dirty="0" err="1"/>
+              <a:t>encoding</a:t>
+            </a:r>
+            <a:endParaRPr lang="de-CH" sz="4000" dirty="0"/>
           </a:p>
           <a:p>
             <a:pPr>
@@ -3475,111 +3289,39 @@
               <a:buChar char="q"/>
             </a:pPr>
             <a:r>
-              <a:rPr lang="de-CH" dirty="0"/>
-              <a:t> The </a:t>
-            </a:r>
-            <a:r>
-              <a:rPr lang="de-CH" dirty="0" err="1"/>
-              <a:t>student</a:t>
-            </a:r>
-            <a:r>
-              <a:rPr lang="de-CH" dirty="0"/>
-              <a:t> is </a:t>
-            </a:r>
-            <a:r>
-              <a:rPr lang="de-CH" dirty="0" err="1"/>
-              <a:t>able</a:t>
-            </a:r>
-            <a:r>
-              <a:rPr lang="de-CH" dirty="0"/>
-              <a:t> to </a:t>
-            </a:r>
-            <a:r>
-              <a:rPr lang="de-CH" dirty="0" err="1"/>
-              <a:t>use</a:t>
-            </a:r>
-            <a:r>
-              <a:rPr lang="de-CH" dirty="0"/>
-              <a:t> </a:t>
-            </a:r>
-            <a:r>
-              <a:rPr lang="de-CH" dirty="0" err="1"/>
-              <a:t>the</a:t>
-            </a:r>
-            <a:r>
-              <a:rPr lang="de-CH" dirty="0"/>
-              <a:t> </a:t>
-            </a:r>
-            <a:r>
-              <a:rPr lang="de-CH" dirty="0" err="1"/>
-              <a:t>concepts</a:t>
-            </a:r>
-            <a:r>
-              <a:rPr lang="de-CH" dirty="0"/>
-              <a:t> to </a:t>
-            </a:r>
-            <a:r>
-              <a:rPr lang="de-CH" dirty="0" err="1"/>
-              <a:t>implement</a:t>
-            </a:r>
-            <a:r>
-              <a:rPr lang="de-CH" dirty="0"/>
-              <a:t> a </a:t>
-            </a:r>
-            <a:r>
-              <a:rPr lang="de-CH" dirty="0" err="1"/>
-              <a:t>complete</a:t>
-            </a:r>
-            <a:r>
-              <a:rPr lang="de-CH" dirty="0"/>
-              <a:t> linear </a:t>
-            </a:r>
-            <a:r>
-              <a:rPr lang="de-CH" dirty="0" err="1"/>
-              <a:t>regression</a:t>
-            </a:r>
-            <a:r>
-              <a:rPr lang="de-CH" dirty="0"/>
-              <a:t> </a:t>
-            </a:r>
-            <a:r>
-              <a:rPr lang="de-CH" dirty="0" err="1"/>
-              <a:t>model</a:t>
-            </a:r>
-            <a:r>
-              <a:rPr lang="de-CH" dirty="0"/>
-              <a:t> from </a:t>
-            </a:r>
-            <a:r>
-              <a:rPr lang="de-CH" dirty="0" err="1"/>
-              <a:t>scratch</a:t>
-            </a:r>
-            <a:endParaRPr lang="de-CH" dirty="0"/>
+              <a:rPr lang="de-CH" sz="4000" dirty="0"/>
+              <a:t> Gradient Descent </a:t>
+            </a:r>
+            <a:r>
+              <a:rPr lang="de-CH" sz="4000" dirty="0" err="1"/>
+              <a:t>Variations</a:t>
+            </a:r>
+            <a:endParaRPr lang="de-CH" sz="4000" dirty="0"/>
           </a:p>
           <a:p>
             <a:pPr marL="0" indent="0">
               <a:buNone/>
             </a:pPr>
-            <a:endParaRPr lang="en-CH" dirty="0"/>
-          </a:p>
-        </p:txBody>
-      </p:sp>
-      <p:sp>
-        <p:nvSpPr>
-          <p:cNvPr id="4" name="Rectangle 3">
-            <a:extLst>
-              <a:ext uri="{FF2B5EF4-FFF2-40B4-BE49-F238E27FC236}">
-                <a16:creationId xmlns:a16="http://schemas.microsoft.com/office/drawing/2014/main" id="{662E0B58-92F9-4907-B2B5-78FA07D3133A}"/>
-              </a:ext>
-            </a:extLst>
-          </p:cNvPr>
-          <p:cNvSpPr/>
+            <a:endParaRPr lang="en-CH" sz="4000" dirty="0"/>
+          </a:p>
+        </p:txBody>
+      </p:sp>
+      <p:sp>
+        <p:nvSpPr>
+          <p:cNvPr id="5" name="TextBox 4">
+            <a:extLst>
+              <a:ext uri="{FF2B5EF4-FFF2-40B4-BE49-F238E27FC236}">
+                <a16:creationId xmlns:a16="http://schemas.microsoft.com/office/drawing/2014/main" id="{4A1B89F9-9F7F-4F69-BFF9-AE55DD89FCCD}"/>
+              </a:ext>
+            </a:extLst>
+          </p:cNvPr>
+          <p:cNvSpPr txBox="1"/>
           <p:nvPr/>
         </p:nvSpPr>
         <p:spPr>
-          <a:xfrm rot="1860278">
-            <a:off x="7074869" y="893210"/>
-            <a:ext cx="5091458" cy="2215991"/>
+          <a:xfrm>
+            <a:off x="88669" y="6035039"/>
+            <a:ext cx="3607724" cy="370706"/>
           </a:xfrm>
           <a:prstGeom prst="rect">
             <a:avLst/>
@@ -3587,42 +3329,23 @@
           <a:noFill/>
         </p:spPr>
         <p:txBody>
-          <a:bodyPr wrap="none" lIns="91440" tIns="45720" rIns="91440" bIns="45720">
+          <a:bodyPr wrap="square" rtlCol="0">
             <a:spAutoFit/>
           </a:bodyPr>
           <a:lstStyle/>
           <a:p>
-            <a:pPr algn="ctr"/>
-            <a:r>
-              <a:rPr lang="en-US" sz="13800" b="1" cap="none" spc="50" dirty="0">
-                <a:ln w="9525" cmpd="sng">
-                  <a:solidFill>
-                    <a:schemeClr val="accent1"/>
-                  </a:solidFill>
-                  <a:prstDash val="solid"/>
-                </a:ln>
-                <a:solidFill>
-                  <a:srgbClr val="70AD47">
-                    <a:tint val="1000"/>
-                  </a:srgbClr>
-                </a:solidFill>
-                <a:effectLst>
-                  <a:glow rad="38100">
-                    <a:schemeClr val="accent1">
-                      <a:alpha val="40000"/>
-                    </a:schemeClr>
-                  </a:glow>
-                </a:effectLst>
-              </a:rPr>
-              <a:t>DRAFT</a:t>
-            </a:r>
+            <a:r>
+              <a:rPr lang="de-CH" dirty="0"/>
+              <a:t>© U. Michelucci 2018</a:t>
+            </a:r>
+            <a:endParaRPr lang="LID4096" dirty="0"/>
           </a:p>
         </p:txBody>
       </p:sp>
     </p:spTree>
     <p:extLst>
       <p:ext uri="{BB962C8B-B14F-4D97-AF65-F5344CB8AC3E}">
-        <p14:creationId xmlns:p14="http://schemas.microsoft.com/office/powerpoint/2010/main" val="1336679061"/>
+        <p14:creationId xmlns:p14="http://schemas.microsoft.com/office/powerpoint/2010/main" val="291120097"/>
       </p:ext>
     </p:extLst>
   </p:cSld>
@@ -3686,7 +3409,7 @@
             </a:br>
             <a:r>
               <a:rPr lang="en-GB" sz="4400" b="1" dirty="0"/>
-              <a:t>Introduction to linear algebra and numpy/Python</a:t>
+              <a:t>Network Training</a:t>
             </a:r>
             <a:endParaRPr lang="en-CH" sz="7200" dirty="0"/>
           </a:p>
@@ -3729,20 +3452,20 @@
       </p:sp>
       <p:sp>
         <p:nvSpPr>
-          <p:cNvPr id="4" name="Rectangle 3">
-            <a:extLst>
-              <a:ext uri="{FF2B5EF4-FFF2-40B4-BE49-F238E27FC236}">
-                <a16:creationId xmlns:a16="http://schemas.microsoft.com/office/drawing/2014/main" id="{37EA2CEC-8909-43E6-BEB4-54A5B5CEDD81}"/>
-              </a:ext>
-            </a:extLst>
-          </p:cNvPr>
-          <p:cNvSpPr/>
+          <p:cNvPr id="5" name="TextBox 4">
+            <a:extLst>
+              <a:ext uri="{FF2B5EF4-FFF2-40B4-BE49-F238E27FC236}">
+                <a16:creationId xmlns:a16="http://schemas.microsoft.com/office/drawing/2014/main" id="{56783ED2-9BAF-45B0-A1AC-046C911F70BC}"/>
+              </a:ext>
+            </a:extLst>
+          </p:cNvPr>
+          <p:cNvSpPr txBox="1"/>
           <p:nvPr/>
         </p:nvSpPr>
         <p:spPr>
-          <a:xfrm rot="1860278">
-            <a:off x="7074869" y="893210"/>
-            <a:ext cx="5091458" cy="2215991"/>
+          <a:xfrm>
+            <a:off x="88669" y="6035039"/>
+            <a:ext cx="3607724" cy="370706"/>
           </a:xfrm>
           <a:prstGeom prst="rect">
             <a:avLst/>
@@ -3750,42 +3473,23 @@
           <a:noFill/>
         </p:spPr>
         <p:txBody>
-          <a:bodyPr wrap="none" lIns="91440" tIns="45720" rIns="91440" bIns="45720">
+          <a:bodyPr wrap="square" rtlCol="0">
             <a:spAutoFit/>
           </a:bodyPr>
           <a:lstStyle/>
           <a:p>
-            <a:pPr algn="ctr"/>
-            <a:r>
-              <a:rPr lang="en-US" sz="13800" b="1" cap="none" spc="50" dirty="0">
-                <a:ln w="9525" cmpd="sng">
-                  <a:solidFill>
-                    <a:schemeClr val="accent1"/>
-                  </a:solidFill>
-                  <a:prstDash val="solid"/>
-                </a:ln>
-                <a:solidFill>
-                  <a:srgbClr val="70AD47">
-                    <a:tint val="1000"/>
-                  </a:srgbClr>
-                </a:solidFill>
-                <a:effectLst>
-                  <a:glow rad="38100">
-                    <a:schemeClr val="accent1">
-                      <a:alpha val="40000"/>
-                    </a:schemeClr>
-                  </a:glow>
-                </a:effectLst>
-              </a:rPr>
-              <a:t>DRAFT</a:t>
-            </a:r>
+            <a:r>
+              <a:rPr lang="de-CH" dirty="0"/>
+              <a:t>© U. Michelucci 2018</a:t>
+            </a:r>
+            <a:endParaRPr lang="LID4096" dirty="0"/>
           </a:p>
         </p:txBody>
       </p:sp>
     </p:spTree>
     <p:extLst>
       <p:ext uri="{BB962C8B-B14F-4D97-AF65-F5344CB8AC3E}">
-        <p14:creationId xmlns:p14="http://schemas.microsoft.com/office/powerpoint/2010/main" val="717239708"/>
+        <p14:creationId xmlns:p14="http://schemas.microsoft.com/office/powerpoint/2010/main" val="1571486009"/>
       </p:ext>
     </p:extLst>
   </p:cSld>
@@ -3859,13 +3563,13 @@
         </p:nvSpPr>
         <p:spPr>
           <a:xfrm>
-            <a:off x="838200" y="1690688"/>
-            <a:ext cx="10515600" cy="4486275"/>
+            <a:off x="891540" y="1691640"/>
+            <a:ext cx="10462260" cy="4485323"/>
           </a:xfrm>
         </p:spPr>
         <p:txBody>
           <a:bodyPr>
-            <a:normAutofit lnSpcReduction="10000"/>
+            <a:normAutofit/>
           </a:bodyPr>
           <a:lstStyle/>
           <a:p>
@@ -3874,46 +3578,9 @@
               <a:buChar char="q"/>
             </a:pPr>
             <a:r>
-              <a:rPr lang="de-CH" dirty="0"/>
-              <a:t> The </a:t>
-            </a:r>
-            <a:r>
-              <a:rPr lang="de-CH" dirty="0" err="1"/>
-              <a:t>student</a:t>
-            </a:r>
-            <a:r>
-              <a:rPr lang="de-CH" dirty="0"/>
-              <a:t> is </a:t>
-            </a:r>
-            <a:r>
-              <a:rPr lang="de-CH" dirty="0" err="1"/>
-              <a:t>able</a:t>
-            </a:r>
-            <a:r>
-              <a:rPr lang="de-CH" dirty="0"/>
-              <a:t> to </a:t>
-            </a:r>
-            <a:r>
-              <a:rPr lang="de-CH" dirty="0" err="1"/>
-              <a:t>explain</a:t>
-            </a:r>
-            <a:r>
-              <a:rPr lang="de-CH" dirty="0"/>
-              <a:t> what is a </a:t>
-            </a:r>
-            <a:r>
-              <a:rPr lang="de-CH" dirty="0" err="1"/>
-              <a:t>vector</a:t>
-            </a:r>
-            <a:r>
-              <a:rPr lang="de-CH" dirty="0"/>
-              <a:t> and a </a:t>
-            </a:r>
-            <a:r>
-              <a:rPr lang="de-CH" dirty="0" err="1"/>
-              <a:t>matrix</a:t>
-            </a:r>
-            <a:endParaRPr lang="de-CH" dirty="0"/>
+              <a:rPr lang="de-CH" sz="5400" dirty="0"/>
+              <a:t> Dynamic Learning Rate Decay</a:t>
+            </a:r>
           </a:p>
           <a:p>
             <a:pPr>
@@ -3921,78 +3588,25 @@
               <a:buChar char="q"/>
             </a:pPr>
             <a:r>
-              <a:rPr lang="de-CH" dirty="0"/>
-              <a:t> The </a:t>
-            </a:r>
-            <a:r>
-              <a:rPr lang="de-CH" dirty="0" err="1"/>
-              <a:t>student</a:t>
-            </a:r>
-            <a:r>
-              <a:rPr lang="de-CH" dirty="0"/>
-              <a:t> is </a:t>
-            </a:r>
-            <a:r>
-              <a:rPr lang="de-CH" dirty="0" err="1"/>
-              <a:t>able</a:t>
-            </a:r>
-            <a:r>
-              <a:rPr lang="de-CH" dirty="0"/>
-              <a:t> to </a:t>
-            </a:r>
-            <a:r>
-              <a:rPr lang="de-CH" dirty="0" err="1"/>
-              <a:t>understand</a:t>
-            </a:r>
-            <a:r>
-              <a:rPr lang="de-CH" dirty="0"/>
+              <a:rPr lang="de-CH" sz="5400" dirty="0"/>
               <a:t> </a:t>
             </a:r>
             <a:r>
-              <a:rPr lang="de-CH" dirty="0" err="1"/>
-              <a:t>the</a:t>
-            </a:r>
-            <a:r>
-              <a:rPr lang="de-CH" dirty="0"/>
+              <a:rPr lang="de-CH" sz="5400" dirty="0" err="1"/>
+              <a:t>Exponentially</a:t>
+            </a:r>
+            <a:r>
+              <a:rPr lang="de-CH" sz="5400" dirty="0"/>
               <a:t> </a:t>
             </a:r>
             <a:r>
-              <a:rPr lang="de-CH" dirty="0" err="1"/>
-              <a:t>main</a:t>
-            </a:r>
-            <a:r>
-              <a:rPr lang="de-CH" dirty="0"/>
-              <a:t> </a:t>
-            </a:r>
-            <a:r>
-              <a:rPr lang="de-CH" dirty="0" err="1"/>
-              <a:t>operations</a:t>
-            </a:r>
-            <a:r>
-              <a:rPr lang="de-CH" dirty="0"/>
-              <a:t> you </a:t>
-            </a:r>
-            <a:r>
-              <a:rPr lang="de-CH" dirty="0" err="1"/>
-              <a:t>can</a:t>
-            </a:r>
-            <a:r>
-              <a:rPr lang="de-CH" dirty="0"/>
-              <a:t> perform on a </a:t>
-            </a:r>
-            <a:r>
-              <a:rPr lang="de-CH" dirty="0" err="1"/>
-              <a:t>vector</a:t>
-            </a:r>
-            <a:r>
-              <a:rPr lang="de-CH" dirty="0"/>
-              <a:t> and a </a:t>
-            </a:r>
-            <a:r>
-              <a:rPr lang="de-CH" dirty="0" err="1"/>
-              <a:t>matrix</a:t>
-            </a:r>
-            <a:endParaRPr lang="de-CH" dirty="0"/>
+              <a:rPr lang="de-CH" sz="5400" dirty="0" err="1"/>
+              <a:t>weighted</a:t>
+            </a:r>
+            <a:r>
+              <a:rPr lang="de-CH" sz="5400" dirty="0"/>
+              <a:t> Averages</a:t>
+            </a:r>
           </a:p>
           <a:p>
             <a:pPr>
@@ -4000,298 +3614,34 @@
               <a:buChar char="q"/>
             </a:pPr>
             <a:r>
-              <a:rPr lang="de-CH" dirty="0"/>
-              <a:t> The </a:t>
-            </a:r>
-            <a:r>
-              <a:rPr lang="de-CH" dirty="0" err="1"/>
-              <a:t>student</a:t>
-            </a:r>
-            <a:r>
-              <a:rPr lang="de-CH" dirty="0"/>
-              <a:t> is </a:t>
-            </a:r>
-            <a:r>
-              <a:rPr lang="de-CH" dirty="0" err="1"/>
-              <a:t>able</a:t>
-            </a:r>
-            <a:r>
-              <a:rPr lang="de-CH" dirty="0"/>
-              <a:t> to </a:t>
-            </a:r>
-            <a:r>
-              <a:rPr lang="de-CH" dirty="0" err="1"/>
-              <a:t>implement</a:t>
-            </a:r>
-            <a:r>
-              <a:rPr lang="de-CH" dirty="0"/>
-              <a:t> </a:t>
-            </a:r>
-            <a:r>
-              <a:rPr lang="de-CH" dirty="0" err="1"/>
-              <a:t>the</a:t>
-            </a:r>
-            <a:r>
-              <a:rPr lang="de-CH" dirty="0"/>
-              <a:t> </a:t>
-            </a:r>
-            <a:r>
-              <a:rPr lang="de-CH" dirty="0" err="1"/>
-              <a:t>main</a:t>
-            </a:r>
-            <a:r>
-              <a:rPr lang="de-CH" dirty="0"/>
-              <a:t> </a:t>
-            </a:r>
-            <a:r>
-              <a:rPr lang="de-CH" dirty="0" err="1"/>
-              <a:t>operations</a:t>
-            </a:r>
-            <a:r>
-              <a:rPr lang="de-CH" dirty="0"/>
-              <a:t> in </a:t>
-            </a:r>
-            <a:r>
-              <a:rPr lang="de-CH" dirty="0" err="1"/>
-              <a:t>basic</a:t>
-            </a:r>
-            <a:r>
-              <a:rPr lang="de-CH" dirty="0"/>
-              <a:t> Python</a:t>
-            </a:r>
-          </a:p>
-          <a:p>
-            <a:pPr>
-              <a:buFont typeface="Wingdings" panose="05000000000000000000" pitchFamily="2" charset="2"/>
-              <a:buChar char="q"/>
+              <a:rPr lang="de-CH" sz="5400" dirty="0"/>
+              <a:t> Different Optimizers </a:t>
+            </a:r>
+          </a:p>
+          <a:p>
+            <a:pPr marL="0" indent="0">
+              <a:buNone/>
             </a:pPr>
-            <a:r>
-              <a:rPr lang="de-CH" dirty="0"/>
-              <a:t> The </a:t>
-            </a:r>
-            <a:r>
-              <a:rPr lang="de-CH" dirty="0" err="1"/>
-              <a:t>student</a:t>
-            </a:r>
-            <a:r>
-              <a:rPr lang="de-CH" dirty="0"/>
-              <a:t> is </a:t>
-            </a:r>
-            <a:r>
-              <a:rPr lang="de-CH" dirty="0" err="1"/>
-              <a:t>able</a:t>
-            </a:r>
-            <a:r>
-              <a:rPr lang="de-CH" dirty="0"/>
-              <a:t> to </a:t>
-            </a:r>
-            <a:r>
-              <a:rPr lang="de-CH" dirty="0" err="1"/>
-              <a:t>implement</a:t>
-            </a:r>
-            <a:r>
-              <a:rPr lang="de-CH" dirty="0"/>
-              <a:t> </a:t>
-            </a:r>
-            <a:r>
-              <a:rPr lang="de-CH" dirty="0" err="1"/>
-              <a:t>the</a:t>
-            </a:r>
-            <a:r>
-              <a:rPr lang="de-CH" dirty="0"/>
-              <a:t> </a:t>
-            </a:r>
-            <a:r>
-              <a:rPr lang="de-CH" dirty="0" err="1"/>
-              <a:t>main</a:t>
-            </a:r>
-            <a:r>
-              <a:rPr lang="de-CH" dirty="0"/>
-              <a:t> </a:t>
-            </a:r>
-            <a:r>
-              <a:rPr lang="de-CH" dirty="0" err="1"/>
-              <a:t>operations</a:t>
-            </a:r>
-            <a:r>
-              <a:rPr lang="de-CH" dirty="0"/>
-              <a:t> in numpy</a:t>
-            </a:r>
-          </a:p>
-          <a:p>
-            <a:pPr>
-              <a:buFont typeface="Wingdings" panose="05000000000000000000" pitchFamily="2" charset="2"/>
-              <a:buChar char="q"/>
-            </a:pPr>
-            <a:r>
-              <a:rPr lang="de-CH" dirty="0"/>
-              <a:t> The </a:t>
-            </a:r>
-            <a:r>
-              <a:rPr lang="de-CH" dirty="0" err="1"/>
-              <a:t>student</a:t>
-            </a:r>
-            <a:r>
-              <a:rPr lang="de-CH" dirty="0"/>
-              <a:t> is </a:t>
-            </a:r>
-            <a:r>
-              <a:rPr lang="de-CH" dirty="0" err="1"/>
-              <a:t>able</a:t>
-            </a:r>
-            <a:r>
-              <a:rPr lang="de-CH" dirty="0"/>
-              <a:t> to </a:t>
-            </a:r>
-            <a:r>
-              <a:rPr lang="de-CH" dirty="0" err="1"/>
-              <a:t>understand</a:t>
-            </a:r>
-            <a:r>
-              <a:rPr lang="de-CH" dirty="0"/>
-              <a:t> </a:t>
-            </a:r>
-            <a:r>
-              <a:rPr lang="de-CH" dirty="0" err="1"/>
-              <a:t>the</a:t>
-            </a:r>
-            <a:r>
-              <a:rPr lang="de-CH" dirty="0"/>
-              <a:t> </a:t>
-            </a:r>
-            <a:r>
-              <a:rPr lang="de-CH" dirty="0" err="1"/>
-              <a:t>difference</a:t>
-            </a:r>
-            <a:r>
-              <a:rPr lang="de-CH" dirty="0"/>
-              <a:t> in how numpy </a:t>
-            </a:r>
-            <a:r>
-              <a:rPr lang="de-CH" dirty="0" err="1"/>
-              <a:t>operates</a:t>
-            </a:r>
-            <a:r>
-              <a:rPr lang="de-CH" dirty="0"/>
-              <a:t> on </a:t>
-            </a:r>
-            <a:r>
-              <a:rPr lang="de-CH" dirty="0" err="1"/>
-              <a:t>arrays</a:t>
-            </a:r>
-            <a:endParaRPr lang="de-CH" dirty="0"/>
-          </a:p>
-          <a:p>
-            <a:pPr>
-              <a:buFont typeface="Wingdings" panose="05000000000000000000" pitchFamily="2" charset="2"/>
-              <a:buChar char="q"/>
-            </a:pPr>
-            <a:r>
-              <a:rPr lang="de-CH" dirty="0"/>
-              <a:t> The </a:t>
-            </a:r>
-            <a:r>
-              <a:rPr lang="de-CH" dirty="0" err="1"/>
-              <a:t>student</a:t>
-            </a:r>
-            <a:r>
-              <a:rPr lang="de-CH" dirty="0"/>
-              <a:t> is </a:t>
-            </a:r>
-            <a:r>
-              <a:rPr lang="de-CH" dirty="0" err="1"/>
-              <a:t>able</a:t>
-            </a:r>
-            <a:r>
-              <a:rPr lang="de-CH" dirty="0"/>
-              <a:t> to </a:t>
-            </a:r>
-            <a:r>
-              <a:rPr lang="de-CH" dirty="0" err="1"/>
-              <a:t>use</a:t>
-            </a:r>
-            <a:r>
-              <a:rPr lang="de-CH" dirty="0"/>
-              <a:t> </a:t>
-            </a:r>
-            <a:r>
-              <a:rPr lang="de-CH" dirty="0" err="1"/>
-              <a:t>the</a:t>
-            </a:r>
-            <a:r>
-              <a:rPr lang="de-CH" dirty="0"/>
-              <a:t> </a:t>
-            </a:r>
-            <a:r>
-              <a:rPr lang="de-CH" dirty="0" err="1"/>
-              <a:t>concepts</a:t>
-            </a:r>
-            <a:r>
-              <a:rPr lang="de-CH" dirty="0"/>
-              <a:t> to </a:t>
-            </a:r>
-            <a:r>
-              <a:rPr lang="de-CH" dirty="0" err="1"/>
-              <a:t>implement</a:t>
-            </a:r>
-            <a:r>
-              <a:rPr lang="de-CH" dirty="0"/>
-              <a:t> a </a:t>
-            </a:r>
-            <a:r>
-              <a:rPr lang="de-CH" dirty="0" err="1"/>
-              <a:t>complete</a:t>
-            </a:r>
-            <a:r>
-              <a:rPr lang="de-CH" dirty="0"/>
-              <a:t> linear </a:t>
-            </a:r>
-            <a:r>
-              <a:rPr lang="de-CH" dirty="0" err="1"/>
-              <a:t>regression</a:t>
-            </a:r>
-            <a:r>
-              <a:rPr lang="de-CH" dirty="0"/>
-              <a:t> </a:t>
-            </a:r>
-            <a:r>
-              <a:rPr lang="de-CH" dirty="0" err="1"/>
-              <a:t>model</a:t>
-            </a:r>
-            <a:r>
-              <a:rPr lang="de-CH" dirty="0"/>
-              <a:t> from </a:t>
-            </a:r>
-            <a:r>
-              <a:rPr lang="de-CH" dirty="0" err="1"/>
-              <a:t>scratch</a:t>
-            </a:r>
-            <a:endParaRPr lang="de-CH" dirty="0"/>
-          </a:p>
-          <a:p>
-            <a:pPr marL="0" indent="0">
-              <a:buNone/>
-            </a:pPr>
-            <a:endParaRPr lang="en-CH" dirty="0"/>
-          </a:p>
-        </p:txBody>
-      </p:sp>
-      <p:sp>
-        <p:nvSpPr>
-          <p:cNvPr id="4" name="Rectangle 3">
-            <a:extLst>
-              <a:ext uri="{FF2B5EF4-FFF2-40B4-BE49-F238E27FC236}">
-                <a16:creationId xmlns:a16="http://schemas.microsoft.com/office/drawing/2014/main" id="{35D581D5-BAC4-41E8-845F-D06699A5F233}"/>
-              </a:ext>
-            </a:extLst>
-          </p:cNvPr>
-          <p:cNvSpPr/>
+            <a:endParaRPr lang="en-CH" sz="5400" dirty="0"/>
+          </a:p>
+        </p:txBody>
+      </p:sp>
+      <p:sp>
+        <p:nvSpPr>
+          <p:cNvPr id="5" name="TextBox 4">
+            <a:extLst>
+              <a:ext uri="{FF2B5EF4-FFF2-40B4-BE49-F238E27FC236}">
+                <a16:creationId xmlns:a16="http://schemas.microsoft.com/office/drawing/2014/main" id="{47BC0356-AADB-45D5-8724-982795F45FDE}"/>
+              </a:ext>
+            </a:extLst>
+          </p:cNvPr>
+          <p:cNvSpPr txBox="1"/>
           <p:nvPr/>
         </p:nvSpPr>
         <p:spPr>
-          <a:xfrm rot="1860278">
-            <a:off x="7074869" y="893210"/>
-            <a:ext cx="5091458" cy="2215991"/>
+          <a:xfrm>
+            <a:off x="88669" y="6035039"/>
+            <a:ext cx="3607724" cy="370706"/>
           </a:xfrm>
           <a:prstGeom prst="rect">
             <a:avLst/>
@@ -4299,42 +3649,23 @@
           <a:noFill/>
         </p:spPr>
         <p:txBody>
-          <a:bodyPr wrap="none" lIns="91440" tIns="45720" rIns="91440" bIns="45720">
+          <a:bodyPr wrap="square" rtlCol="0">
             <a:spAutoFit/>
           </a:bodyPr>
           <a:lstStyle/>
           <a:p>
-            <a:pPr algn="ctr"/>
-            <a:r>
-              <a:rPr lang="en-US" sz="13800" b="1" cap="none" spc="50" dirty="0">
-                <a:ln w="9525" cmpd="sng">
-                  <a:solidFill>
-                    <a:schemeClr val="accent1"/>
-                  </a:solidFill>
-                  <a:prstDash val="solid"/>
-                </a:ln>
-                <a:solidFill>
-                  <a:srgbClr val="70AD47">
-                    <a:tint val="1000"/>
-                  </a:srgbClr>
-                </a:solidFill>
-                <a:effectLst>
-                  <a:glow rad="38100">
-                    <a:schemeClr val="accent1">
-                      <a:alpha val="40000"/>
-                    </a:schemeClr>
-                  </a:glow>
-                </a:effectLst>
-              </a:rPr>
-              <a:t>DRAFT</a:t>
-            </a:r>
+            <a:r>
+              <a:rPr lang="de-CH" dirty="0"/>
+              <a:t>© U. Michelucci 2018</a:t>
+            </a:r>
+            <a:endParaRPr lang="LID4096" dirty="0"/>
           </a:p>
         </p:txBody>
       </p:sp>
     </p:spTree>
     <p:extLst>
       <p:ext uri="{BB962C8B-B14F-4D97-AF65-F5344CB8AC3E}">
-        <p14:creationId xmlns:p14="http://schemas.microsoft.com/office/powerpoint/2010/main" val="572190113"/>
+        <p14:creationId xmlns:p14="http://schemas.microsoft.com/office/powerpoint/2010/main" val="1336679061"/>
       </p:ext>
     </p:extLst>
   </p:cSld>
@@ -4397,8 +3728,8 @@
               <a:rPr lang="en-GB" sz="7200" b="1" dirty="0"/>
             </a:br>
             <a:r>
-              <a:rPr lang="en-GB" sz="4400" b="1" dirty="0"/>
-              <a:t>Introduction to linear algebra and numpy/Python</a:t>
+              <a:rPr lang="en-GB" sz="7200" b="1" dirty="0"/>
+              <a:t>Regularisation</a:t>
             </a:r>
             <a:endParaRPr lang="en-CH" sz="7200" dirty="0"/>
           </a:p>
@@ -4441,20 +3772,20 @@
       </p:sp>
       <p:sp>
         <p:nvSpPr>
-          <p:cNvPr id="4" name="Rectangle 3">
-            <a:extLst>
-              <a:ext uri="{FF2B5EF4-FFF2-40B4-BE49-F238E27FC236}">
-                <a16:creationId xmlns:a16="http://schemas.microsoft.com/office/drawing/2014/main" id="{8C6CD198-DB43-49D2-BEDB-FD9EE4A30546}"/>
-              </a:ext>
-            </a:extLst>
-          </p:cNvPr>
-          <p:cNvSpPr/>
+          <p:cNvPr id="5" name="TextBox 4">
+            <a:extLst>
+              <a:ext uri="{FF2B5EF4-FFF2-40B4-BE49-F238E27FC236}">
+                <a16:creationId xmlns:a16="http://schemas.microsoft.com/office/drawing/2014/main" id="{7E9DE74C-D505-443E-83D6-49F71D10E7D6}"/>
+              </a:ext>
+            </a:extLst>
+          </p:cNvPr>
+          <p:cNvSpPr txBox="1"/>
           <p:nvPr/>
         </p:nvSpPr>
         <p:spPr>
-          <a:xfrm rot="1860278">
-            <a:off x="7074869" y="893210"/>
-            <a:ext cx="5091458" cy="2215991"/>
+          <a:xfrm>
+            <a:off x="88669" y="6035039"/>
+            <a:ext cx="3607724" cy="370706"/>
           </a:xfrm>
           <a:prstGeom prst="rect">
             <a:avLst/>
@@ -4462,42 +3793,23 @@
           <a:noFill/>
         </p:spPr>
         <p:txBody>
-          <a:bodyPr wrap="none" lIns="91440" tIns="45720" rIns="91440" bIns="45720">
+          <a:bodyPr wrap="square" rtlCol="0">
             <a:spAutoFit/>
           </a:bodyPr>
           <a:lstStyle/>
           <a:p>
-            <a:pPr algn="ctr"/>
-            <a:r>
-              <a:rPr lang="en-US" sz="13800" b="1" cap="none" spc="50" dirty="0">
-                <a:ln w="9525" cmpd="sng">
-                  <a:solidFill>
-                    <a:schemeClr val="accent1"/>
-                  </a:solidFill>
-                  <a:prstDash val="solid"/>
-                </a:ln>
-                <a:solidFill>
-                  <a:srgbClr val="70AD47">
-                    <a:tint val="1000"/>
-                  </a:srgbClr>
-                </a:solidFill>
-                <a:effectLst>
-                  <a:glow rad="38100">
-                    <a:schemeClr val="accent1">
-                      <a:alpha val="40000"/>
-                    </a:schemeClr>
-                  </a:glow>
-                </a:effectLst>
-              </a:rPr>
-              <a:t>DRAFT</a:t>
-            </a:r>
+            <a:r>
+              <a:rPr lang="de-CH" dirty="0"/>
+              <a:t>© U. Michelucci 2018</a:t>
+            </a:r>
+            <a:endParaRPr lang="LID4096" dirty="0"/>
           </a:p>
         </p:txBody>
       </p:sp>
     </p:spTree>
     <p:extLst>
       <p:ext uri="{BB962C8B-B14F-4D97-AF65-F5344CB8AC3E}">
-        <p14:creationId xmlns:p14="http://schemas.microsoft.com/office/powerpoint/2010/main" val="2324628795"/>
+        <p14:creationId xmlns:p14="http://schemas.microsoft.com/office/powerpoint/2010/main" val="717239708"/>
       </p:ext>
     </p:extLst>
   </p:cSld>
@@ -4571,13 +3883,13 @@
         </p:nvSpPr>
         <p:spPr>
           <a:xfrm>
-            <a:off x="838200" y="1690688"/>
-            <a:ext cx="10515600" cy="4486275"/>
+            <a:off x="868680" y="1691640"/>
+            <a:ext cx="10485120" cy="4485323"/>
           </a:xfrm>
         </p:spPr>
         <p:txBody>
           <a:bodyPr>
-            <a:normAutofit lnSpcReduction="10000"/>
+            <a:normAutofit/>
           </a:bodyPr>
           <a:lstStyle/>
           <a:p>
@@ -4586,46 +3898,14 @@
               <a:buChar char="q"/>
             </a:pPr>
             <a:r>
-              <a:rPr lang="de-CH" dirty="0"/>
-              <a:t> The </a:t>
-            </a:r>
-            <a:r>
-              <a:rPr lang="de-CH" dirty="0" err="1"/>
-              <a:t>student</a:t>
-            </a:r>
-            <a:r>
-              <a:rPr lang="de-CH" dirty="0"/>
-              <a:t> is </a:t>
-            </a:r>
-            <a:r>
-              <a:rPr lang="de-CH" dirty="0" err="1"/>
-              <a:t>able</a:t>
-            </a:r>
-            <a:r>
-              <a:rPr lang="de-CH" dirty="0"/>
-              <a:t> to </a:t>
-            </a:r>
-            <a:r>
-              <a:rPr lang="de-CH" dirty="0" err="1"/>
-              <a:t>explain</a:t>
-            </a:r>
-            <a:r>
-              <a:rPr lang="de-CH" dirty="0"/>
-              <a:t> what is a </a:t>
-            </a:r>
-            <a:r>
-              <a:rPr lang="de-CH" dirty="0" err="1"/>
-              <a:t>vector</a:t>
-            </a:r>
-            <a:r>
-              <a:rPr lang="de-CH" dirty="0"/>
-              <a:t> and a </a:t>
-            </a:r>
-            <a:r>
-              <a:rPr lang="de-CH" dirty="0" err="1"/>
-              <a:t>matrix</a:t>
-            </a:r>
-            <a:endParaRPr lang="de-CH" dirty="0"/>
+              <a:rPr lang="de-CH" sz="4400" dirty="0"/>
+              <a:t> What is </a:t>
+            </a:r>
+            <a:r>
+              <a:rPr lang="de-CH" sz="4400" dirty="0" err="1"/>
+              <a:t>regularisation</a:t>
+            </a:r>
+            <a:endParaRPr lang="de-CH" sz="4400" dirty="0"/>
           </a:p>
           <a:p>
             <a:pPr>
@@ -4633,78 +3913,14 @@
               <a:buChar char="q"/>
             </a:pPr>
             <a:r>
-              <a:rPr lang="de-CH" dirty="0"/>
-              <a:t> The </a:t>
-            </a:r>
-            <a:r>
-              <a:rPr lang="de-CH" dirty="0" err="1"/>
-              <a:t>student</a:t>
-            </a:r>
-            <a:r>
-              <a:rPr lang="de-CH" dirty="0"/>
-              <a:t> is </a:t>
-            </a:r>
-            <a:r>
-              <a:rPr lang="de-CH" dirty="0" err="1"/>
-              <a:t>able</a:t>
-            </a:r>
-            <a:r>
-              <a:rPr lang="de-CH" dirty="0"/>
-              <a:t> to </a:t>
-            </a:r>
-            <a:r>
-              <a:rPr lang="de-CH" dirty="0" err="1"/>
-              <a:t>understand</a:t>
-            </a:r>
-            <a:r>
-              <a:rPr lang="de-CH" dirty="0"/>
-              <a:t> </a:t>
-            </a:r>
-            <a:r>
-              <a:rPr lang="de-CH" dirty="0" err="1"/>
-              <a:t>the</a:t>
-            </a:r>
-            <a:r>
-              <a:rPr lang="de-CH" dirty="0"/>
-              <a:t> </a:t>
-            </a:r>
-            <a:r>
-              <a:rPr lang="de-CH" dirty="0" err="1"/>
-              <a:t>main</a:t>
-            </a:r>
-            <a:r>
-              <a:rPr lang="de-CH" dirty="0"/>
-              <a:t> </a:t>
-            </a:r>
-            <a:r>
-              <a:rPr lang="de-CH" dirty="0" err="1"/>
-              <a:t>operations</a:t>
-            </a:r>
-            <a:r>
-              <a:rPr lang="de-CH" dirty="0"/>
-              <a:t> you </a:t>
-            </a:r>
-            <a:r>
-              <a:rPr lang="de-CH" dirty="0" err="1"/>
-              <a:t>can</a:t>
-            </a:r>
-            <a:r>
-              <a:rPr lang="de-CH" dirty="0"/>
-              <a:t> perform on a </a:t>
-            </a:r>
-            <a:r>
-              <a:rPr lang="de-CH" dirty="0" err="1"/>
-              <a:t>vector</a:t>
-            </a:r>
-            <a:r>
-              <a:rPr lang="de-CH" dirty="0"/>
-              <a:t> and a </a:t>
-            </a:r>
-            <a:r>
-              <a:rPr lang="de-CH" dirty="0" err="1"/>
-              <a:t>matrix</a:t>
-            </a:r>
-            <a:endParaRPr lang="de-CH" dirty="0"/>
+              <a:rPr lang="de-CH" sz="4400" dirty="0"/>
+              <a:t> L1 and L2 </a:t>
+            </a:r>
+            <a:r>
+              <a:rPr lang="de-CH" sz="4400" dirty="0" err="1"/>
+              <a:t>Regularisation</a:t>
+            </a:r>
+            <a:endParaRPr lang="de-CH" sz="4400" dirty="0"/>
           </a:p>
           <a:p>
             <a:pPr>
@@ -4712,64 +3928,8 @@
               <a:buChar char="q"/>
             </a:pPr>
             <a:r>
-              <a:rPr lang="de-CH" dirty="0"/>
-              <a:t> The </a:t>
-            </a:r>
-            <a:r>
-              <a:rPr lang="de-CH" dirty="0" err="1"/>
-              <a:t>student</a:t>
-            </a:r>
-            <a:r>
-              <a:rPr lang="de-CH" dirty="0"/>
-              <a:t> is </a:t>
-            </a:r>
-            <a:r>
-              <a:rPr lang="de-CH" dirty="0" err="1"/>
-              <a:t>able</a:t>
-            </a:r>
-            <a:r>
-              <a:rPr lang="de-CH" dirty="0"/>
-              <a:t> to </a:t>
-            </a:r>
-            <a:r>
-              <a:rPr lang="de-CH" dirty="0" err="1"/>
-              <a:t>implement</a:t>
-            </a:r>
-            <a:r>
-              <a:rPr lang="de-CH" dirty="0"/>
-              <a:t> </a:t>
-            </a:r>
-            <a:r>
-              <a:rPr lang="de-CH" dirty="0" err="1"/>
-              <a:t>the</a:t>
-            </a:r>
-            <a:r>
-              <a:rPr lang="de-CH" dirty="0"/>
-              <a:t> </a:t>
-            </a:r>
-            <a:r>
-              <a:rPr lang="de-CH" dirty="0" err="1"/>
-              <a:t>main</a:t>
-            </a:r>
-            <a:r>
-              <a:rPr lang="de-CH" dirty="0"/>
-              <a:t> </a:t>
-            </a:r>
-            <a:r>
-              <a:rPr lang="de-CH" dirty="0" err="1"/>
-              <a:t>operations</a:t>
-            </a:r>
-            <a:r>
-              <a:rPr lang="de-CH" dirty="0"/>
-              <a:t> in </a:t>
-            </a:r>
-            <a:r>
-              <a:rPr lang="de-CH" dirty="0" err="1"/>
-              <a:t>basic</a:t>
-            </a:r>
-            <a:r>
-              <a:rPr lang="de-CH" dirty="0"/>
-              <a:t> Python</a:t>
+              <a:rPr lang="de-CH" sz="4400" dirty="0"/>
+              <a:t> Dropout</a:t>
             </a:r>
           </a:p>
           <a:p>
@@ -4778,232 +3938,45 @@
               <a:buChar char="q"/>
             </a:pPr>
             <a:r>
-              <a:rPr lang="de-CH" dirty="0"/>
-              <a:t> The </a:t>
-            </a:r>
-            <a:r>
-              <a:rPr lang="de-CH" dirty="0" err="1"/>
-              <a:t>student</a:t>
-            </a:r>
-            <a:r>
-              <a:rPr lang="de-CH" dirty="0"/>
-              <a:t> is </a:t>
-            </a:r>
-            <a:r>
-              <a:rPr lang="de-CH" dirty="0" err="1"/>
-              <a:t>able</a:t>
-            </a:r>
-            <a:r>
-              <a:rPr lang="de-CH" dirty="0"/>
-              <a:t> to </a:t>
-            </a:r>
-            <a:r>
-              <a:rPr lang="de-CH" dirty="0" err="1"/>
-              <a:t>implement</a:t>
-            </a:r>
-            <a:r>
-              <a:rPr lang="de-CH" dirty="0"/>
-              <a:t> </a:t>
-            </a:r>
-            <a:r>
-              <a:rPr lang="de-CH" dirty="0" err="1"/>
-              <a:t>the</a:t>
-            </a:r>
-            <a:r>
-              <a:rPr lang="de-CH" dirty="0"/>
-              <a:t> </a:t>
-            </a:r>
-            <a:r>
-              <a:rPr lang="de-CH" dirty="0" err="1"/>
-              <a:t>main</a:t>
-            </a:r>
-            <a:r>
-              <a:rPr lang="de-CH" dirty="0"/>
-              <a:t> </a:t>
-            </a:r>
-            <a:r>
-              <a:rPr lang="de-CH" dirty="0" err="1"/>
-              <a:t>operations</a:t>
-            </a:r>
-            <a:r>
-              <a:rPr lang="de-CH" dirty="0"/>
-              <a:t> in numpy</a:t>
-            </a:r>
-          </a:p>
-          <a:p>
-            <a:pPr>
-              <a:buFont typeface="Wingdings" panose="05000000000000000000" pitchFamily="2" charset="2"/>
-              <a:buChar char="q"/>
+              <a:rPr lang="de-CH" sz="4400" dirty="0"/>
+              <a:t> Early </a:t>
+            </a:r>
+            <a:r>
+              <a:rPr lang="de-CH" sz="4400" dirty="0" err="1"/>
+              <a:t>stopping</a:t>
+            </a:r>
+            <a:endParaRPr lang="de-CH" sz="4400" dirty="0"/>
+          </a:p>
+          <a:p>
+            <a:pPr marL="0" indent="0">
+              <a:buNone/>
             </a:pPr>
-            <a:r>
-              <a:rPr lang="de-CH" dirty="0"/>
-              <a:t> The </a:t>
-            </a:r>
-            <a:r>
-              <a:rPr lang="de-CH" dirty="0" err="1"/>
-              <a:t>student</a:t>
-            </a:r>
-            <a:r>
-              <a:rPr lang="de-CH" dirty="0"/>
-              <a:t> is </a:t>
-            </a:r>
-            <a:r>
-              <a:rPr lang="de-CH" dirty="0" err="1"/>
-              <a:t>able</a:t>
-            </a:r>
-            <a:r>
-              <a:rPr lang="de-CH" dirty="0"/>
-              <a:t> to </a:t>
-            </a:r>
-            <a:r>
-              <a:rPr lang="de-CH" dirty="0" err="1"/>
-              <a:t>understand</a:t>
-            </a:r>
-            <a:r>
-              <a:rPr lang="de-CH" dirty="0"/>
-              <a:t> </a:t>
-            </a:r>
-            <a:r>
-              <a:rPr lang="de-CH" dirty="0" err="1"/>
-              <a:t>the</a:t>
-            </a:r>
-            <a:r>
-              <a:rPr lang="de-CH" dirty="0"/>
-              <a:t> </a:t>
-            </a:r>
-            <a:r>
-              <a:rPr lang="de-CH" dirty="0" err="1"/>
-              <a:t>difference</a:t>
-            </a:r>
-            <a:r>
-              <a:rPr lang="de-CH" dirty="0"/>
-              <a:t> in how numpy </a:t>
-            </a:r>
-            <a:r>
-              <a:rPr lang="de-CH" dirty="0" err="1"/>
-              <a:t>operates</a:t>
-            </a:r>
-            <a:r>
-              <a:rPr lang="de-CH" dirty="0"/>
-              <a:t> on </a:t>
-            </a:r>
-            <a:r>
-              <a:rPr lang="de-CH" dirty="0" err="1"/>
-              <a:t>arrays</a:t>
-            </a:r>
-            <a:endParaRPr lang="de-CH" dirty="0"/>
-          </a:p>
-          <a:p>
-            <a:pPr>
-              <a:buFont typeface="Wingdings" panose="05000000000000000000" pitchFamily="2" charset="2"/>
-              <a:buChar char="q"/>
+            <a:endParaRPr lang="de-CH" sz="4400" dirty="0"/>
+          </a:p>
+          <a:p>
+            <a:pPr marL="0" indent="0">
+              <a:buNone/>
             </a:pPr>
-            <a:r>
-              <a:rPr lang="de-CH" dirty="0"/>
-              <a:t> The </a:t>
-            </a:r>
-            <a:r>
-              <a:rPr lang="de-CH" dirty="0" err="1"/>
-              <a:t>student</a:t>
-            </a:r>
-            <a:r>
-              <a:rPr lang="de-CH" dirty="0"/>
-              <a:t> is </a:t>
-            </a:r>
-            <a:r>
-              <a:rPr lang="de-CH" dirty="0" err="1"/>
-              <a:t>able</a:t>
-            </a:r>
-            <a:r>
-              <a:rPr lang="de-CH" dirty="0"/>
-              <a:t> to </a:t>
-            </a:r>
-            <a:r>
-              <a:rPr lang="de-CH" dirty="0" err="1"/>
-              <a:t>use</a:t>
-            </a:r>
-            <a:r>
-              <a:rPr lang="de-CH" dirty="0"/>
-              <a:t> </a:t>
-            </a:r>
-            <a:r>
-              <a:rPr lang="de-CH" dirty="0" err="1"/>
-              <a:t>the</a:t>
-            </a:r>
-            <a:r>
-              <a:rPr lang="de-CH" dirty="0"/>
-              <a:t> </a:t>
-            </a:r>
-            <a:r>
-              <a:rPr lang="de-CH" dirty="0" err="1"/>
-              <a:t>concepts</a:t>
-            </a:r>
-            <a:r>
-              <a:rPr lang="de-CH" dirty="0"/>
-              <a:t> to </a:t>
-            </a:r>
-            <a:r>
-              <a:rPr lang="de-CH" dirty="0" err="1"/>
-              <a:t>implement</a:t>
-            </a:r>
-            <a:r>
-              <a:rPr lang="de-CH" dirty="0"/>
-              <a:t> a </a:t>
-            </a:r>
-            <a:r>
-              <a:rPr lang="de-CH" dirty="0" err="1"/>
-              <a:t>complete</a:t>
-            </a:r>
-            <a:r>
-              <a:rPr lang="de-CH" dirty="0"/>
-              <a:t> linear </a:t>
-            </a:r>
-            <a:r>
-              <a:rPr lang="de-CH" dirty="0" err="1"/>
-              <a:t>regression</a:t>
-            </a:r>
-            <a:r>
-              <a:rPr lang="de-CH" dirty="0"/>
-              <a:t> </a:t>
-            </a:r>
-            <a:r>
-              <a:rPr lang="de-CH" dirty="0" err="1"/>
-              <a:t>model</a:t>
-            </a:r>
-            <a:r>
-              <a:rPr lang="de-CH" dirty="0"/>
-              <a:t> from </a:t>
-            </a:r>
-            <a:r>
-              <a:rPr lang="de-CH" dirty="0" err="1"/>
-              <a:t>scratch</a:t>
-            </a:r>
-            <a:endParaRPr lang="de-CH" dirty="0"/>
-          </a:p>
-          <a:p>
-            <a:pPr marL="0" indent="0">
-              <a:buNone/>
-            </a:pPr>
-            <a:endParaRPr lang="en-CH" dirty="0"/>
-          </a:p>
-        </p:txBody>
-      </p:sp>
-      <p:sp>
-        <p:nvSpPr>
-          <p:cNvPr id="4" name="Rectangle 3">
-            <a:extLst>
-              <a:ext uri="{FF2B5EF4-FFF2-40B4-BE49-F238E27FC236}">
-                <a16:creationId xmlns:a16="http://schemas.microsoft.com/office/drawing/2014/main" id="{C244C637-E9B9-400D-9593-EE0BBAF80416}"/>
-              </a:ext>
-            </a:extLst>
-          </p:cNvPr>
-          <p:cNvSpPr/>
+            <a:endParaRPr lang="en-CH" sz="4400" dirty="0"/>
+          </a:p>
+        </p:txBody>
+      </p:sp>
+      <p:sp>
+        <p:nvSpPr>
+          <p:cNvPr id="5" name="TextBox 4">
+            <a:extLst>
+              <a:ext uri="{FF2B5EF4-FFF2-40B4-BE49-F238E27FC236}">
+                <a16:creationId xmlns:a16="http://schemas.microsoft.com/office/drawing/2014/main" id="{0DA00D32-F1F8-420F-B676-203673F7A812}"/>
+              </a:ext>
+            </a:extLst>
+          </p:cNvPr>
+          <p:cNvSpPr txBox="1"/>
           <p:nvPr/>
         </p:nvSpPr>
         <p:spPr>
-          <a:xfrm rot="1860278">
-            <a:off x="7074869" y="893210"/>
-            <a:ext cx="5091458" cy="2215991"/>
+          <a:xfrm>
+            <a:off x="88669" y="6035039"/>
+            <a:ext cx="3607724" cy="370706"/>
           </a:xfrm>
           <a:prstGeom prst="rect">
             <a:avLst/>
@@ -5011,42 +3984,23 @@
           <a:noFill/>
         </p:spPr>
         <p:txBody>
-          <a:bodyPr wrap="none" lIns="91440" tIns="45720" rIns="91440" bIns="45720">
+          <a:bodyPr wrap="square" rtlCol="0">
             <a:spAutoFit/>
           </a:bodyPr>
           <a:lstStyle/>
           <a:p>
-            <a:pPr algn="ctr"/>
-            <a:r>
-              <a:rPr lang="en-US" sz="13800" b="1" cap="none" spc="50" dirty="0">
-                <a:ln w="9525" cmpd="sng">
-                  <a:solidFill>
-                    <a:schemeClr val="accent1"/>
-                  </a:solidFill>
-                  <a:prstDash val="solid"/>
-                </a:ln>
-                <a:solidFill>
-                  <a:srgbClr val="70AD47">
-                    <a:tint val="1000"/>
-                  </a:srgbClr>
-                </a:solidFill>
-                <a:effectLst>
-                  <a:glow rad="38100">
-                    <a:schemeClr val="accent1">
-                      <a:alpha val="40000"/>
-                    </a:schemeClr>
-                  </a:glow>
-                </a:effectLst>
-              </a:rPr>
-              <a:t>DRAFT</a:t>
-            </a:r>
+            <a:r>
+              <a:rPr lang="de-CH" dirty="0"/>
+              <a:t>© U. Michelucci 2018</a:t>
+            </a:r>
+            <a:endParaRPr lang="LID4096" dirty="0"/>
           </a:p>
         </p:txBody>
       </p:sp>
     </p:spTree>
     <p:extLst>
       <p:ext uri="{BB962C8B-B14F-4D97-AF65-F5344CB8AC3E}">
-        <p14:creationId xmlns:p14="http://schemas.microsoft.com/office/powerpoint/2010/main" val="2133560038"/>
+        <p14:creationId xmlns:p14="http://schemas.microsoft.com/office/powerpoint/2010/main" val="572190113"/>
       </p:ext>
     </p:extLst>
   </p:cSld>
@@ -5110,7 +4064,7 @@
             </a:br>
             <a:r>
               <a:rPr lang="en-GB" sz="4400" b="1" dirty="0"/>
-              <a:t>Introduction to linear algebra and numpy/Python</a:t>
+              <a:t>Metric Analysis</a:t>
             </a:r>
             <a:endParaRPr lang="en-CH" sz="7200" dirty="0"/>
           </a:p>
@@ -5153,20 +4107,20 @@
       </p:sp>
       <p:sp>
         <p:nvSpPr>
-          <p:cNvPr id="4" name="Rectangle 3">
-            <a:extLst>
-              <a:ext uri="{FF2B5EF4-FFF2-40B4-BE49-F238E27FC236}">
-                <a16:creationId xmlns:a16="http://schemas.microsoft.com/office/drawing/2014/main" id="{C665487A-5970-4341-9643-B40161BEE978}"/>
-              </a:ext>
-            </a:extLst>
-          </p:cNvPr>
-          <p:cNvSpPr/>
+          <p:cNvPr id="5" name="TextBox 4">
+            <a:extLst>
+              <a:ext uri="{FF2B5EF4-FFF2-40B4-BE49-F238E27FC236}">
+                <a16:creationId xmlns:a16="http://schemas.microsoft.com/office/drawing/2014/main" id="{83E7470A-2CFD-4130-B39D-55049F6FD52C}"/>
+              </a:ext>
+            </a:extLst>
+          </p:cNvPr>
+          <p:cNvSpPr txBox="1"/>
           <p:nvPr/>
         </p:nvSpPr>
         <p:spPr>
-          <a:xfrm rot="1860278">
-            <a:off x="7074869" y="893210"/>
-            <a:ext cx="5091458" cy="2215991"/>
+          <a:xfrm>
+            <a:off x="88669" y="6035039"/>
+            <a:ext cx="3607724" cy="370706"/>
           </a:xfrm>
           <a:prstGeom prst="rect">
             <a:avLst/>
@@ -5174,42 +4128,23 @@
           <a:noFill/>
         </p:spPr>
         <p:txBody>
-          <a:bodyPr wrap="none" lIns="91440" tIns="45720" rIns="91440" bIns="45720">
+          <a:bodyPr wrap="square" rtlCol="0">
             <a:spAutoFit/>
           </a:bodyPr>
           <a:lstStyle/>
           <a:p>
-            <a:pPr algn="ctr"/>
-            <a:r>
-              <a:rPr lang="en-US" sz="13800" b="1" cap="none" spc="50" dirty="0">
-                <a:ln w="9525" cmpd="sng">
-                  <a:solidFill>
-                    <a:schemeClr val="accent1"/>
-                  </a:solidFill>
-                  <a:prstDash val="solid"/>
-                </a:ln>
-                <a:solidFill>
-                  <a:srgbClr val="70AD47">
-                    <a:tint val="1000"/>
-                  </a:srgbClr>
-                </a:solidFill>
-                <a:effectLst>
-                  <a:glow rad="38100">
-                    <a:schemeClr val="accent1">
-                      <a:alpha val="40000"/>
-                    </a:schemeClr>
-                  </a:glow>
-                </a:effectLst>
-              </a:rPr>
-              <a:t>DRAFT</a:t>
-            </a:r>
+            <a:r>
+              <a:rPr lang="de-CH" dirty="0"/>
+              <a:t>© U. Michelucci 2018</a:t>
+            </a:r>
+            <a:endParaRPr lang="LID4096" dirty="0"/>
           </a:p>
         </p:txBody>
       </p:sp>
     </p:spTree>
     <p:extLst>
       <p:ext uri="{BB962C8B-B14F-4D97-AF65-F5344CB8AC3E}">
-        <p14:creationId xmlns:p14="http://schemas.microsoft.com/office/powerpoint/2010/main" val="998844033"/>
+        <p14:creationId xmlns:p14="http://schemas.microsoft.com/office/powerpoint/2010/main" val="2324628795"/>
       </p:ext>
     </p:extLst>
   </p:cSld>
@@ -5289,7 +4224,7 @@
         </p:spPr>
         <p:txBody>
           <a:bodyPr>
-            <a:normAutofit lnSpcReduction="10000"/>
+            <a:normAutofit/>
           </a:bodyPr>
           <a:lstStyle/>
           <a:p>
@@ -5298,46 +4233,9 @@
               <a:buChar char="q"/>
             </a:pPr>
             <a:r>
-              <a:rPr lang="de-CH" dirty="0"/>
-              <a:t> The </a:t>
-            </a:r>
-            <a:r>
-              <a:rPr lang="de-CH" dirty="0" err="1"/>
-              <a:t>student</a:t>
-            </a:r>
-            <a:r>
-              <a:rPr lang="de-CH" dirty="0"/>
-              <a:t> is </a:t>
-            </a:r>
-            <a:r>
-              <a:rPr lang="de-CH" dirty="0" err="1"/>
-              <a:t>able</a:t>
-            </a:r>
-            <a:r>
-              <a:rPr lang="de-CH" dirty="0"/>
-              <a:t> to </a:t>
-            </a:r>
-            <a:r>
-              <a:rPr lang="de-CH" dirty="0" err="1"/>
-              <a:t>explain</a:t>
-            </a:r>
-            <a:r>
-              <a:rPr lang="de-CH" dirty="0"/>
-              <a:t> what is a </a:t>
-            </a:r>
-            <a:r>
-              <a:rPr lang="de-CH" dirty="0" err="1"/>
-              <a:t>vector</a:t>
-            </a:r>
-            <a:r>
-              <a:rPr lang="de-CH" dirty="0"/>
-              <a:t> and a </a:t>
-            </a:r>
-            <a:r>
-              <a:rPr lang="de-CH" dirty="0" err="1"/>
-              <a:t>matrix</a:t>
-            </a:r>
-            <a:endParaRPr lang="de-CH" dirty="0"/>
+              <a:rPr lang="de-CH" sz="4000" dirty="0"/>
+              <a:t> Human Level Performance</a:t>
+            </a:r>
           </a:p>
           <a:p>
             <a:pPr>
@@ -5345,78 +4243,22 @@
               <a:buChar char="q"/>
             </a:pPr>
             <a:r>
-              <a:rPr lang="de-CH" dirty="0"/>
-              <a:t> The </a:t>
-            </a:r>
-            <a:r>
-              <a:rPr lang="de-CH" dirty="0" err="1"/>
-              <a:t>student</a:t>
-            </a:r>
-            <a:r>
-              <a:rPr lang="de-CH" dirty="0"/>
-              <a:t> is </a:t>
-            </a:r>
-            <a:r>
-              <a:rPr lang="de-CH" dirty="0" err="1"/>
-              <a:t>able</a:t>
-            </a:r>
-            <a:r>
-              <a:rPr lang="de-CH" dirty="0"/>
-              <a:t> to </a:t>
-            </a:r>
-            <a:r>
-              <a:rPr lang="de-CH" dirty="0" err="1"/>
-              <a:t>understand</a:t>
-            </a:r>
-            <a:r>
-              <a:rPr lang="de-CH" dirty="0"/>
+              <a:rPr lang="de-CH" sz="4000" dirty="0"/>
+              <a:t> Training </a:t>
+            </a:r>
+            <a:r>
+              <a:rPr lang="de-CH" sz="4000" dirty="0" err="1"/>
+              <a:t>set</a:t>
+            </a:r>
+            <a:r>
+              <a:rPr lang="de-CH" sz="4000" dirty="0"/>
               <a:t> </a:t>
             </a:r>
             <a:r>
-              <a:rPr lang="de-CH" dirty="0" err="1"/>
-              <a:t>the</a:t>
-            </a:r>
-            <a:r>
-              <a:rPr lang="de-CH" dirty="0"/>
-              <a:t> </a:t>
-            </a:r>
-            <a:r>
-              <a:rPr lang="de-CH" dirty="0" err="1"/>
-              <a:t>main</a:t>
-            </a:r>
-            <a:r>
-              <a:rPr lang="de-CH" dirty="0"/>
-              <a:t> </a:t>
-            </a:r>
-            <a:r>
-              <a:rPr lang="de-CH" dirty="0" err="1"/>
-              <a:t>operations</a:t>
-            </a:r>
-            <a:r>
-              <a:rPr lang="de-CH" dirty="0"/>
-              <a:t> you </a:t>
-            </a:r>
-            <a:r>
-              <a:rPr lang="de-CH" dirty="0" err="1"/>
-              <a:t>can</a:t>
-            </a:r>
-            <a:r>
-              <a:rPr lang="de-CH" dirty="0"/>
-              <a:t> perform on a </a:t>
-            </a:r>
-            <a:r>
-              <a:rPr lang="de-CH" dirty="0" err="1"/>
-              <a:t>vector</a:t>
-            </a:r>
-            <a:r>
-              <a:rPr lang="de-CH" dirty="0"/>
-              <a:t> and a </a:t>
-            </a:r>
-            <a:r>
-              <a:rPr lang="de-CH" dirty="0" err="1"/>
-              <a:t>matrix</a:t>
-            </a:r>
-            <a:endParaRPr lang="de-CH" dirty="0"/>
+              <a:rPr lang="de-CH" sz="4000" dirty="0" err="1"/>
+              <a:t>overfitting</a:t>
+            </a:r>
+            <a:endParaRPr lang="de-CH" sz="4000" dirty="0"/>
           </a:p>
           <a:p>
             <a:pPr>
@@ -5424,65 +4266,30 @@
               <a:buChar char="q"/>
             </a:pPr>
             <a:r>
-              <a:rPr lang="de-CH" dirty="0"/>
-              <a:t> The </a:t>
-            </a:r>
-            <a:r>
-              <a:rPr lang="de-CH" dirty="0" err="1"/>
-              <a:t>student</a:t>
-            </a:r>
-            <a:r>
-              <a:rPr lang="de-CH" dirty="0"/>
-              <a:t> is </a:t>
-            </a:r>
-            <a:r>
-              <a:rPr lang="de-CH" dirty="0" err="1"/>
-              <a:t>able</a:t>
-            </a:r>
-            <a:r>
-              <a:rPr lang="de-CH" dirty="0"/>
-              <a:t> to </a:t>
-            </a:r>
-            <a:r>
-              <a:rPr lang="de-CH" dirty="0" err="1"/>
-              <a:t>implement</a:t>
-            </a:r>
-            <a:r>
-              <a:rPr lang="de-CH" dirty="0"/>
+              <a:rPr lang="de-CH" sz="4000" dirty="0"/>
               <a:t> </a:t>
             </a:r>
             <a:r>
-              <a:rPr lang="de-CH" dirty="0" err="1"/>
-              <a:t>the</a:t>
-            </a:r>
-            <a:r>
-              <a:rPr lang="de-CH" dirty="0"/>
+              <a:rPr lang="de-CH" sz="4000" dirty="0" err="1"/>
+              <a:t>Dev</a:t>
+            </a:r>
+            <a:r>
+              <a:rPr lang="de-CH" sz="4000" dirty="0"/>
               <a:t> </a:t>
             </a:r>
             <a:r>
-              <a:rPr lang="de-CH" dirty="0" err="1"/>
-              <a:t>main</a:t>
-            </a:r>
-            <a:r>
-              <a:rPr lang="de-CH" dirty="0"/>
+              <a:rPr lang="de-CH" sz="4000" dirty="0" err="1"/>
+              <a:t>set</a:t>
+            </a:r>
+            <a:r>
+              <a:rPr lang="de-CH" sz="4000" dirty="0"/>
               <a:t> </a:t>
             </a:r>
             <a:r>
-              <a:rPr lang="de-CH" dirty="0" err="1"/>
-              <a:t>operations</a:t>
-            </a:r>
-            <a:r>
-              <a:rPr lang="de-CH" dirty="0"/>
-              <a:t> in </a:t>
-            </a:r>
-            <a:r>
-              <a:rPr lang="de-CH" dirty="0" err="1"/>
-              <a:t>basic</a:t>
-            </a:r>
-            <a:r>
-              <a:rPr lang="de-CH" dirty="0"/>
-              <a:t> Python</a:t>
-            </a:r>
+              <a:rPr lang="de-CH" sz="4000" dirty="0" err="1"/>
+              <a:t>overfitting</a:t>
+            </a:r>
+            <a:endParaRPr lang="de-CH" sz="4000" dirty="0"/>
           </a:p>
           <a:p>
             <a:pPr>
@@ -5490,56 +4297,16 @@
               <a:buChar char="q"/>
             </a:pPr>
             <a:r>
-              <a:rPr lang="de-CH" dirty="0"/>
-              <a:t> The </a:t>
-            </a:r>
-            <a:r>
-              <a:rPr lang="de-CH" dirty="0" err="1"/>
-              <a:t>student</a:t>
-            </a:r>
-            <a:r>
-              <a:rPr lang="de-CH" dirty="0"/>
-              <a:t> is </a:t>
-            </a:r>
-            <a:r>
-              <a:rPr lang="de-CH" dirty="0" err="1"/>
-              <a:t>able</a:t>
-            </a:r>
-            <a:r>
-              <a:rPr lang="de-CH" dirty="0"/>
-              <a:t> to </a:t>
-            </a:r>
-            <a:r>
-              <a:rPr lang="de-CH" dirty="0" err="1"/>
-              <a:t>implement</a:t>
-            </a:r>
-            <a:r>
-              <a:rPr lang="de-CH" dirty="0"/>
+              <a:rPr lang="de-CH" sz="4000" dirty="0"/>
               <a:t> </a:t>
             </a:r>
             <a:r>
-              <a:rPr lang="de-CH" dirty="0" err="1"/>
-              <a:t>the</a:t>
-            </a:r>
-            <a:r>
-              <a:rPr lang="de-CH" dirty="0"/>
-              <a:t> </a:t>
-            </a:r>
-            <a:r>
-              <a:rPr lang="de-CH" dirty="0" err="1"/>
-              <a:t>main</a:t>
-            </a:r>
-            <a:r>
-              <a:rPr lang="de-CH" dirty="0"/>
-              <a:t> </a:t>
-            </a:r>
-            <a:r>
-              <a:rPr lang="de-CH" dirty="0" err="1"/>
-              <a:t>operations</a:t>
-            </a:r>
-            <a:r>
-              <a:rPr lang="de-CH" dirty="0"/>
-              <a:t> in numpy</a:t>
+              <a:rPr lang="de-CH" sz="4000" dirty="0" err="1"/>
+              <a:t>Unbalanced</a:t>
+            </a:r>
+            <a:r>
+              <a:rPr lang="de-CH" sz="4000" dirty="0"/>
+              <a:t> Class Distribution</a:t>
             </a:r>
           </a:p>
           <a:p>
@@ -5548,62 +4315,14 @@
               <a:buChar char="q"/>
             </a:pPr>
             <a:r>
-              <a:rPr lang="de-CH" dirty="0"/>
-              <a:t> The </a:t>
-            </a:r>
-            <a:r>
-              <a:rPr lang="de-CH" dirty="0" err="1"/>
-              <a:t>student</a:t>
-            </a:r>
-            <a:r>
-              <a:rPr lang="de-CH" dirty="0"/>
-              <a:t> is </a:t>
-            </a:r>
-            <a:r>
-              <a:rPr lang="de-CH" dirty="0" err="1"/>
-              <a:t>able</a:t>
-            </a:r>
-            <a:r>
-              <a:rPr lang="de-CH" dirty="0"/>
-              <a:t> to </a:t>
-            </a:r>
-            <a:r>
-              <a:rPr lang="de-CH" dirty="0" err="1"/>
-              <a:t>understand</a:t>
-            </a:r>
-            <a:r>
-              <a:rPr lang="de-CH" dirty="0"/>
-              <a:t> </a:t>
-            </a:r>
-            <a:r>
-              <a:rPr lang="de-CH" dirty="0" err="1"/>
-              <a:t>the</a:t>
-            </a:r>
-            <a:r>
-              <a:rPr lang="de-CH" dirty="0"/>
-              <a:t> </a:t>
-            </a:r>
-            <a:r>
-              <a:rPr lang="de-CH" dirty="0" err="1"/>
-              <a:t>difference</a:t>
-            </a:r>
-            <a:r>
-              <a:rPr lang="de-CH" dirty="0"/>
-              <a:t> in how numpy </a:t>
-            </a:r>
-            <a:r>
-              <a:rPr lang="de-CH" dirty="0" err="1"/>
-              <a:t>operates</a:t>
-            </a:r>
-            <a:r>
-              <a:rPr lang="de-CH" dirty="0"/>
-              <a:t> on </a:t>
-            </a:r>
-            <a:r>
-              <a:rPr lang="de-CH" dirty="0" err="1"/>
-              <a:t>arrays</a:t>
-            </a:r>
-            <a:endParaRPr lang="de-CH" dirty="0"/>
+              <a:rPr lang="de-CH" sz="4000" dirty="0"/>
+              <a:t> Precision, Recall and F1 </a:t>
+            </a:r>
+            <a:r>
+              <a:rPr lang="de-CH" sz="4000" dirty="0" err="1"/>
+              <a:t>metrics</a:t>
+            </a:r>
+            <a:endParaRPr lang="de-CH" sz="4000" dirty="0"/>
           </a:p>
           <a:p>
             <a:pPr>
@@ -5611,111 +4330,47 @@
               <a:buChar char="q"/>
             </a:pPr>
             <a:r>
-              <a:rPr lang="de-CH" dirty="0"/>
-              <a:t> The </a:t>
-            </a:r>
-            <a:r>
-              <a:rPr lang="de-CH" dirty="0" err="1"/>
-              <a:t>student</a:t>
-            </a:r>
-            <a:r>
-              <a:rPr lang="de-CH" dirty="0"/>
-              <a:t> is </a:t>
-            </a:r>
-            <a:r>
-              <a:rPr lang="de-CH" dirty="0" err="1"/>
-              <a:t>able</a:t>
-            </a:r>
-            <a:r>
-              <a:rPr lang="de-CH" dirty="0"/>
-              <a:t> to </a:t>
-            </a:r>
-            <a:r>
-              <a:rPr lang="de-CH" dirty="0" err="1"/>
-              <a:t>use</a:t>
-            </a:r>
-            <a:r>
-              <a:rPr lang="de-CH" dirty="0"/>
+              <a:rPr lang="de-CH" sz="4000" dirty="0"/>
+              <a:t> k-fold </a:t>
+            </a:r>
+            <a:r>
+              <a:rPr lang="de-CH" sz="4000" dirty="0" err="1"/>
+              <a:t>cross</a:t>
+            </a:r>
+            <a:r>
+              <a:rPr lang="de-CH" sz="4000" dirty="0"/>
               <a:t> </a:t>
             </a:r>
             <a:r>
-              <a:rPr lang="de-CH" dirty="0" err="1"/>
-              <a:t>the</a:t>
-            </a:r>
-            <a:r>
-              <a:rPr lang="de-CH" dirty="0"/>
-              <a:t> </a:t>
-            </a:r>
-            <a:r>
-              <a:rPr lang="de-CH" dirty="0" err="1"/>
-              <a:t>concepts</a:t>
-            </a:r>
-            <a:r>
-              <a:rPr lang="de-CH" dirty="0"/>
-              <a:t> to </a:t>
-            </a:r>
-            <a:r>
-              <a:rPr lang="de-CH" dirty="0" err="1"/>
-              <a:t>implement</a:t>
-            </a:r>
-            <a:r>
-              <a:rPr lang="de-CH" dirty="0"/>
-              <a:t> a </a:t>
-            </a:r>
-            <a:r>
-              <a:rPr lang="de-CH" dirty="0" err="1"/>
-              <a:t>complete</a:t>
-            </a:r>
-            <a:r>
-              <a:rPr lang="de-CH" dirty="0"/>
-              <a:t> linear </a:t>
-            </a:r>
-            <a:r>
-              <a:rPr lang="de-CH" dirty="0" err="1"/>
-              <a:t>regression</a:t>
-            </a:r>
-            <a:r>
-              <a:rPr lang="de-CH" dirty="0"/>
-              <a:t> </a:t>
-            </a:r>
-            <a:r>
-              <a:rPr lang="de-CH" dirty="0" err="1"/>
-              <a:t>model</a:t>
-            </a:r>
-            <a:r>
-              <a:rPr lang="de-CH" dirty="0"/>
-              <a:t> from </a:t>
-            </a:r>
-            <a:r>
-              <a:rPr lang="de-CH" dirty="0" err="1"/>
-              <a:t>scratch</a:t>
-            </a:r>
-            <a:endParaRPr lang="de-CH" dirty="0"/>
+              <a:rPr lang="de-CH" sz="4000" dirty="0" err="1"/>
+              <a:t>validation</a:t>
+            </a:r>
+            <a:endParaRPr lang="de-CH" sz="4000" dirty="0"/>
           </a:p>
           <a:p>
             <a:pPr marL="0" indent="0">
               <a:buNone/>
             </a:pPr>
-            <a:endParaRPr lang="en-CH" dirty="0"/>
-          </a:p>
-        </p:txBody>
-      </p:sp>
-      <p:sp>
-        <p:nvSpPr>
-          <p:cNvPr id="4" name="Rectangle 3">
-            <a:extLst>
-              <a:ext uri="{FF2B5EF4-FFF2-40B4-BE49-F238E27FC236}">
-                <a16:creationId xmlns:a16="http://schemas.microsoft.com/office/drawing/2014/main" id="{F84EFA5F-0D3C-49FE-9276-D3723F163B30}"/>
-              </a:ext>
-            </a:extLst>
-          </p:cNvPr>
-          <p:cNvSpPr/>
+            <a:endParaRPr lang="en-CH" sz="4000" dirty="0"/>
+          </a:p>
+        </p:txBody>
+      </p:sp>
+      <p:sp>
+        <p:nvSpPr>
+          <p:cNvPr id="5" name="TextBox 4">
+            <a:extLst>
+              <a:ext uri="{FF2B5EF4-FFF2-40B4-BE49-F238E27FC236}">
+                <a16:creationId xmlns:a16="http://schemas.microsoft.com/office/drawing/2014/main" id="{CE61F457-8086-4561-A372-24EADCC61705}"/>
+              </a:ext>
+            </a:extLst>
+          </p:cNvPr>
+          <p:cNvSpPr txBox="1"/>
           <p:nvPr/>
         </p:nvSpPr>
         <p:spPr>
-          <a:xfrm rot="1860278">
-            <a:off x="7074869" y="893210"/>
-            <a:ext cx="5091458" cy="2215991"/>
+          <a:xfrm>
+            <a:off x="88669" y="6035039"/>
+            <a:ext cx="3607724" cy="370706"/>
           </a:xfrm>
           <a:prstGeom prst="rect">
             <a:avLst/>
@@ -5723,42 +4378,23 @@
           <a:noFill/>
         </p:spPr>
         <p:txBody>
-          <a:bodyPr wrap="none" lIns="91440" tIns="45720" rIns="91440" bIns="45720">
+          <a:bodyPr wrap="square" rtlCol="0">
             <a:spAutoFit/>
           </a:bodyPr>
           <a:lstStyle/>
           <a:p>
-            <a:pPr algn="ctr"/>
-            <a:r>
-              <a:rPr lang="en-US" sz="13800" b="1" cap="none" spc="50" dirty="0">
-                <a:ln w="9525" cmpd="sng">
-                  <a:solidFill>
-                    <a:schemeClr val="accent1"/>
-                  </a:solidFill>
-                  <a:prstDash val="solid"/>
-                </a:ln>
-                <a:solidFill>
-                  <a:srgbClr val="70AD47">
-                    <a:tint val="1000"/>
-                  </a:srgbClr>
-                </a:solidFill>
-                <a:effectLst>
-                  <a:glow rad="38100">
-                    <a:schemeClr val="accent1">
-                      <a:alpha val="40000"/>
-                    </a:schemeClr>
-                  </a:glow>
-                </a:effectLst>
-              </a:rPr>
-              <a:t>DRAFT</a:t>
-            </a:r>
+            <a:r>
+              <a:rPr lang="de-CH" dirty="0"/>
+              <a:t>© U. Michelucci 2018</a:t>
+            </a:r>
+            <a:endParaRPr lang="LID4096" dirty="0"/>
           </a:p>
         </p:txBody>
       </p:sp>
     </p:spTree>
     <p:extLst>
       <p:ext uri="{BB962C8B-B14F-4D97-AF65-F5344CB8AC3E}">
-        <p14:creationId xmlns:p14="http://schemas.microsoft.com/office/powerpoint/2010/main" val="1549642585"/>
+        <p14:creationId xmlns:p14="http://schemas.microsoft.com/office/powerpoint/2010/main" val="2133560038"/>
       </p:ext>
     </p:extLst>
   </p:cSld>
@@ -5822,7 +4458,7 @@
             </a:br>
             <a:r>
               <a:rPr lang="en-GB" sz="4400" b="1" dirty="0"/>
-              <a:t>Introduction to linear algebra and numpy/Python</a:t>
+              <a:t>Hyperparameter Tuning</a:t>
             </a:r>
             <a:endParaRPr lang="en-CH" sz="7200" dirty="0"/>
           </a:p>
@@ -5865,20 +4501,20 @@
       </p:sp>
       <p:sp>
         <p:nvSpPr>
-          <p:cNvPr id="4" name="Rectangle 3">
-            <a:extLst>
-              <a:ext uri="{FF2B5EF4-FFF2-40B4-BE49-F238E27FC236}">
-                <a16:creationId xmlns:a16="http://schemas.microsoft.com/office/drawing/2014/main" id="{1D20AA5C-39DA-4A82-BC8F-361686137D09}"/>
-              </a:ext>
-            </a:extLst>
-          </p:cNvPr>
-          <p:cNvSpPr/>
+          <p:cNvPr id="5" name="TextBox 4">
+            <a:extLst>
+              <a:ext uri="{FF2B5EF4-FFF2-40B4-BE49-F238E27FC236}">
+                <a16:creationId xmlns:a16="http://schemas.microsoft.com/office/drawing/2014/main" id="{B312A011-C688-432E-941D-5C10CF25D9FE}"/>
+              </a:ext>
+            </a:extLst>
+          </p:cNvPr>
+          <p:cNvSpPr txBox="1"/>
           <p:nvPr/>
         </p:nvSpPr>
         <p:spPr>
-          <a:xfrm rot="1860278">
-            <a:off x="7074869" y="893210"/>
-            <a:ext cx="5091458" cy="2215991"/>
+          <a:xfrm>
+            <a:off x="88669" y="6035039"/>
+            <a:ext cx="3607724" cy="370706"/>
           </a:xfrm>
           <a:prstGeom prst="rect">
             <a:avLst/>
@@ -5886,42 +4522,23 @@
           <a:noFill/>
         </p:spPr>
         <p:txBody>
-          <a:bodyPr wrap="none" lIns="91440" tIns="45720" rIns="91440" bIns="45720">
+          <a:bodyPr wrap="square" rtlCol="0">
             <a:spAutoFit/>
           </a:bodyPr>
           <a:lstStyle/>
           <a:p>
-            <a:pPr algn="ctr"/>
-            <a:r>
-              <a:rPr lang="en-US" sz="13800" b="1" cap="none" spc="50" dirty="0">
-                <a:ln w="9525" cmpd="sng">
-                  <a:solidFill>
-                    <a:schemeClr val="accent1"/>
-                  </a:solidFill>
-                  <a:prstDash val="solid"/>
-                </a:ln>
-                <a:solidFill>
-                  <a:srgbClr val="70AD47">
-                    <a:tint val="1000"/>
-                  </a:srgbClr>
-                </a:solidFill>
-                <a:effectLst>
-                  <a:glow rad="38100">
-                    <a:schemeClr val="accent1">
-                      <a:alpha val="40000"/>
-                    </a:schemeClr>
-                  </a:glow>
-                </a:effectLst>
-              </a:rPr>
-              <a:t>DRAFT</a:t>
-            </a:r>
+            <a:r>
+              <a:rPr lang="de-CH" dirty="0"/>
+              <a:t>© U. Michelucci 2018</a:t>
+            </a:r>
+            <a:endParaRPr lang="LID4096" dirty="0"/>
           </a:p>
         </p:txBody>
       </p:sp>
     </p:spTree>
     <p:extLst>
       <p:ext uri="{BB962C8B-B14F-4D97-AF65-F5344CB8AC3E}">
-        <p14:creationId xmlns:p14="http://schemas.microsoft.com/office/powerpoint/2010/main" val="1297009121"/>
+        <p14:creationId xmlns:p14="http://schemas.microsoft.com/office/powerpoint/2010/main" val="998844033"/>
       </p:ext>
     </p:extLst>
   </p:cSld>
@@ -6001,7 +4618,7 @@
         </p:spPr>
         <p:txBody>
           <a:bodyPr>
-            <a:normAutofit lnSpcReduction="10000"/>
+            <a:normAutofit/>
           </a:bodyPr>
           <a:lstStyle/>
           <a:p>
@@ -6010,46 +4627,14 @@
               <a:buChar char="q"/>
             </a:pPr>
             <a:r>
-              <a:rPr lang="de-CH" dirty="0"/>
-              <a:t> The </a:t>
-            </a:r>
-            <a:r>
-              <a:rPr lang="de-CH" dirty="0" err="1"/>
-              <a:t>student</a:t>
-            </a:r>
-            <a:r>
-              <a:rPr lang="de-CH" dirty="0"/>
-              <a:t> is </a:t>
-            </a:r>
-            <a:r>
-              <a:rPr lang="de-CH" dirty="0" err="1"/>
-              <a:t>able</a:t>
-            </a:r>
-            <a:r>
-              <a:rPr lang="de-CH" dirty="0"/>
-              <a:t> to </a:t>
-            </a:r>
-            <a:r>
-              <a:rPr lang="de-CH" dirty="0" err="1"/>
-              <a:t>explain</a:t>
-            </a:r>
-            <a:r>
-              <a:rPr lang="de-CH" dirty="0"/>
-              <a:t> what is a </a:t>
-            </a:r>
-            <a:r>
-              <a:rPr lang="de-CH" dirty="0" err="1"/>
-              <a:t>vector</a:t>
-            </a:r>
-            <a:r>
-              <a:rPr lang="de-CH" dirty="0"/>
-              <a:t> and a </a:t>
-            </a:r>
-            <a:r>
-              <a:rPr lang="de-CH" dirty="0" err="1"/>
-              <a:t>matrix</a:t>
-            </a:r>
-            <a:endParaRPr lang="de-CH" dirty="0"/>
+              <a:rPr lang="de-CH" sz="4800" dirty="0"/>
+              <a:t> Black-box optimisation </a:t>
+            </a:r>
+            <a:r>
+              <a:rPr lang="de-CH" sz="4800" dirty="0" err="1"/>
+              <a:t>problems</a:t>
+            </a:r>
+            <a:endParaRPr lang="de-CH" sz="4800" dirty="0"/>
           </a:p>
           <a:p>
             <a:pPr>
@@ -6057,78 +4642,9 @@
               <a:buChar char="q"/>
             </a:pPr>
             <a:r>
-              <a:rPr lang="de-CH" dirty="0"/>
-              <a:t> The </a:t>
-            </a:r>
-            <a:r>
-              <a:rPr lang="de-CH" dirty="0" err="1"/>
-              <a:t>student</a:t>
-            </a:r>
-            <a:r>
-              <a:rPr lang="de-CH" dirty="0"/>
-              <a:t> is </a:t>
-            </a:r>
-            <a:r>
-              <a:rPr lang="de-CH" dirty="0" err="1"/>
-              <a:t>able</a:t>
-            </a:r>
-            <a:r>
-              <a:rPr lang="de-CH" dirty="0"/>
-              <a:t> to </a:t>
-            </a:r>
-            <a:r>
-              <a:rPr lang="de-CH" dirty="0" err="1"/>
-              <a:t>understand</a:t>
-            </a:r>
-            <a:r>
-              <a:rPr lang="de-CH" dirty="0"/>
-              <a:t> </a:t>
-            </a:r>
-            <a:r>
-              <a:rPr lang="de-CH" dirty="0" err="1"/>
-              <a:t>the</a:t>
-            </a:r>
-            <a:r>
-              <a:rPr lang="de-CH" dirty="0"/>
-              <a:t> </a:t>
-            </a:r>
-            <a:r>
-              <a:rPr lang="de-CH" dirty="0" err="1"/>
-              <a:t>main</a:t>
-            </a:r>
-            <a:r>
-              <a:rPr lang="de-CH" dirty="0"/>
-              <a:t> </a:t>
-            </a:r>
-            <a:r>
-              <a:rPr lang="de-CH" dirty="0" err="1"/>
-              <a:t>operations</a:t>
-            </a:r>
-            <a:r>
-              <a:rPr lang="de-CH" dirty="0"/>
-              <a:t> you </a:t>
-            </a:r>
-            <a:r>
-              <a:rPr lang="de-CH" dirty="0" err="1"/>
-              <a:t>can</a:t>
-            </a:r>
-            <a:r>
-              <a:rPr lang="de-CH" dirty="0"/>
-              <a:t> perform on a </a:t>
-            </a:r>
-            <a:r>
-              <a:rPr lang="de-CH" dirty="0" err="1"/>
-              <a:t>vector</a:t>
-            </a:r>
-            <a:r>
-              <a:rPr lang="de-CH" dirty="0"/>
-              <a:t> and a </a:t>
-            </a:r>
-            <a:r>
-              <a:rPr lang="de-CH" dirty="0" err="1"/>
-              <a:t>matrix</a:t>
-            </a:r>
-            <a:endParaRPr lang="de-CH" dirty="0"/>
+              <a:rPr lang="de-CH" sz="4800" dirty="0"/>
+              <a:t> Grid Search</a:t>
+            </a:r>
           </a:p>
           <a:p>
             <a:pPr>
@@ -6136,64 +4652,8 @@
               <a:buChar char="q"/>
             </a:pPr>
             <a:r>
-              <a:rPr lang="de-CH" dirty="0"/>
-              <a:t> The </a:t>
-            </a:r>
-            <a:r>
-              <a:rPr lang="de-CH" dirty="0" err="1"/>
-              <a:t>student</a:t>
-            </a:r>
-            <a:r>
-              <a:rPr lang="de-CH" dirty="0"/>
-              <a:t> is </a:t>
-            </a:r>
-            <a:r>
-              <a:rPr lang="de-CH" dirty="0" err="1"/>
-              <a:t>able</a:t>
-            </a:r>
-            <a:r>
-              <a:rPr lang="de-CH" dirty="0"/>
-              <a:t> to </a:t>
-            </a:r>
-            <a:r>
-              <a:rPr lang="de-CH" dirty="0" err="1"/>
-              <a:t>implement</a:t>
-            </a:r>
-            <a:r>
-              <a:rPr lang="de-CH" dirty="0"/>
-              <a:t> </a:t>
-            </a:r>
-            <a:r>
-              <a:rPr lang="de-CH" dirty="0" err="1"/>
-              <a:t>the</a:t>
-            </a:r>
-            <a:r>
-              <a:rPr lang="de-CH" dirty="0"/>
-              <a:t> </a:t>
-            </a:r>
-            <a:r>
-              <a:rPr lang="de-CH" dirty="0" err="1"/>
-              <a:t>main</a:t>
-            </a:r>
-            <a:r>
-              <a:rPr lang="de-CH" dirty="0"/>
-              <a:t> </a:t>
-            </a:r>
-            <a:r>
-              <a:rPr lang="de-CH" dirty="0" err="1"/>
-              <a:t>operations</a:t>
-            </a:r>
-            <a:r>
-              <a:rPr lang="de-CH" dirty="0"/>
-              <a:t> in </a:t>
-            </a:r>
-            <a:r>
-              <a:rPr lang="de-CH" dirty="0" err="1"/>
-              <a:t>basic</a:t>
-            </a:r>
-            <a:r>
-              <a:rPr lang="de-CH" dirty="0"/>
-              <a:t> Python</a:t>
+              <a:rPr lang="de-CH" sz="4800" dirty="0"/>
+              <a:t> Random Search</a:t>
             </a:r>
           </a:p>
           <a:p>
@@ -6202,232 +4662,34 @@
               <a:buChar char="q"/>
             </a:pPr>
             <a:r>
-              <a:rPr lang="de-CH" dirty="0"/>
-              <a:t> The </a:t>
-            </a:r>
-            <a:r>
-              <a:rPr lang="de-CH" dirty="0" err="1"/>
-              <a:t>student</a:t>
-            </a:r>
-            <a:r>
-              <a:rPr lang="de-CH" dirty="0"/>
-              <a:t> is </a:t>
-            </a:r>
-            <a:r>
-              <a:rPr lang="de-CH" dirty="0" err="1"/>
-              <a:t>able</a:t>
-            </a:r>
-            <a:r>
-              <a:rPr lang="de-CH" dirty="0"/>
-              <a:t> to </a:t>
-            </a:r>
-            <a:r>
-              <a:rPr lang="de-CH" dirty="0" err="1"/>
-              <a:t>implement</a:t>
-            </a:r>
-            <a:r>
-              <a:rPr lang="de-CH" dirty="0"/>
-              <a:t> </a:t>
-            </a:r>
-            <a:r>
-              <a:rPr lang="de-CH" dirty="0" err="1"/>
-              <a:t>the</a:t>
-            </a:r>
-            <a:r>
-              <a:rPr lang="de-CH" dirty="0"/>
-              <a:t> </a:t>
-            </a:r>
-            <a:r>
-              <a:rPr lang="de-CH" dirty="0" err="1"/>
-              <a:t>main</a:t>
-            </a:r>
-            <a:r>
-              <a:rPr lang="de-CH" dirty="0"/>
-              <a:t> </a:t>
-            </a:r>
-            <a:r>
-              <a:rPr lang="de-CH" dirty="0" err="1"/>
-              <a:t>operations</a:t>
-            </a:r>
-            <a:r>
-              <a:rPr lang="de-CH" dirty="0"/>
-              <a:t> in numpy</a:t>
-            </a:r>
-          </a:p>
-          <a:p>
-            <a:pPr>
-              <a:buFont typeface="Wingdings" panose="05000000000000000000" pitchFamily="2" charset="2"/>
-              <a:buChar char="q"/>
+              <a:rPr lang="de-CH" sz="4800" dirty="0"/>
+              <a:t> Bayesian Optimisation</a:t>
+            </a:r>
+          </a:p>
+          <a:p>
+            <a:pPr marL="0" indent="0">
+              <a:buNone/>
             </a:pPr>
-            <a:r>
-              <a:rPr lang="de-CH" dirty="0"/>
-              <a:t> The </a:t>
-            </a:r>
-            <a:r>
-              <a:rPr lang="de-CH" dirty="0" err="1"/>
-              <a:t>student</a:t>
-            </a:r>
-            <a:r>
-              <a:rPr lang="de-CH" dirty="0"/>
-              <a:t> is </a:t>
-            </a:r>
-            <a:r>
-              <a:rPr lang="de-CH" dirty="0" err="1"/>
-              <a:t>able</a:t>
-            </a:r>
-            <a:r>
-              <a:rPr lang="de-CH" dirty="0"/>
-              <a:t> to </a:t>
-            </a:r>
-            <a:r>
-              <a:rPr lang="de-CH" dirty="0" err="1"/>
-              <a:t>understand</a:t>
-            </a:r>
-            <a:r>
-              <a:rPr lang="de-CH" dirty="0"/>
-              <a:t> </a:t>
-            </a:r>
-            <a:r>
-              <a:rPr lang="de-CH" dirty="0" err="1"/>
-              <a:t>the</a:t>
-            </a:r>
-            <a:r>
-              <a:rPr lang="de-CH" dirty="0"/>
-              <a:t> </a:t>
-            </a:r>
-            <a:r>
-              <a:rPr lang="de-CH" dirty="0" err="1"/>
-              <a:t>difference</a:t>
-            </a:r>
-            <a:r>
-              <a:rPr lang="de-CH" dirty="0"/>
-              <a:t> in how numpy </a:t>
-            </a:r>
-            <a:r>
-              <a:rPr lang="de-CH" dirty="0" err="1"/>
-              <a:t>operates</a:t>
-            </a:r>
-            <a:r>
-              <a:rPr lang="de-CH" dirty="0"/>
-              <a:t> on </a:t>
-            </a:r>
-            <a:r>
-              <a:rPr lang="de-CH" dirty="0" err="1"/>
-              <a:t>arrays</a:t>
-            </a:r>
-            <a:endParaRPr lang="de-CH" dirty="0"/>
-          </a:p>
-          <a:p>
-            <a:pPr>
-              <a:buFont typeface="Wingdings" panose="05000000000000000000" pitchFamily="2" charset="2"/>
-              <a:buChar char="q"/>
-            </a:pPr>
-            <a:r>
-              <a:rPr lang="de-CH" dirty="0"/>
-              <a:t> The </a:t>
-            </a:r>
-            <a:r>
-              <a:rPr lang="de-CH" dirty="0" err="1"/>
-              <a:t>student</a:t>
-            </a:r>
-            <a:r>
-              <a:rPr lang="de-CH" dirty="0"/>
-              <a:t> is </a:t>
-            </a:r>
-            <a:r>
-              <a:rPr lang="de-CH" dirty="0" err="1"/>
-              <a:t>able</a:t>
-            </a:r>
-            <a:r>
-              <a:rPr lang="de-CH" dirty="0"/>
-              <a:t> to </a:t>
-            </a:r>
-            <a:r>
-              <a:rPr lang="de-CH" dirty="0" err="1"/>
-              <a:t>use</a:t>
-            </a:r>
-            <a:r>
-              <a:rPr lang="de-CH" dirty="0"/>
-              <a:t> </a:t>
-            </a:r>
-            <a:r>
-              <a:rPr lang="de-CH" dirty="0" err="1"/>
-              <a:t>the</a:t>
-            </a:r>
-            <a:r>
-              <a:rPr lang="de-CH" dirty="0"/>
-              <a:t> </a:t>
-            </a:r>
-            <a:r>
-              <a:rPr lang="de-CH" dirty="0" err="1"/>
-              <a:t>concepts</a:t>
-            </a:r>
-            <a:r>
-              <a:rPr lang="de-CH" dirty="0"/>
-              <a:t> to </a:t>
-            </a:r>
-            <a:r>
-              <a:rPr lang="de-CH" dirty="0" err="1"/>
-              <a:t>implement</a:t>
-            </a:r>
-            <a:r>
-              <a:rPr lang="de-CH" dirty="0"/>
-              <a:t> a </a:t>
-            </a:r>
-            <a:r>
-              <a:rPr lang="de-CH" dirty="0" err="1"/>
-              <a:t>complete</a:t>
-            </a:r>
-            <a:r>
-              <a:rPr lang="de-CH" dirty="0"/>
-              <a:t> linear </a:t>
-            </a:r>
-            <a:r>
-              <a:rPr lang="de-CH" dirty="0" err="1"/>
-              <a:t>regression</a:t>
-            </a:r>
-            <a:r>
-              <a:rPr lang="de-CH" dirty="0"/>
-              <a:t> </a:t>
-            </a:r>
-            <a:r>
-              <a:rPr lang="de-CH" dirty="0" err="1"/>
-              <a:t>model</a:t>
-            </a:r>
-            <a:r>
-              <a:rPr lang="de-CH" dirty="0"/>
-              <a:t> from </a:t>
-            </a:r>
-            <a:r>
-              <a:rPr lang="de-CH" dirty="0" err="1"/>
-              <a:t>scratch</a:t>
-            </a:r>
-            <a:endParaRPr lang="de-CH" dirty="0"/>
-          </a:p>
-          <a:p>
-            <a:pPr marL="0" indent="0">
-              <a:buNone/>
-            </a:pPr>
-            <a:endParaRPr lang="en-CH" dirty="0"/>
-          </a:p>
-        </p:txBody>
-      </p:sp>
-      <p:sp>
-        <p:nvSpPr>
-          <p:cNvPr id="4" name="Rectangle 3">
-            <a:extLst>
-              <a:ext uri="{FF2B5EF4-FFF2-40B4-BE49-F238E27FC236}">
-                <a16:creationId xmlns:a16="http://schemas.microsoft.com/office/drawing/2014/main" id="{3CE3FFFD-2D07-4ADB-A976-4E4978CE5E80}"/>
-              </a:ext>
-            </a:extLst>
-          </p:cNvPr>
-          <p:cNvSpPr/>
+            <a:endParaRPr lang="en-CH" sz="4800" dirty="0"/>
+          </a:p>
+        </p:txBody>
+      </p:sp>
+      <p:sp>
+        <p:nvSpPr>
+          <p:cNvPr id="5" name="TextBox 4">
+            <a:extLst>
+              <a:ext uri="{FF2B5EF4-FFF2-40B4-BE49-F238E27FC236}">
+                <a16:creationId xmlns:a16="http://schemas.microsoft.com/office/drawing/2014/main" id="{C94CDAC2-6F07-4042-951E-9DEC8B0996CF}"/>
+              </a:ext>
+            </a:extLst>
+          </p:cNvPr>
+          <p:cNvSpPr txBox="1"/>
           <p:nvPr/>
         </p:nvSpPr>
         <p:spPr>
-          <a:xfrm rot="1860278">
-            <a:off x="7074869" y="893210"/>
-            <a:ext cx="5091458" cy="2215991"/>
+          <a:xfrm>
+            <a:off x="88669" y="6035039"/>
+            <a:ext cx="3607724" cy="370706"/>
           </a:xfrm>
           <a:prstGeom prst="rect">
             <a:avLst/>
@@ -6435,42 +4697,23 @@
           <a:noFill/>
         </p:spPr>
         <p:txBody>
-          <a:bodyPr wrap="none" lIns="91440" tIns="45720" rIns="91440" bIns="45720">
+          <a:bodyPr wrap="square" rtlCol="0">
             <a:spAutoFit/>
           </a:bodyPr>
           <a:lstStyle/>
           <a:p>
-            <a:pPr algn="ctr"/>
-            <a:r>
-              <a:rPr lang="en-US" sz="13800" b="1" cap="none" spc="50" dirty="0">
-                <a:ln w="9525" cmpd="sng">
-                  <a:solidFill>
-                    <a:schemeClr val="accent1"/>
-                  </a:solidFill>
-                  <a:prstDash val="solid"/>
-                </a:ln>
-                <a:solidFill>
-                  <a:srgbClr val="70AD47">
-                    <a:tint val="1000"/>
-                  </a:srgbClr>
-                </a:solidFill>
-                <a:effectLst>
-                  <a:glow rad="38100">
-                    <a:schemeClr val="accent1">
-                      <a:alpha val="40000"/>
-                    </a:schemeClr>
-                  </a:glow>
-                </a:effectLst>
-              </a:rPr>
-              <a:t>DRAFT</a:t>
-            </a:r>
+            <a:r>
+              <a:rPr lang="de-CH" dirty="0"/>
+              <a:t>© U. Michelucci 2018</a:t>
+            </a:r>
+            <a:endParaRPr lang="LID4096" dirty="0"/>
           </a:p>
         </p:txBody>
       </p:sp>
     </p:spTree>
     <p:extLst>
       <p:ext uri="{BB962C8B-B14F-4D97-AF65-F5344CB8AC3E}">
-        <p14:creationId xmlns:p14="http://schemas.microsoft.com/office/powerpoint/2010/main" val="2853259451"/>
+        <p14:creationId xmlns:p14="http://schemas.microsoft.com/office/powerpoint/2010/main" val="1549642585"/>
       </p:ext>
     </p:extLst>
   </p:cSld>
@@ -6572,6 +4815,42 @@
               <a:rPr lang="en-GB" sz="4000" b="1" dirty="0"/>
               <a:t>Learning Goals</a:t>
             </a:r>
+          </a:p>
+        </p:txBody>
+      </p:sp>
+      <p:sp>
+        <p:nvSpPr>
+          <p:cNvPr id="4" name="TextBox 3">
+            <a:extLst>
+              <a:ext uri="{FF2B5EF4-FFF2-40B4-BE49-F238E27FC236}">
+                <a16:creationId xmlns:a16="http://schemas.microsoft.com/office/drawing/2014/main" id="{1ACCA52F-F0BA-47DC-A92B-6DE89780DA9D}"/>
+              </a:ext>
+            </a:extLst>
+          </p:cNvPr>
+          <p:cNvSpPr txBox="1"/>
+          <p:nvPr/>
+        </p:nvSpPr>
+        <p:spPr>
+          <a:xfrm>
+            <a:off x="88669" y="6035039"/>
+            <a:ext cx="3607724" cy="370706"/>
+          </a:xfrm>
+          <a:prstGeom prst="rect">
+            <a:avLst/>
+          </a:prstGeom>
+          <a:noFill/>
+        </p:spPr>
+        <p:txBody>
+          <a:bodyPr wrap="square" rtlCol="0">
+            <a:spAutoFit/>
+          </a:bodyPr>
+          <a:lstStyle/>
+          <a:p>
+            <a:r>
+              <a:rPr lang="de-CH" dirty="0"/>
+              <a:t>© U. Michelucci 2018</a:t>
+            </a:r>
+            <a:endParaRPr lang="LID4096" dirty="0"/>
           </a:p>
         </p:txBody>
       </p:sp>
@@ -7069,6 +5348,42 @@
           </a:p>
         </p:txBody>
       </p:sp>
+      <p:sp>
+        <p:nvSpPr>
+          <p:cNvPr id="4" name="TextBox 3">
+            <a:extLst>
+              <a:ext uri="{FF2B5EF4-FFF2-40B4-BE49-F238E27FC236}">
+                <a16:creationId xmlns:a16="http://schemas.microsoft.com/office/drawing/2014/main" id="{71244BE7-6ED4-4B70-8ADB-8E29855055F5}"/>
+              </a:ext>
+            </a:extLst>
+          </p:cNvPr>
+          <p:cNvSpPr txBox="1"/>
+          <p:nvPr/>
+        </p:nvSpPr>
+        <p:spPr>
+          <a:xfrm>
+            <a:off x="88669" y="6035039"/>
+            <a:ext cx="3607724" cy="370706"/>
+          </a:xfrm>
+          <a:prstGeom prst="rect">
+            <a:avLst/>
+          </a:prstGeom>
+          <a:noFill/>
+        </p:spPr>
+        <p:txBody>
+          <a:bodyPr wrap="square" rtlCol="0">
+            <a:spAutoFit/>
+          </a:bodyPr>
+          <a:lstStyle/>
+          <a:p>
+            <a:r>
+              <a:rPr lang="de-CH" dirty="0"/>
+              <a:t>© U. Michelucci 2018</a:t>
+            </a:r>
+            <a:endParaRPr lang="LID4096" dirty="0"/>
+          </a:p>
+        </p:txBody>
+      </p:sp>
     </p:spTree>
     <p:extLst>
       <p:ext uri="{BB962C8B-B14F-4D97-AF65-F5344CB8AC3E}">
@@ -7136,7 +5451,7 @@
             </a:br>
             <a:r>
               <a:rPr lang="en-GB" sz="4400" b="1" dirty="0"/>
-              <a:t>Computational Graph and introduction to tensorflow</a:t>
+              <a:t>Data Visualisation &amp; ????</a:t>
             </a:r>
             <a:endParaRPr lang="en-CH" sz="7200" dirty="0"/>
           </a:p>
@@ -7177,10 +5492,101 @@
           </a:p>
         </p:txBody>
       </p:sp>
+      <p:sp>
+        <p:nvSpPr>
+          <p:cNvPr id="4" name="Rectangle 3">
+            <a:extLst>
+              <a:ext uri="{FF2B5EF4-FFF2-40B4-BE49-F238E27FC236}">
+                <a16:creationId xmlns:a16="http://schemas.microsoft.com/office/drawing/2014/main" id="{33539047-4AF9-454C-919D-FFF27B4EA885}"/>
+              </a:ext>
+            </a:extLst>
+          </p:cNvPr>
+          <p:cNvSpPr/>
+          <p:nvPr/>
+        </p:nvSpPr>
+        <p:spPr>
+          <a:xfrm rot="1860278">
+            <a:off x="7074869" y="898752"/>
+            <a:ext cx="5091458" cy="2215991"/>
+          </a:xfrm>
+          <a:prstGeom prst="rect">
+            <a:avLst/>
+          </a:prstGeom>
+          <a:noFill/>
+        </p:spPr>
+        <p:txBody>
+          <a:bodyPr wrap="none" lIns="91440" tIns="45720" rIns="91440" bIns="45720">
+            <a:spAutoFit/>
+          </a:bodyPr>
+          <a:lstStyle/>
+          <a:p>
+            <a:pPr algn="ctr"/>
+            <a:r>
+              <a:rPr lang="en-US" sz="13800" b="1" cap="none" spc="50" dirty="0">
+                <a:ln w="9525" cmpd="sng">
+                  <a:solidFill>
+                    <a:schemeClr val="accent1"/>
+                  </a:solidFill>
+                  <a:prstDash val="solid"/>
+                </a:ln>
+                <a:solidFill>
+                  <a:srgbClr val="70AD47">
+                    <a:tint val="1000"/>
+                  </a:srgbClr>
+                </a:solidFill>
+                <a:effectLst>
+                  <a:glow rad="38100">
+                    <a:schemeClr val="accent1">
+                      <a:alpha val="40000"/>
+                    </a:schemeClr>
+                  </a:glow>
+                </a:effectLst>
+              </a:rPr>
+              <a:t>DRAFT</a:t>
+            </a:r>
+          </a:p>
+        </p:txBody>
+      </p:sp>
+      <p:sp>
+        <p:nvSpPr>
+          <p:cNvPr id="5" name="TextBox 4">
+            <a:extLst>
+              <a:ext uri="{FF2B5EF4-FFF2-40B4-BE49-F238E27FC236}">
+                <a16:creationId xmlns:a16="http://schemas.microsoft.com/office/drawing/2014/main" id="{B16DFCB6-83EC-4208-8750-14CA2722B52D}"/>
+              </a:ext>
+            </a:extLst>
+          </p:cNvPr>
+          <p:cNvSpPr txBox="1"/>
+          <p:nvPr/>
+        </p:nvSpPr>
+        <p:spPr>
+          <a:xfrm>
+            <a:off x="88669" y="6035039"/>
+            <a:ext cx="3607724" cy="370706"/>
+          </a:xfrm>
+          <a:prstGeom prst="rect">
+            <a:avLst/>
+          </a:prstGeom>
+          <a:noFill/>
+        </p:spPr>
+        <p:txBody>
+          <a:bodyPr wrap="square" rtlCol="0">
+            <a:spAutoFit/>
+          </a:bodyPr>
+          <a:lstStyle/>
+          <a:p>
+            <a:r>
+              <a:rPr lang="de-CH" dirty="0"/>
+              <a:t>© U. Michelucci 2018</a:t>
+            </a:r>
+            <a:endParaRPr lang="LID4096" dirty="0"/>
+          </a:p>
+        </p:txBody>
+      </p:sp>
     </p:spTree>
     <p:extLst>
       <p:ext uri="{BB962C8B-B14F-4D97-AF65-F5344CB8AC3E}">
-        <p14:creationId xmlns:p14="http://schemas.microsoft.com/office/powerpoint/2010/main" val="95969742"/>
+        <p14:creationId xmlns:p14="http://schemas.microsoft.com/office/powerpoint/2010/main" val="193496867"/>
       </p:ext>
     </p:extLst>
   </p:cSld>
@@ -7270,96 +5676,57 @@
             </a:pPr>
             <a:r>
               <a:rPr lang="de-CH" dirty="0"/>
-              <a:t> The </a:t>
-            </a:r>
-            <a:r>
-              <a:rPr lang="de-CH" dirty="0" err="1"/>
-              <a:t>student</a:t>
-            </a:r>
-            <a:r>
-              <a:rPr lang="de-CH" dirty="0"/>
               <a:t> </a:t>
             </a:r>
-            <a:r>
-              <a:rPr lang="de-CH" dirty="0" err="1"/>
-              <a:t>understands</a:t>
-            </a:r>
-            <a:r>
-              <a:rPr lang="de-CH" dirty="0"/>
-              <a:t> </a:t>
-            </a:r>
-            <a:r>
-              <a:rPr lang="de-CH" dirty="0" err="1"/>
-              <a:t>the</a:t>
-            </a:r>
-            <a:r>
-              <a:rPr lang="de-CH" dirty="0"/>
-              <a:t> </a:t>
-            </a:r>
-            <a:r>
-              <a:rPr lang="en-GB" dirty="0"/>
-              <a:t>main components of a computational graph</a:t>
-            </a:r>
-          </a:p>
-          <a:p>
-            <a:pPr>
-              <a:buFont typeface="Wingdings" panose="05000000000000000000" pitchFamily="2" charset="2"/>
-              <a:buChar char="q"/>
-            </a:pPr>
-            <a:r>
-              <a:rPr lang="en-GB" dirty="0"/>
-              <a:t>The student can draw a computational graph from a formula</a:t>
-            </a:r>
-          </a:p>
-          <a:p>
-            <a:pPr>
-              <a:buFont typeface="Wingdings" panose="05000000000000000000" pitchFamily="2" charset="2"/>
-              <a:buChar char="q"/>
-            </a:pPr>
-            <a:r>
-              <a:rPr lang="en-GB" dirty="0"/>
-              <a:t>The student understand and can explain the difference between building and evaluating a computational graph</a:t>
-            </a:r>
-          </a:p>
-          <a:p>
-            <a:pPr>
-              <a:buFont typeface="Wingdings" panose="05000000000000000000" pitchFamily="2" charset="2"/>
-              <a:buChar char="q"/>
-            </a:pPr>
-            <a:r>
-              <a:rPr lang="en-GB" dirty="0"/>
-              <a:t>The student can implement easy computational graphs in Python and tensorflow</a:t>
-            </a:r>
-          </a:p>
-          <a:p>
-            <a:pPr>
-              <a:buFont typeface="Wingdings" panose="05000000000000000000" pitchFamily="2" charset="2"/>
-              <a:buChar char="q"/>
-            </a:pPr>
-            <a:r>
-              <a:rPr lang="en-GB" dirty="0"/>
-              <a:t>The student can evaluate easy computational graphs in Python and tensorflow</a:t>
-            </a:r>
-          </a:p>
-          <a:p>
-            <a:pPr>
-              <a:buFont typeface="Wingdings" panose="05000000000000000000" pitchFamily="2" charset="2"/>
-              <a:buChar char="q"/>
-            </a:pPr>
-            <a:endParaRPr lang="en-GB" dirty="0"/>
           </a:p>
           <a:p>
             <a:pPr marL="0" indent="0">
               <a:buNone/>
             </a:pPr>
             <a:endParaRPr lang="en-CH" dirty="0"/>
+          </a:p>
+        </p:txBody>
+      </p:sp>
+      <p:sp>
+        <p:nvSpPr>
+          <p:cNvPr id="4" name="TextBox 3">
+            <a:extLst>
+              <a:ext uri="{FF2B5EF4-FFF2-40B4-BE49-F238E27FC236}">
+                <a16:creationId xmlns:a16="http://schemas.microsoft.com/office/drawing/2014/main" id="{2768FCA2-B0BC-4323-8E2A-EDF8E0A179C8}"/>
+              </a:ext>
+            </a:extLst>
+          </p:cNvPr>
+          <p:cNvSpPr txBox="1"/>
+          <p:nvPr/>
+        </p:nvSpPr>
+        <p:spPr>
+          <a:xfrm>
+            <a:off x="88669" y="6035039"/>
+            <a:ext cx="3607724" cy="370706"/>
+          </a:xfrm>
+          <a:prstGeom prst="rect">
+            <a:avLst/>
+          </a:prstGeom>
+          <a:noFill/>
+        </p:spPr>
+        <p:txBody>
+          <a:bodyPr wrap="square" rtlCol="0">
+            <a:spAutoFit/>
+          </a:bodyPr>
+          <a:lstStyle/>
+          <a:p>
+            <a:r>
+              <a:rPr lang="de-CH" dirty="0"/>
+              <a:t>© U. Michelucci 2018</a:t>
+            </a:r>
+            <a:endParaRPr lang="LID4096" dirty="0"/>
           </a:p>
         </p:txBody>
       </p:sp>
     </p:spTree>
     <p:extLst>
       <p:ext uri="{BB962C8B-B14F-4D97-AF65-F5344CB8AC3E}">
-        <p14:creationId xmlns:p14="http://schemas.microsoft.com/office/powerpoint/2010/main" val="3966760769"/>
+        <p14:creationId xmlns:p14="http://schemas.microsoft.com/office/powerpoint/2010/main" val="1300813984"/>
       </p:ext>
     </p:extLst>
   </p:cSld>
@@ -7423,7 +5790,7 @@
             </a:br>
             <a:r>
               <a:rPr lang="en-GB" sz="4400" b="1" dirty="0"/>
-              <a:t>Introduction to linear algebra and numpy/Python</a:t>
+              <a:t>Computational Graph and introduction to tensorflow</a:t>
             </a:r>
             <a:endParaRPr lang="en-CH" sz="7200" dirty="0"/>
           </a:p>
@@ -7466,20 +5833,20 @@
       </p:sp>
       <p:sp>
         <p:nvSpPr>
-          <p:cNvPr id="4" name="Rectangle 3">
-            <a:extLst>
-              <a:ext uri="{FF2B5EF4-FFF2-40B4-BE49-F238E27FC236}">
-                <a16:creationId xmlns:a16="http://schemas.microsoft.com/office/drawing/2014/main" id="{16486709-16DE-4828-9247-BB6BC3378560}"/>
-              </a:ext>
-            </a:extLst>
-          </p:cNvPr>
-          <p:cNvSpPr/>
+          <p:cNvPr id="4" name="TextBox 3">
+            <a:extLst>
+              <a:ext uri="{FF2B5EF4-FFF2-40B4-BE49-F238E27FC236}">
+                <a16:creationId xmlns:a16="http://schemas.microsoft.com/office/drawing/2014/main" id="{CAF37ED3-886F-4A7F-ABF9-58B5A331B0D6}"/>
+              </a:ext>
+            </a:extLst>
+          </p:cNvPr>
+          <p:cNvSpPr txBox="1"/>
           <p:nvPr/>
         </p:nvSpPr>
         <p:spPr>
-          <a:xfrm rot="1860278">
-            <a:off x="7074869" y="898752"/>
-            <a:ext cx="5091458" cy="2215991"/>
+          <a:xfrm>
+            <a:off x="88669" y="6035039"/>
+            <a:ext cx="3607724" cy="370706"/>
           </a:xfrm>
           <a:prstGeom prst="rect">
             <a:avLst/>
@@ -7487,42 +5854,23 @@
           <a:noFill/>
         </p:spPr>
         <p:txBody>
-          <a:bodyPr wrap="none" lIns="91440" tIns="45720" rIns="91440" bIns="45720">
+          <a:bodyPr wrap="square" rtlCol="0">
             <a:spAutoFit/>
           </a:bodyPr>
           <a:lstStyle/>
           <a:p>
-            <a:pPr algn="ctr"/>
-            <a:r>
-              <a:rPr lang="en-US" sz="13800" b="1" cap="none" spc="50" dirty="0">
-                <a:ln w="9525" cmpd="sng">
-                  <a:solidFill>
-                    <a:schemeClr val="accent1"/>
-                  </a:solidFill>
-                  <a:prstDash val="solid"/>
-                </a:ln>
-                <a:solidFill>
-                  <a:srgbClr val="70AD47">
-                    <a:tint val="1000"/>
-                  </a:srgbClr>
-                </a:solidFill>
-                <a:effectLst>
-                  <a:glow rad="38100">
-                    <a:schemeClr val="accent1">
-                      <a:alpha val="40000"/>
-                    </a:schemeClr>
-                  </a:glow>
-                </a:effectLst>
-              </a:rPr>
-              <a:t>DRAFT</a:t>
-            </a:r>
+            <a:r>
+              <a:rPr lang="de-CH" dirty="0"/>
+              <a:t>© U. Michelucci 2018</a:t>
+            </a:r>
+            <a:endParaRPr lang="LID4096" dirty="0"/>
           </a:p>
         </p:txBody>
       </p:sp>
     </p:spTree>
     <p:extLst>
       <p:ext uri="{BB962C8B-B14F-4D97-AF65-F5344CB8AC3E}">
-        <p14:creationId xmlns:p14="http://schemas.microsoft.com/office/powerpoint/2010/main" val="3374944990"/>
+        <p14:creationId xmlns:p14="http://schemas.microsoft.com/office/powerpoint/2010/main" val="95969742"/>
       </p:ext>
     </p:extLst>
   </p:cSld>
@@ -7602,7 +5950,7 @@
         </p:spPr>
         <p:txBody>
           <a:bodyPr>
-            <a:normAutofit lnSpcReduction="10000"/>
+            <a:normAutofit/>
           </a:bodyPr>
           <a:lstStyle/>
           <a:p>
@@ -7612,45 +5960,16 @@
             </a:pPr>
             <a:r>
               <a:rPr lang="de-CH" dirty="0"/>
-              <a:t> The </a:t>
-            </a:r>
-            <a:r>
-              <a:rPr lang="de-CH" dirty="0" err="1"/>
-              <a:t>student</a:t>
-            </a:r>
-            <a:r>
-              <a:rPr lang="de-CH" dirty="0"/>
-              <a:t> is </a:t>
-            </a:r>
-            <a:r>
-              <a:rPr lang="de-CH" dirty="0" err="1"/>
-              <a:t>able</a:t>
-            </a:r>
-            <a:r>
-              <a:rPr lang="de-CH" dirty="0"/>
-              <a:t> to </a:t>
-            </a:r>
-            <a:r>
-              <a:rPr lang="de-CH" dirty="0" err="1"/>
-              <a:t>explain</a:t>
-            </a:r>
-            <a:r>
-              <a:rPr lang="de-CH" dirty="0"/>
-              <a:t> what is a </a:t>
-            </a:r>
-            <a:r>
-              <a:rPr lang="de-CH" dirty="0" err="1"/>
-              <a:t>vector</a:t>
-            </a:r>
-            <a:r>
-              <a:rPr lang="de-CH" dirty="0"/>
-              <a:t> and a </a:t>
-            </a:r>
-            <a:r>
-              <a:rPr lang="de-CH" dirty="0" err="1"/>
-              <a:t>matrix</a:t>
-            </a:r>
-            <a:endParaRPr lang="de-CH" dirty="0"/>
+              <a:t> M</a:t>
+            </a:r>
+            <a:r>
+              <a:rPr lang="en-GB" dirty="0" err="1"/>
+              <a:t>ain</a:t>
+            </a:r>
+            <a:r>
+              <a:rPr lang="en-GB" dirty="0"/>
+              <a:t> components of a computational graph</a:t>
+            </a:r>
           </a:p>
           <a:p>
             <a:pPr>
@@ -7658,78 +5977,9 @@
               <a:buChar char="q"/>
             </a:pPr>
             <a:r>
-              <a:rPr lang="de-CH" dirty="0"/>
-              <a:t> The </a:t>
-            </a:r>
-            <a:r>
-              <a:rPr lang="de-CH" dirty="0" err="1"/>
-              <a:t>student</a:t>
-            </a:r>
-            <a:r>
-              <a:rPr lang="de-CH" dirty="0"/>
-              <a:t> is </a:t>
-            </a:r>
-            <a:r>
-              <a:rPr lang="de-CH" dirty="0" err="1"/>
-              <a:t>able</a:t>
-            </a:r>
-            <a:r>
-              <a:rPr lang="de-CH" dirty="0"/>
-              <a:t> to </a:t>
-            </a:r>
-            <a:r>
-              <a:rPr lang="de-CH" dirty="0" err="1"/>
-              <a:t>understand</a:t>
-            </a:r>
-            <a:r>
-              <a:rPr lang="de-CH" dirty="0"/>
-              <a:t> </a:t>
-            </a:r>
-            <a:r>
-              <a:rPr lang="de-CH" dirty="0" err="1"/>
-              <a:t>the</a:t>
-            </a:r>
-            <a:r>
-              <a:rPr lang="de-CH" dirty="0"/>
-              <a:t> </a:t>
-            </a:r>
-            <a:r>
-              <a:rPr lang="de-CH" dirty="0" err="1"/>
-              <a:t>main</a:t>
-            </a:r>
-            <a:r>
-              <a:rPr lang="de-CH" dirty="0"/>
-              <a:t> </a:t>
-            </a:r>
-            <a:r>
-              <a:rPr lang="de-CH" dirty="0" err="1"/>
-              <a:t>operations</a:t>
-            </a:r>
-            <a:r>
-              <a:rPr lang="de-CH" dirty="0"/>
-              <a:t> you </a:t>
-            </a:r>
-            <a:r>
-              <a:rPr lang="de-CH" dirty="0" err="1"/>
-              <a:t>can</a:t>
-            </a:r>
-            <a:r>
-              <a:rPr lang="de-CH" dirty="0"/>
-              <a:t> perform on a </a:t>
-            </a:r>
-            <a:r>
-              <a:rPr lang="de-CH" dirty="0" err="1"/>
-              <a:t>vector</a:t>
-            </a:r>
-            <a:r>
-              <a:rPr lang="de-CH" dirty="0"/>
-              <a:t> and a </a:t>
-            </a:r>
-            <a:r>
-              <a:rPr lang="de-CH" dirty="0" err="1"/>
-              <a:t>matrix</a:t>
-            </a:r>
-            <a:endParaRPr lang="de-CH" dirty="0"/>
+              <a:rPr lang="en-GB" dirty="0"/>
+              <a:t> Computational graph from a formula</a:t>
+            </a:r>
           </a:p>
           <a:p>
             <a:pPr>
@@ -7737,64 +5987,8 @@
               <a:buChar char="q"/>
             </a:pPr>
             <a:r>
-              <a:rPr lang="de-CH" dirty="0"/>
-              <a:t> The </a:t>
-            </a:r>
-            <a:r>
-              <a:rPr lang="de-CH" dirty="0" err="1"/>
-              <a:t>student</a:t>
-            </a:r>
-            <a:r>
-              <a:rPr lang="de-CH" dirty="0"/>
-              <a:t> is </a:t>
-            </a:r>
-            <a:r>
-              <a:rPr lang="de-CH" dirty="0" err="1"/>
-              <a:t>able</a:t>
-            </a:r>
-            <a:r>
-              <a:rPr lang="de-CH" dirty="0"/>
-              <a:t> to </a:t>
-            </a:r>
-            <a:r>
-              <a:rPr lang="de-CH" dirty="0" err="1"/>
-              <a:t>implement</a:t>
-            </a:r>
-            <a:r>
-              <a:rPr lang="de-CH" dirty="0"/>
-              <a:t> </a:t>
-            </a:r>
-            <a:r>
-              <a:rPr lang="de-CH" dirty="0" err="1"/>
-              <a:t>the</a:t>
-            </a:r>
-            <a:r>
-              <a:rPr lang="de-CH" dirty="0"/>
-              <a:t> </a:t>
-            </a:r>
-            <a:r>
-              <a:rPr lang="de-CH" dirty="0" err="1"/>
-              <a:t>main</a:t>
-            </a:r>
-            <a:r>
-              <a:rPr lang="de-CH" dirty="0"/>
-              <a:t> </a:t>
-            </a:r>
-            <a:r>
-              <a:rPr lang="de-CH" dirty="0" err="1"/>
-              <a:t>operations</a:t>
-            </a:r>
-            <a:r>
-              <a:rPr lang="de-CH" dirty="0"/>
-              <a:t> in </a:t>
-            </a:r>
-            <a:r>
-              <a:rPr lang="de-CH" dirty="0" err="1"/>
-              <a:t>basic</a:t>
-            </a:r>
-            <a:r>
-              <a:rPr lang="de-CH" dirty="0"/>
-              <a:t> Python</a:t>
+              <a:rPr lang="en-GB" dirty="0"/>
+              <a:t> Difference between building and evaluating a computational graph</a:t>
             </a:r>
           </a:p>
           <a:p>
@@ -7803,56 +5997,16 @@
               <a:buChar char="q"/>
             </a:pPr>
             <a:r>
-              <a:rPr lang="de-CH" dirty="0"/>
-              <a:t> The </a:t>
-            </a:r>
-            <a:r>
-              <a:rPr lang="de-CH" dirty="0" err="1"/>
-              <a:t>student</a:t>
-            </a:r>
-            <a:r>
-              <a:rPr lang="de-CH" dirty="0"/>
-              <a:t> is </a:t>
-            </a:r>
-            <a:r>
-              <a:rPr lang="de-CH" dirty="0" err="1"/>
-              <a:t>able</a:t>
-            </a:r>
-            <a:r>
-              <a:rPr lang="de-CH" dirty="0"/>
-              <a:t> to </a:t>
-            </a:r>
-            <a:r>
-              <a:rPr lang="de-CH" dirty="0" err="1"/>
-              <a:t>implement</a:t>
-            </a:r>
-            <a:r>
-              <a:rPr lang="de-CH" dirty="0"/>
-              <a:t> </a:t>
-            </a:r>
-            <a:r>
-              <a:rPr lang="de-CH" dirty="0" err="1"/>
-              <a:t>the</a:t>
-            </a:r>
-            <a:r>
-              <a:rPr lang="de-CH" dirty="0"/>
-              <a:t> </a:t>
-            </a:r>
-            <a:r>
-              <a:rPr lang="de-CH" dirty="0" err="1"/>
-              <a:t>main</a:t>
-            </a:r>
-            <a:r>
-              <a:rPr lang="de-CH" dirty="0"/>
-              <a:t> </a:t>
-            </a:r>
-            <a:r>
-              <a:rPr lang="de-CH" dirty="0" err="1"/>
-              <a:t>operations</a:t>
-            </a:r>
-            <a:r>
-              <a:rPr lang="de-CH" dirty="0"/>
-              <a:t> in numpy</a:t>
+              <a:rPr lang="en-GB" dirty="0"/>
+              <a:t> I</a:t>
+            </a:r>
+            <a:r>
+              <a:rPr lang="en-GB" b="1" dirty="0"/>
+              <a:t>mplementation </a:t>
+            </a:r>
+            <a:r>
+              <a:rPr lang="en-GB" dirty="0"/>
+              <a:t>of an easy computational graphs in Python and tensorflow</a:t>
             </a:r>
           </a:p>
           <a:p>
@@ -7861,149 +6015,24 @@
               <a:buChar char="q"/>
             </a:pPr>
             <a:r>
-              <a:rPr lang="de-CH" dirty="0"/>
-              <a:t> The </a:t>
-            </a:r>
-            <a:r>
-              <a:rPr lang="de-CH" dirty="0" err="1"/>
-              <a:t>student</a:t>
-            </a:r>
-            <a:r>
-              <a:rPr lang="de-CH" dirty="0"/>
-              <a:t> is </a:t>
-            </a:r>
-            <a:r>
-              <a:rPr lang="de-CH" dirty="0" err="1"/>
-              <a:t>able</a:t>
-            </a:r>
-            <a:r>
-              <a:rPr lang="de-CH" dirty="0"/>
-              <a:t> to </a:t>
-            </a:r>
-            <a:r>
-              <a:rPr lang="de-CH" dirty="0" err="1"/>
-              <a:t>understand</a:t>
-            </a:r>
-            <a:r>
-              <a:rPr lang="de-CH" dirty="0"/>
+              <a:rPr lang="en-GB" dirty="0"/>
               <a:t> </a:t>
             </a:r>
             <a:r>
-              <a:rPr lang="de-CH" dirty="0" err="1"/>
-              <a:t>the</a:t>
-            </a:r>
-            <a:r>
-              <a:rPr lang="de-CH" dirty="0"/>
-              <a:t> </a:t>
-            </a:r>
-            <a:r>
-              <a:rPr lang="de-CH" dirty="0" err="1"/>
-              <a:t>difference</a:t>
-            </a:r>
-            <a:r>
-              <a:rPr lang="de-CH" dirty="0"/>
-              <a:t> in how numpy </a:t>
-            </a:r>
-            <a:r>
-              <a:rPr lang="de-CH" dirty="0" err="1"/>
-              <a:t>operates</a:t>
-            </a:r>
-            <a:r>
-              <a:rPr lang="de-CH" dirty="0"/>
-              <a:t> on </a:t>
-            </a:r>
-            <a:r>
-              <a:rPr lang="de-CH" dirty="0" err="1"/>
-              <a:t>arrays</a:t>
-            </a:r>
-            <a:endParaRPr lang="de-CH" dirty="0"/>
+              <a:rPr lang="en-GB" b="1" dirty="0"/>
+              <a:t>Evaluation </a:t>
+            </a:r>
+            <a:r>
+              <a:rPr lang="en-GB" dirty="0"/>
+              <a:t>of an easy computational graphs in Python and tensorflow</a:t>
+            </a:r>
           </a:p>
           <a:p>
             <a:pPr>
               <a:buFont typeface="Wingdings" panose="05000000000000000000" pitchFamily="2" charset="2"/>
               <a:buChar char="q"/>
             </a:pPr>
-            <a:r>
-              <a:rPr lang="de-CH" dirty="0"/>
-              <a:t> The </a:t>
-            </a:r>
-            <a:r>
-              <a:rPr lang="de-CH" dirty="0" err="1"/>
-              <a:t>student</a:t>
-            </a:r>
-            <a:r>
-              <a:rPr lang="de-CH" dirty="0"/>
-              <a:t> is </a:t>
-            </a:r>
-            <a:r>
-              <a:rPr lang="de-CH" dirty="0" err="1"/>
-              <a:t>able</a:t>
-            </a:r>
-            <a:r>
-              <a:rPr lang="de-CH" dirty="0"/>
-              <a:t> to </a:t>
-            </a:r>
-            <a:r>
-              <a:rPr lang="de-CH" dirty="0" err="1"/>
-              <a:t>use</a:t>
-            </a:r>
-            <a:r>
-              <a:rPr lang="de-CH" dirty="0"/>
-              <a:t> </a:t>
-            </a:r>
-            <a:r>
-              <a:rPr lang="de-CH" dirty="0" err="1"/>
-              <a:t>the</a:t>
-            </a:r>
-            <a:r>
-              <a:rPr lang="de-CH" dirty="0"/>
-              <a:t> </a:t>
-            </a:r>
-            <a:r>
-              <a:rPr lang="de-CH" dirty="0" err="1"/>
-              <a:t>concepts</a:t>
-            </a:r>
-            <a:r>
-              <a:rPr lang="de-CH" dirty="0"/>
-              <a:t> to </a:t>
-            </a:r>
-            <a:r>
-              <a:rPr lang="de-CH" dirty="0" err="1"/>
-              <a:t>implement</a:t>
-            </a:r>
-            <a:r>
-              <a:rPr lang="de-CH" dirty="0"/>
-              <a:t> a </a:t>
-            </a:r>
-            <a:r>
-              <a:rPr lang="de-CH" dirty="0" err="1"/>
-              <a:t>complete</a:t>
-            </a:r>
-            <a:r>
-              <a:rPr lang="de-CH" dirty="0"/>
-              <a:t> linear </a:t>
-            </a:r>
-            <a:r>
-              <a:rPr lang="de-CH" dirty="0" err="1"/>
-              <a:t>regression</a:t>
-            </a:r>
-            <a:r>
-              <a:rPr lang="de-CH" dirty="0"/>
-              <a:t> </a:t>
-            </a:r>
-            <a:r>
-              <a:rPr lang="de-CH" dirty="0" err="1"/>
-              <a:t>model</a:t>
-            </a:r>
-            <a:r>
-              <a:rPr lang="de-CH" dirty="0"/>
-              <a:t> from </a:t>
-            </a:r>
-            <a:r>
-              <a:rPr lang="de-CH" dirty="0" err="1"/>
-              <a:t>scratch</a:t>
-            </a:r>
-            <a:endParaRPr lang="de-CH" dirty="0"/>
+            <a:endParaRPr lang="en-GB" dirty="0"/>
           </a:p>
           <a:p>
             <a:pPr marL="0" indent="0">
@@ -8015,20 +6044,20 @@
       </p:sp>
       <p:sp>
         <p:nvSpPr>
-          <p:cNvPr id="4" name="Rectangle 3">
-            <a:extLst>
-              <a:ext uri="{FF2B5EF4-FFF2-40B4-BE49-F238E27FC236}">
-                <a16:creationId xmlns:a16="http://schemas.microsoft.com/office/drawing/2014/main" id="{229398F1-F6A1-42F4-8BC9-CA869839C8C7}"/>
-              </a:ext>
-            </a:extLst>
-          </p:cNvPr>
-          <p:cNvSpPr/>
+          <p:cNvPr id="4" name="TextBox 3">
+            <a:extLst>
+              <a:ext uri="{FF2B5EF4-FFF2-40B4-BE49-F238E27FC236}">
+                <a16:creationId xmlns:a16="http://schemas.microsoft.com/office/drawing/2014/main" id="{0FE734AF-2327-4914-A605-639EED49525F}"/>
+              </a:ext>
+            </a:extLst>
+          </p:cNvPr>
+          <p:cNvSpPr txBox="1"/>
           <p:nvPr/>
         </p:nvSpPr>
         <p:spPr>
-          <a:xfrm rot="1860278">
-            <a:off x="7074869" y="893210"/>
-            <a:ext cx="5091458" cy="2215991"/>
+          <a:xfrm>
+            <a:off x="88669" y="6035039"/>
+            <a:ext cx="3607724" cy="370706"/>
           </a:xfrm>
           <a:prstGeom prst="rect">
             <a:avLst/>
@@ -8036,42 +6065,23 @@
           <a:noFill/>
         </p:spPr>
         <p:txBody>
-          <a:bodyPr wrap="none" lIns="91440" tIns="45720" rIns="91440" bIns="45720">
+          <a:bodyPr wrap="square" rtlCol="0">
             <a:spAutoFit/>
           </a:bodyPr>
           <a:lstStyle/>
           <a:p>
-            <a:pPr algn="ctr"/>
-            <a:r>
-              <a:rPr lang="en-US" sz="13800" b="1" cap="none" spc="50" dirty="0">
-                <a:ln w="9525" cmpd="sng">
-                  <a:solidFill>
-                    <a:schemeClr val="accent1"/>
-                  </a:solidFill>
-                  <a:prstDash val="solid"/>
-                </a:ln>
-                <a:solidFill>
-                  <a:srgbClr val="70AD47">
-                    <a:tint val="1000"/>
-                  </a:srgbClr>
-                </a:solidFill>
-                <a:effectLst>
-                  <a:glow rad="38100">
-                    <a:schemeClr val="accent1">
-                      <a:alpha val="40000"/>
-                    </a:schemeClr>
-                  </a:glow>
-                </a:effectLst>
-              </a:rPr>
-              <a:t>DRAFT</a:t>
-            </a:r>
+            <a:r>
+              <a:rPr lang="de-CH" dirty="0"/>
+              <a:t>© U. Michelucci 2018</a:t>
+            </a:r>
+            <a:endParaRPr lang="LID4096" dirty="0"/>
           </a:p>
         </p:txBody>
       </p:sp>
     </p:spTree>
     <p:extLst>
       <p:ext uri="{BB962C8B-B14F-4D97-AF65-F5344CB8AC3E}">
-        <p14:creationId xmlns:p14="http://schemas.microsoft.com/office/powerpoint/2010/main" val="1639005746"/>
+        <p14:creationId xmlns:p14="http://schemas.microsoft.com/office/powerpoint/2010/main" val="3966760769"/>
       </p:ext>
     </p:extLst>
   </p:cSld>
@@ -8135,7 +6145,7 @@
             </a:br>
             <a:r>
               <a:rPr lang="en-GB" sz="4400" b="1" dirty="0"/>
-              <a:t>Introduction to linear algebra and numpy/Python</a:t>
+              <a:t>One single neuron</a:t>
             </a:r>
             <a:endParaRPr lang="en-CH" sz="7200" dirty="0"/>
           </a:p>
@@ -8178,20 +6188,20 @@
       </p:sp>
       <p:sp>
         <p:nvSpPr>
-          <p:cNvPr id="4" name="Rectangle 3">
-            <a:extLst>
-              <a:ext uri="{FF2B5EF4-FFF2-40B4-BE49-F238E27FC236}">
-                <a16:creationId xmlns:a16="http://schemas.microsoft.com/office/drawing/2014/main" id="{BEAAE040-AE55-4189-8682-27A869CFA8EE}"/>
-              </a:ext>
-            </a:extLst>
-          </p:cNvPr>
-          <p:cNvSpPr/>
+          <p:cNvPr id="5" name="TextBox 4">
+            <a:extLst>
+              <a:ext uri="{FF2B5EF4-FFF2-40B4-BE49-F238E27FC236}">
+                <a16:creationId xmlns:a16="http://schemas.microsoft.com/office/drawing/2014/main" id="{896BAA24-3D92-4CB9-AF97-4E901EB8FD14}"/>
+              </a:ext>
+            </a:extLst>
+          </p:cNvPr>
+          <p:cNvSpPr txBox="1"/>
           <p:nvPr/>
         </p:nvSpPr>
         <p:spPr>
-          <a:xfrm rot="1860278">
-            <a:off x="7074869" y="893210"/>
-            <a:ext cx="5091458" cy="2215991"/>
+          <a:xfrm>
+            <a:off x="88669" y="6035039"/>
+            <a:ext cx="3607724" cy="370706"/>
           </a:xfrm>
           <a:prstGeom prst="rect">
             <a:avLst/>
@@ -8199,42 +6209,23 @@
           <a:noFill/>
         </p:spPr>
         <p:txBody>
-          <a:bodyPr wrap="none" lIns="91440" tIns="45720" rIns="91440" bIns="45720">
+          <a:bodyPr wrap="square" rtlCol="0">
             <a:spAutoFit/>
           </a:bodyPr>
           <a:lstStyle/>
           <a:p>
-            <a:pPr algn="ctr"/>
-            <a:r>
-              <a:rPr lang="en-US" sz="13800" b="1" cap="none" spc="50" dirty="0">
-                <a:ln w="9525" cmpd="sng">
-                  <a:solidFill>
-                    <a:schemeClr val="accent1"/>
-                  </a:solidFill>
-                  <a:prstDash val="solid"/>
-                </a:ln>
-                <a:solidFill>
-                  <a:srgbClr val="70AD47">
-                    <a:tint val="1000"/>
-                  </a:srgbClr>
-                </a:solidFill>
-                <a:effectLst>
-                  <a:glow rad="38100">
-                    <a:schemeClr val="accent1">
-                      <a:alpha val="40000"/>
-                    </a:schemeClr>
-                  </a:glow>
-                </a:effectLst>
-              </a:rPr>
-              <a:t>DRAFT</a:t>
-            </a:r>
+            <a:r>
+              <a:rPr lang="de-CH" dirty="0"/>
+              <a:t>© U. Michelucci 2018</a:t>
+            </a:r>
+            <a:endParaRPr lang="LID4096" dirty="0"/>
           </a:p>
         </p:txBody>
       </p:sp>
     </p:spTree>
     <p:extLst>
       <p:ext uri="{BB962C8B-B14F-4D97-AF65-F5344CB8AC3E}">
-        <p14:creationId xmlns:p14="http://schemas.microsoft.com/office/powerpoint/2010/main" val="504162336"/>
+        <p14:creationId xmlns:p14="http://schemas.microsoft.com/office/powerpoint/2010/main" val="3374944990"/>
       </p:ext>
     </p:extLst>
   </p:cSld>
@@ -8308,13 +6299,13 @@
         </p:nvSpPr>
         <p:spPr>
           <a:xfrm>
-            <a:off x="838200" y="1690688"/>
-            <a:ext cx="10515600" cy="4486275"/>
+            <a:off x="891540" y="1657350"/>
+            <a:ext cx="10462260" cy="4519613"/>
           </a:xfrm>
         </p:spPr>
         <p:txBody>
           <a:bodyPr>
-            <a:normAutofit lnSpcReduction="10000"/>
+            <a:normAutofit/>
           </a:bodyPr>
           <a:lstStyle/>
           <a:p>
@@ -8323,46 +6314,22 @@
               <a:buChar char="q"/>
             </a:pPr>
             <a:r>
-              <a:rPr lang="de-CH" dirty="0"/>
-              <a:t> The </a:t>
-            </a:r>
-            <a:r>
-              <a:rPr lang="de-CH" dirty="0" err="1"/>
-              <a:t>student</a:t>
-            </a:r>
-            <a:r>
-              <a:rPr lang="de-CH" dirty="0"/>
-              <a:t> is </a:t>
-            </a:r>
-            <a:r>
-              <a:rPr lang="de-CH" dirty="0" err="1"/>
-              <a:t>able</a:t>
-            </a:r>
-            <a:r>
-              <a:rPr lang="de-CH" dirty="0"/>
-              <a:t> to </a:t>
-            </a:r>
-            <a:r>
-              <a:rPr lang="de-CH" dirty="0" err="1"/>
-              <a:t>explain</a:t>
-            </a:r>
-            <a:r>
-              <a:rPr lang="de-CH" dirty="0"/>
-              <a:t> what is a </a:t>
-            </a:r>
-            <a:r>
-              <a:rPr lang="de-CH" dirty="0" err="1"/>
-              <a:t>vector</a:t>
-            </a:r>
-            <a:r>
-              <a:rPr lang="de-CH" dirty="0"/>
-              <a:t> and a </a:t>
-            </a:r>
-            <a:r>
-              <a:rPr lang="de-CH" dirty="0" err="1"/>
-              <a:t>matrix</a:t>
-            </a:r>
-            <a:endParaRPr lang="de-CH" dirty="0"/>
+              <a:rPr lang="de-CH" sz="4000" dirty="0"/>
+              <a:t> Computational </a:t>
+            </a:r>
+            <a:r>
+              <a:rPr lang="de-CH" sz="4000" dirty="0" err="1"/>
+              <a:t>graph</a:t>
+            </a:r>
+            <a:r>
+              <a:rPr lang="de-CH" sz="4000" dirty="0"/>
+              <a:t> of a </a:t>
+            </a:r>
+            <a:r>
+              <a:rPr lang="de-CH" sz="4000" dirty="0" err="1"/>
+              <a:t>neuron</a:t>
+            </a:r>
+            <a:endParaRPr lang="de-CH" sz="4000" dirty="0"/>
           </a:p>
           <a:p>
             <a:pPr>
@@ -8370,78 +6337,22 @@
               <a:buChar char="q"/>
             </a:pPr>
             <a:r>
-              <a:rPr lang="de-CH" dirty="0"/>
-              <a:t> The </a:t>
-            </a:r>
-            <a:r>
-              <a:rPr lang="de-CH" dirty="0" err="1"/>
-              <a:t>student</a:t>
-            </a:r>
-            <a:r>
-              <a:rPr lang="de-CH" dirty="0"/>
-              <a:t> is </a:t>
-            </a:r>
-            <a:r>
-              <a:rPr lang="de-CH" dirty="0" err="1"/>
-              <a:t>able</a:t>
-            </a:r>
-            <a:r>
-              <a:rPr lang="de-CH" dirty="0"/>
-              <a:t> to </a:t>
-            </a:r>
-            <a:r>
-              <a:rPr lang="de-CH" dirty="0" err="1"/>
-              <a:t>understand</a:t>
-            </a:r>
-            <a:r>
-              <a:rPr lang="de-CH" dirty="0"/>
+              <a:rPr lang="de-CH" sz="4000" dirty="0"/>
               <a:t> </a:t>
             </a:r>
             <a:r>
-              <a:rPr lang="de-CH" dirty="0" err="1"/>
-              <a:t>the</a:t>
-            </a:r>
-            <a:r>
-              <a:rPr lang="de-CH" dirty="0"/>
-              <a:t> </a:t>
-            </a:r>
-            <a:r>
-              <a:rPr lang="de-CH" dirty="0" err="1"/>
-              <a:t>main</a:t>
-            </a:r>
-            <a:r>
-              <a:rPr lang="de-CH" dirty="0"/>
-              <a:t> </a:t>
-            </a:r>
-            <a:r>
-              <a:rPr lang="de-CH" dirty="0" err="1"/>
-              <a:t>operations</a:t>
-            </a:r>
-            <a:r>
-              <a:rPr lang="de-CH" dirty="0"/>
-              <a:t> you </a:t>
-            </a:r>
-            <a:r>
-              <a:rPr lang="de-CH" dirty="0" err="1"/>
-              <a:t>can</a:t>
-            </a:r>
-            <a:r>
-              <a:rPr lang="de-CH" dirty="0"/>
-              <a:t> perform on a </a:t>
-            </a:r>
-            <a:r>
-              <a:rPr lang="de-CH" dirty="0" err="1"/>
-              <a:t>vector</a:t>
-            </a:r>
-            <a:r>
-              <a:rPr lang="de-CH" dirty="0"/>
-              <a:t> and a </a:t>
-            </a:r>
-            <a:r>
-              <a:rPr lang="de-CH" dirty="0" err="1"/>
-              <a:t>matrix</a:t>
-            </a:r>
-            <a:endParaRPr lang="de-CH" dirty="0"/>
+              <a:rPr lang="de-CH" sz="4000" dirty="0" err="1"/>
+              <a:t>Overview</a:t>
+            </a:r>
+            <a:r>
+              <a:rPr lang="de-CH" sz="4000" dirty="0"/>
+              <a:t> of activation </a:t>
+            </a:r>
+            <a:r>
+              <a:rPr lang="de-CH" sz="4000" dirty="0" err="1"/>
+              <a:t>functions</a:t>
+            </a:r>
+            <a:endParaRPr lang="de-CH" sz="4000" dirty="0"/>
           </a:p>
           <a:p>
             <a:pPr>
@@ -8449,65 +6360,14 @@
               <a:buChar char="q"/>
             </a:pPr>
             <a:r>
-              <a:rPr lang="de-CH" dirty="0"/>
-              <a:t> The </a:t>
-            </a:r>
-            <a:r>
-              <a:rPr lang="de-CH" dirty="0" err="1"/>
-              <a:t>student</a:t>
-            </a:r>
-            <a:r>
-              <a:rPr lang="de-CH" dirty="0"/>
-              <a:t> is </a:t>
-            </a:r>
-            <a:r>
-              <a:rPr lang="de-CH" dirty="0" err="1"/>
-              <a:t>able</a:t>
-            </a:r>
-            <a:r>
-              <a:rPr lang="de-CH" dirty="0"/>
-              <a:t> to </a:t>
-            </a:r>
-            <a:r>
-              <a:rPr lang="de-CH" dirty="0" err="1"/>
-              <a:t>implement</a:t>
-            </a:r>
-            <a:r>
-              <a:rPr lang="de-CH" dirty="0"/>
-              <a:t> </a:t>
-            </a:r>
-            <a:r>
-              <a:rPr lang="de-CH" dirty="0" err="1"/>
-              <a:t>the</a:t>
-            </a:r>
-            <a:r>
-              <a:rPr lang="de-CH" dirty="0"/>
-              <a:t> </a:t>
-            </a:r>
-            <a:r>
-              <a:rPr lang="de-CH" dirty="0" err="1"/>
-              <a:t>main</a:t>
-            </a:r>
-            <a:r>
-              <a:rPr lang="de-CH" dirty="0"/>
-              <a:t> </a:t>
-            </a:r>
-            <a:r>
-              <a:rPr lang="de-CH" dirty="0" err="1"/>
-              <a:t>operations</a:t>
-            </a:r>
-            <a:r>
-              <a:rPr lang="de-CH" dirty="0"/>
-              <a:t> in </a:t>
-            </a:r>
-            <a:r>
-              <a:rPr lang="de-CH" dirty="0" err="1"/>
-              <a:t>basic</a:t>
-            </a:r>
-            <a:r>
-              <a:rPr lang="de-CH" dirty="0"/>
-              <a:t> Python</a:t>
-            </a:r>
+              <a:rPr lang="de-CH" sz="4000" dirty="0"/>
+              <a:t> Gradient Descent </a:t>
+            </a:r>
+            <a:r>
+              <a:rPr lang="de-CH" sz="4000" dirty="0" err="1"/>
+              <a:t>Algorithm</a:t>
+            </a:r>
+            <a:endParaRPr lang="de-CH" sz="4000" dirty="0"/>
           </a:p>
           <a:p>
             <a:pPr>
@@ -8515,56 +6375,8 @@
               <a:buChar char="q"/>
             </a:pPr>
             <a:r>
-              <a:rPr lang="de-CH" dirty="0"/>
-              <a:t> The </a:t>
-            </a:r>
-            <a:r>
-              <a:rPr lang="de-CH" dirty="0" err="1"/>
-              <a:t>student</a:t>
-            </a:r>
-            <a:r>
-              <a:rPr lang="de-CH" dirty="0"/>
-              <a:t> is </a:t>
-            </a:r>
-            <a:r>
-              <a:rPr lang="de-CH" dirty="0" err="1"/>
-              <a:t>able</a:t>
-            </a:r>
-            <a:r>
-              <a:rPr lang="de-CH" dirty="0"/>
-              <a:t> to </a:t>
-            </a:r>
-            <a:r>
-              <a:rPr lang="de-CH" dirty="0" err="1"/>
-              <a:t>implement</a:t>
-            </a:r>
-            <a:r>
-              <a:rPr lang="de-CH" dirty="0"/>
-              <a:t> </a:t>
-            </a:r>
-            <a:r>
-              <a:rPr lang="de-CH" dirty="0" err="1"/>
-              <a:t>the</a:t>
-            </a:r>
-            <a:r>
-              <a:rPr lang="de-CH" dirty="0"/>
-              <a:t> </a:t>
-            </a:r>
-            <a:r>
-              <a:rPr lang="de-CH" dirty="0" err="1"/>
-              <a:t>main</a:t>
-            </a:r>
-            <a:r>
-              <a:rPr lang="de-CH" dirty="0"/>
-              <a:t> </a:t>
-            </a:r>
-            <a:r>
-              <a:rPr lang="de-CH" dirty="0" err="1"/>
-              <a:t>operations</a:t>
-            </a:r>
-            <a:r>
-              <a:rPr lang="de-CH" dirty="0"/>
-              <a:t> in numpy</a:t>
+              <a:rPr lang="de-CH" sz="4000" dirty="0"/>
+              <a:t> Linear Regression with Tensorflow</a:t>
             </a:r>
           </a:p>
           <a:p>
@@ -8573,174 +6385,42 @@
               <a:buChar char="q"/>
             </a:pPr>
             <a:r>
-              <a:rPr lang="de-CH" dirty="0"/>
-              <a:t> The </a:t>
-            </a:r>
-            <a:r>
-              <a:rPr lang="de-CH" dirty="0" err="1"/>
-              <a:t>student</a:t>
-            </a:r>
-            <a:r>
-              <a:rPr lang="de-CH" dirty="0"/>
-              <a:t> is </a:t>
-            </a:r>
-            <a:r>
-              <a:rPr lang="de-CH" dirty="0" err="1"/>
-              <a:t>able</a:t>
-            </a:r>
-            <a:r>
-              <a:rPr lang="de-CH" dirty="0"/>
-              <a:t> to </a:t>
-            </a:r>
-            <a:r>
-              <a:rPr lang="de-CH" dirty="0" err="1"/>
-              <a:t>understand</a:t>
-            </a:r>
-            <a:r>
-              <a:rPr lang="de-CH" dirty="0"/>
+              <a:rPr lang="de-CH" sz="4000" dirty="0"/>
               <a:t> </a:t>
             </a:r>
             <a:r>
-              <a:rPr lang="de-CH" dirty="0" err="1"/>
-              <a:t>the</a:t>
-            </a:r>
-            <a:r>
-              <a:rPr lang="de-CH" dirty="0"/>
-              <a:t> </a:t>
-            </a:r>
-            <a:r>
-              <a:rPr lang="de-CH" dirty="0" err="1"/>
-              <a:t>difference</a:t>
-            </a:r>
-            <a:r>
-              <a:rPr lang="de-CH" dirty="0"/>
-              <a:t> in how numpy </a:t>
-            </a:r>
-            <a:r>
-              <a:rPr lang="de-CH" dirty="0" err="1"/>
-              <a:t>operates</a:t>
-            </a:r>
-            <a:r>
-              <a:rPr lang="de-CH" dirty="0"/>
-              <a:t> on </a:t>
-            </a:r>
-            <a:r>
-              <a:rPr lang="de-CH" dirty="0" err="1"/>
-              <a:t>arrays</a:t>
-            </a:r>
-            <a:endParaRPr lang="de-CH" dirty="0"/>
-          </a:p>
-          <a:p>
-            <a:pPr>
-              <a:buFont typeface="Wingdings" panose="05000000000000000000" pitchFamily="2" charset="2"/>
-              <a:buChar char="q"/>
+              <a:rPr lang="de-CH" sz="4000" dirty="0" err="1"/>
+              <a:t>Logistic</a:t>
+            </a:r>
+            <a:r>
+              <a:rPr lang="de-CH" sz="4000" dirty="0"/>
+              <a:t> Regression with Tensorflow</a:t>
+            </a:r>
+          </a:p>
+          <a:p>
+            <a:pPr marL="0" indent="0">
+              <a:buNone/>
             </a:pPr>
-            <a:r>
-              <a:rPr lang="de-CH" dirty="0"/>
-              <a:t> The </a:t>
-            </a:r>
-            <a:r>
-              <a:rPr lang="de-CH" dirty="0" err="1"/>
-              <a:t>student</a:t>
-            </a:r>
-            <a:r>
-              <a:rPr lang="de-CH" dirty="0"/>
-              <a:t> is </a:t>
-            </a:r>
-            <a:r>
-              <a:rPr lang="de-CH" dirty="0" err="1"/>
-              <a:t>able</a:t>
-            </a:r>
-            <a:r>
-              <a:rPr lang="de-CH" dirty="0"/>
-              <a:t> to </a:t>
-            </a:r>
-            <a:r>
-              <a:rPr lang="de-CH" dirty="0" err="1"/>
-              <a:t>use</a:t>
-            </a:r>
-            <a:r>
-              <a:rPr lang="de-CH" dirty="0"/>
-              <a:t> </a:t>
-            </a:r>
-            <a:r>
-              <a:rPr lang="de-CH" dirty="0" err="1"/>
-              <a:t>the</a:t>
-            </a:r>
-            <a:r>
-              <a:rPr lang="de-CH" dirty="0"/>
-              <a:t> </a:t>
-            </a:r>
-            <a:r>
-              <a:rPr lang="de-CH" dirty="0" err="1"/>
-              <a:t>concepts</a:t>
-            </a:r>
-            <a:r>
-              <a:rPr lang="de-CH" dirty="0"/>
-              <a:t> to </a:t>
-            </a:r>
-            <a:r>
-              <a:rPr lang="de-CH" dirty="0" err="1"/>
-              <a:t>implement</a:t>
-            </a:r>
-            <a:r>
-              <a:rPr lang="de-CH" dirty="0"/>
-              <a:t> a </a:t>
-            </a:r>
-            <a:r>
-              <a:rPr lang="de-CH" dirty="0" err="1"/>
-              <a:t>complete</a:t>
-            </a:r>
-            <a:r>
-              <a:rPr lang="de-CH" dirty="0"/>
-              <a:t> linear </a:t>
-            </a:r>
-            <a:r>
-              <a:rPr lang="de-CH" dirty="0" err="1"/>
-              <a:t>regression</a:t>
-            </a:r>
-            <a:r>
-              <a:rPr lang="de-CH" dirty="0"/>
-              <a:t> </a:t>
-            </a:r>
-            <a:r>
-              <a:rPr lang="de-CH" dirty="0" err="1"/>
-              <a:t>model</a:t>
-            </a:r>
-            <a:r>
-              <a:rPr lang="de-CH" dirty="0"/>
-              <a:t> from </a:t>
-            </a:r>
-            <a:r>
-              <a:rPr lang="de-CH" dirty="0" err="1"/>
-              <a:t>scratch</a:t>
-            </a:r>
-            <a:endParaRPr lang="de-CH" dirty="0"/>
-          </a:p>
-          <a:p>
-            <a:pPr marL="0" indent="0">
-              <a:buNone/>
-            </a:pPr>
-            <a:endParaRPr lang="en-CH" dirty="0"/>
-          </a:p>
-        </p:txBody>
-      </p:sp>
-      <p:sp>
-        <p:nvSpPr>
-          <p:cNvPr id="4" name="Rectangle 3">
-            <a:extLst>
-              <a:ext uri="{FF2B5EF4-FFF2-40B4-BE49-F238E27FC236}">
-                <a16:creationId xmlns:a16="http://schemas.microsoft.com/office/drawing/2014/main" id="{15922E8D-DDAD-4FAD-8037-023BDF971A1B}"/>
-              </a:ext>
-            </a:extLst>
-          </p:cNvPr>
-          <p:cNvSpPr/>
+            <a:endParaRPr lang="en-CH" sz="4000" dirty="0"/>
+          </a:p>
+        </p:txBody>
+      </p:sp>
+      <p:sp>
+        <p:nvSpPr>
+          <p:cNvPr id="5" name="TextBox 4">
+            <a:extLst>
+              <a:ext uri="{FF2B5EF4-FFF2-40B4-BE49-F238E27FC236}">
+                <a16:creationId xmlns:a16="http://schemas.microsoft.com/office/drawing/2014/main" id="{6E7F76C6-5C82-4441-B827-4D60BE072188}"/>
+              </a:ext>
+            </a:extLst>
+          </p:cNvPr>
+          <p:cNvSpPr txBox="1"/>
           <p:nvPr/>
         </p:nvSpPr>
         <p:spPr>
-          <a:xfrm rot="1860278">
-            <a:off x="7074869" y="893210"/>
-            <a:ext cx="5091458" cy="2215991"/>
+          <a:xfrm>
+            <a:off x="88669" y="6035039"/>
+            <a:ext cx="3607724" cy="370706"/>
           </a:xfrm>
           <a:prstGeom prst="rect">
             <a:avLst/>
@@ -8748,42 +6428,23 @@
           <a:noFill/>
         </p:spPr>
         <p:txBody>
-          <a:bodyPr wrap="none" lIns="91440" tIns="45720" rIns="91440" bIns="45720">
+          <a:bodyPr wrap="square" rtlCol="0">
             <a:spAutoFit/>
           </a:bodyPr>
           <a:lstStyle/>
           <a:p>
-            <a:pPr algn="ctr"/>
-            <a:r>
-              <a:rPr lang="en-US" sz="13800" b="1" cap="none" spc="50" dirty="0">
-                <a:ln w="9525" cmpd="sng">
-                  <a:solidFill>
-                    <a:schemeClr val="accent1"/>
-                  </a:solidFill>
-                  <a:prstDash val="solid"/>
-                </a:ln>
-                <a:solidFill>
-                  <a:srgbClr val="70AD47">
-                    <a:tint val="1000"/>
-                  </a:srgbClr>
-                </a:solidFill>
-                <a:effectLst>
-                  <a:glow rad="38100">
-                    <a:schemeClr val="accent1">
-                      <a:alpha val="40000"/>
-                    </a:schemeClr>
-                  </a:glow>
-                </a:effectLst>
-              </a:rPr>
-              <a:t>DRAFT</a:t>
-            </a:r>
+            <a:r>
+              <a:rPr lang="de-CH" dirty="0"/>
+              <a:t>© U. Michelucci 2018</a:t>
+            </a:r>
+            <a:endParaRPr lang="LID4096" dirty="0"/>
           </a:p>
         </p:txBody>
       </p:sp>
     </p:spTree>
     <p:extLst>
       <p:ext uri="{BB962C8B-B14F-4D97-AF65-F5344CB8AC3E}">
-        <p14:creationId xmlns:p14="http://schemas.microsoft.com/office/powerpoint/2010/main" val="291120097"/>
+        <p14:creationId xmlns:p14="http://schemas.microsoft.com/office/powerpoint/2010/main" val="1639005746"/>
       </p:ext>
     </p:extLst>
   </p:cSld>

</xml_diff>

<commit_message>
Updated the learning goals.
</commit_message>
<xml_diff>
--- a/Learning_goals_overview.pptx
+++ b/Learning_goals_overview.pptx
@@ -4937,7 +4937,7 @@
         </p:spPr>
         <p:txBody>
           <a:bodyPr>
-            <a:normAutofit lnSpcReduction="10000"/>
+            <a:normAutofit/>
           </a:bodyPr>
           <a:lstStyle/>
           <a:p>
@@ -4946,34 +4946,6 @@
               <a:buChar char="q"/>
             </a:pPr>
             <a:r>
-              <a:rPr lang="de-CH" dirty="0"/>
-              <a:t> The </a:t>
-            </a:r>
-            <a:r>
-              <a:rPr lang="de-CH" dirty="0" err="1"/>
-              <a:t>student</a:t>
-            </a:r>
-            <a:r>
-              <a:rPr lang="de-CH" dirty="0"/>
-              <a:t> is </a:t>
-            </a:r>
-            <a:r>
-              <a:rPr lang="de-CH" dirty="0" err="1"/>
-              <a:t>able</a:t>
-            </a:r>
-            <a:r>
-              <a:rPr lang="de-CH" dirty="0"/>
-              <a:t> to </a:t>
-            </a:r>
-            <a:r>
-              <a:rPr lang="de-CH" dirty="0" err="1"/>
-              <a:t>explain</a:t>
-            </a:r>
-            <a:r>
-              <a:rPr lang="de-CH" dirty="0"/>
-              <a:t> what is a </a:t>
-            </a:r>
-            <a:r>
               <a:rPr lang="de-CH" dirty="0" err="1"/>
               <a:t>vector</a:t>
             </a:r>
@@ -4983,7 +4955,7 @@
             </a:r>
             <a:r>
               <a:rPr lang="de-CH" dirty="0" err="1"/>
-              <a:t>matrix</a:t>
+              <a:t>matrices</a:t>
             </a:r>
             <a:endParaRPr lang="de-CH" dirty="0"/>
           </a:p>
@@ -4994,47 +4966,7 @@
             </a:pPr>
             <a:r>
               <a:rPr lang="de-CH" dirty="0"/>
-              <a:t> The </a:t>
-            </a:r>
-            <a:r>
-              <a:rPr lang="de-CH" dirty="0" err="1"/>
-              <a:t>student</a:t>
-            </a:r>
-            <a:r>
-              <a:rPr lang="de-CH" dirty="0"/>
-              <a:t> is </a:t>
-            </a:r>
-            <a:r>
-              <a:rPr lang="de-CH" dirty="0" err="1"/>
-              <a:t>able</a:t>
-            </a:r>
-            <a:r>
-              <a:rPr lang="de-CH" dirty="0"/>
-              <a:t> to </a:t>
-            </a:r>
-            <a:r>
-              <a:rPr lang="de-CH" dirty="0" err="1"/>
-              <a:t>understand</a:t>
-            </a:r>
-            <a:r>
-              <a:rPr lang="de-CH" dirty="0"/>
-              <a:t> </a:t>
-            </a:r>
-            <a:r>
-              <a:rPr lang="de-CH" dirty="0" err="1"/>
-              <a:t>the</a:t>
-            </a:r>
-            <a:r>
-              <a:rPr lang="de-CH" dirty="0"/>
-              <a:t> </a:t>
-            </a:r>
-            <a:r>
-              <a:rPr lang="de-CH" dirty="0" err="1"/>
-              <a:t>main</a:t>
-            </a:r>
-            <a:r>
-              <a:rPr lang="de-CH" dirty="0"/>
-              <a:t> </a:t>
+              <a:t> Main </a:t>
             </a:r>
             <a:r>
               <a:rPr lang="de-CH" dirty="0" err="1"/>
@@ -5073,43 +5005,19 @@
             </a:pPr>
             <a:r>
               <a:rPr lang="de-CH" dirty="0"/>
-              <a:t> The </a:t>
+              <a:t> Main </a:t>
             </a:r>
             <a:r>
               <a:rPr lang="de-CH" dirty="0" err="1"/>
-              <a:t>student</a:t>
-            </a:r>
-            <a:r>
-              <a:rPr lang="de-CH" dirty="0"/>
-              <a:t> is </a:t>
+              <a:t>vector</a:t>
+            </a:r>
+            <a:r>
+              <a:rPr lang="de-CH" dirty="0"/>
+              <a:t> and </a:t>
             </a:r>
             <a:r>
               <a:rPr lang="de-CH" dirty="0" err="1"/>
-              <a:t>able</a:t>
-            </a:r>
-            <a:r>
-              <a:rPr lang="de-CH" dirty="0"/>
-              <a:t> to </a:t>
-            </a:r>
-            <a:r>
-              <a:rPr lang="de-CH" dirty="0" err="1"/>
-              <a:t>implement</a:t>
-            </a:r>
-            <a:r>
-              <a:rPr lang="de-CH" dirty="0"/>
-              <a:t> </a:t>
-            </a:r>
-            <a:r>
-              <a:rPr lang="de-CH" dirty="0" err="1"/>
-              <a:t>the</a:t>
-            </a:r>
-            <a:r>
-              <a:rPr lang="de-CH" dirty="0"/>
-              <a:t> </a:t>
-            </a:r>
-            <a:r>
-              <a:rPr lang="de-CH" dirty="0" err="1"/>
-              <a:t>main</a:t>
+              <a:t>matrix</a:t>
             </a:r>
             <a:r>
               <a:rPr lang="de-CH" dirty="0"/>
@@ -5139,43 +5047,19 @@
             </a:pPr>
             <a:r>
               <a:rPr lang="de-CH" dirty="0"/>
-              <a:t> The </a:t>
+              <a:t> Main </a:t>
             </a:r>
             <a:r>
               <a:rPr lang="de-CH" dirty="0" err="1"/>
-              <a:t>student</a:t>
-            </a:r>
-            <a:r>
-              <a:rPr lang="de-CH" dirty="0"/>
-              <a:t> is </a:t>
+              <a:t>vector</a:t>
+            </a:r>
+            <a:r>
+              <a:rPr lang="de-CH" dirty="0"/>
+              <a:t> and </a:t>
             </a:r>
             <a:r>
               <a:rPr lang="de-CH" dirty="0" err="1"/>
-              <a:t>able</a:t>
-            </a:r>
-            <a:r>
-              <a:rPr lang="de-CH" dirty="0"/>
-              <a:t> to </a:t>
-            </a:r>
-            <a:r>
-              <a:rPr lang="de-CH" dirty="0" err="1"/>
-              <a:t>implement</a:t>
-            </a:r>
-            <a:r>
-              <a:rPr lang="de-CH" dirty="0"/>
-              <a:t> </a:t>
-            </a:r>
-            <a:r>
-              <a:rPr lang="de-CH" dirty="0" err="1"/>
-              <a:t>the</a:t>
-            </a:r>
-            <a:r>
-              <a:rPr lang="de-CH" dirty="0"/>
-              <a:t> </a:t>
-            </a:r>
-            <a:r>
-              <a:rPr lang="de-CH" dirty="0" err="1"/>
-              <a:t>main</a:t>
+              <a:t>matrix</a:t>
             </a:r>
             <a:r>
               <a:rPr lang="de-CH" dirty="0"/>
@@ -5197,47 +5081,7 @@
             </a:pPr>
             <a:r>
               <a:rPr lang="de-CH" dirty="0"/>
-              <a:t> The </a:t>
-            </a:r>
-            <a:r>
-              <a:rPr lang="de-CH" dirty="0" err="1"/>
-              <a:t>student</a:t>
-            </a:r>
-            <a:r>
-              <a:rPr lang="de-CH" dirty="0"/>
-              <a:t> is </a:t>
-            </a:r>
-            <a:r>
-              <a:rPr lang="de-CH" dirty="0" err="1"/>
-              <a:t>able</a:t>
-            </a:r>
-            <a:r>
-              <a:rPr lang="de-CH" dirty="0"/>
-              <a:t> to </a:t>
-            </a:r>
-            <a:r>
-              <a:rPr lang="de-CH" dirty="0" err="1"/>
-              <a:t>understand</a:t>
-            </a:r>
-            <a:r>
-              <a:rPr lang="de-CH" dirty="0"/>
-              <a:t> </a:t>
-            </a:r>
-            <a:r>
-              <a:rPr lang="de-CH" dirty="0" err="1"/>
-              <a:t>the</a:t>
-            </a:r>
-            <a:r>
-              <a:rPr lang="de-CH" dirty="0"/>
-              <a:t> </a:t>
-            </a:r>
-            <a:r>
-              <a:rPr lang="de-CH" dirty="0" err="1"/>
-              <a:t>difference</a:t>
-            </a:r>
-            <a:r>
-              <a:rPr lang="de-CH" dirty="0"/>
-              <a:t> in how numpy </a:t>
+              <a:t> Difference in how numpy </a:t>
             </a:r>
             <a:r>
               <a:rPr lang="de-CH" dirty="0" err="1"/>
@@ -5621,39 +5465,7 @@
             </a:pPr>
             <a:r>
               <a:rPr lang="de-CH" dirty="0"/>
-              <a:t> The </a:t>
-            </a:r>
-            <a:r>
-              <a:rPr lang="de-CH" dirty="0" err="1"/>
-              <a:t>students</a:t>
-            </a:r>
-            <a:r>
-              <a:rPr lang="de-CH" dirty="0"/>
-              <a:t> </a:t>
-            </a:r>
-            <a:r>
-              <a:rPr lang="de-CH" dirty="0" err="1"/>
-              <a:t>understand</a:t>
-            </a:r>
-            <a:r>
-              <a:rPr lang="de-CH" dirty="0"/>
-              <a:t> </a:t>
-            </a:r>
-            <a:r>
-              <a:rPr lang="de-CH" dirty="0" err="1"/>
-              <a:t>the</a:t>
-            </a:r>
-            <a:r>
-              <a:rPr lang="de-CH" dirty="0"/>
-              <a:t> </a:t>
-            </a:r>
-            <a:r>
-              <a:rPr lang="de-CH" dirty="0" err="1"/>
-              <a:t>basic</a:t>
-            </a:r>
-            <a:r>
-              <a:rPr lang="de-CH" dirty="0"/>
-              <a:t> and </a:t>
+              <a:t> Basics and </a:t>
             </a:r>
             <a:r>
               <a:rPr lang="de-CH" dirty="0" err="1"/>
@@ -5924,13 +5736,8 @@
             </a:r>
             <a:r>
               <a:rPr lang="de-CH" dirty="0"/>
-              <a:t> derivative of a function </a:t>
-            </a:r>
-            <a:r>
-              <a:rPr lang="de-CH"/>
-              <a:t>in Python </a:t>
-            </a:r>
-            <a:endParaRPr lang="de-CH" dirty="0"/>
+              <a:t> derivative of a function in Python </a:t>
+            </a:r>
           </a:p>
           <a:p>
             <a:pPr marL="0" indent="0">

</xml_diff>

<commit_message>
Updated a few learning goals.
</commit_message>
<xml_diff>
--- a/Learning_goals_overview.pptx
+++ b/Learning_goals_overview.pptx
@@ -2,7 +2,7 @@
 <file path=ppt/presentation.xml><?xml version="1.0" encoding="utf-8"?>
 <p:presentation xmlns:a="http://schemas.openxmlformats.org/drawingml/2006/main" xmlns:r="http://schemas.openxmlformats.org/officeDocument/2006/relationships" xmlns:p="http://schemas.openxmlformats.org/presentationml/2006/main" saveSubsetFonts="1">
   <p:sldMasterIdLst>
-    <p:sldMasterId id="2147483648" r:id="rId1"/>
+    <p:sldMasterId id="2147483661" r:id="rId1"/>
   </p:sldMasterIdLst>
   <p:sldIdLst>
     <p:sldId id="256" r:id="rId2"/>
@@ -29,7 +29,7 @@
   <p:notesSz cx="6858000" cy="9144000"/>
   <p:defaultTextStyle>
     <a:defPPr>
-      <a:defRPr lang="en-CH"/>
+      <a:defRPr lang="LID4096"/>
     </a:defPPr>
     <a:lvl1pPr marL="0" algn="l" defTabSz="914400" rtl="0" eaLnBrk="1" latinLnBrk="0" hangingPunct="1">
       <a:defRPr sz="1800" kern="1200">
@@ -152,7 +152,7 @@
           <p:cNvPr id="2" name="Title 1">
             <a:extLst>
               <a:ext uri="{FF2B5EF4-FFF2-40B4-BE49-F238E27FC236}">
-                <a16:creationId xmlns:a16="http://schemas.microsoft.com/office/drawing/2014/main" id="{C87BD25F-A21F-4332-B60C-B77ADEE2D8B7}"/>
+                <a16:creationId xmlns:a16="http://schemas.microsoft.com/office/drawing/2014/main" id="{4F069FD0-D0D2-4F7C-925B-5B87E4C10134}"/>
               </a:ext>
             </a:extLst>
           </p:cNvPr>
@@ -181,7 +181,7 @@
               <a:rPr lang="en-US"/>
               <a:t>Click to edit Master title style</a:t>
             </a:r>
-            <a:endParaRPr lang="en-CH"/>
+            <a:endParaRPr lang="LID4096"/>
           </a:p>
         </p:txBody>
       </p:sp>
@@ -190,7 +190,7 @@
           <p:cNvPr id="3" name="Subtitle 2">
             <a:extLst>
               <a:ext uri="{FF2B5EF4-FFF2-40B4-BE49-F238E27FC236}">
-                <a16:creationId xmlns:a16="http://schemas.microsoft.com/office/drawing/2014/main" id="{F5008D16-993B-49D4-A99C-0D254FAEAC8C}"/>
+                <a16:creationId xmlns:a16="http://schemas.microsoft.com/office/drawing/2014/main" id="{DE4DA841-B337-48BB-9282-6563859EC669}"/>
               </a:ext>
             </a:extLst>
           </p:cNvPr>
@@ -249,17 +249,100 @@
           </a:lstStyle>
           <a:p>
             <a:r>
-              <a:rPr lang="en-US" dirty="0"/>
+              <a:rPr lang="en-US"/>
               <a:t>Click to edit Master subtitle style</a:t>
             </a:r>
-            <a:endParaRPr lang="en-CH" dirty="0"/>
+            <a:endParaRPr lang="LID4096"/>
+          </a:p>
+        </p:txBody>
+      </p:sp>
+      <p:sp>
+        <p:nvSpPr>
+          <p:cNvPr id="4" name="Date Placeholder 3">
+            <a:extLst>
+              <a:ext uri="{FF2B5EF4-FFF2-40B4-BE49-F238E27FC236}">
+                <a16:creationId xmlns:a16="http://schemas.microsoft.com/office/drawing/2014/main" id="{1E4A0892-AF32-4E4F-9AF5-4A77CBD2173E}"/>
+              </a:ext>
+            </a:extLst>
+          </p:cNvPr>
+          <p:cNvSpPr>
+            <a:spLocks noGrp="1"/>
+          </p:cNvSpPr>
+          <p:nvPr>
+            <p:ph type="dt" sz="half" idx="10"/>
+          </p:nvPr>
+        </p:nvSpPr>
+        <p:spPr/>
+        <p:txBody>
+          <a:bodyPr/>
+          <a:lstStyle/>
+          <a:p>
+            <a:fld id="{B3FBFF04-4A75-4201-A41C-0AA1E22CE8EE}" type="datetimeFigureOut">
+              <a:rPr lang="LID4096" smtClean="0"/>
+              <a:t>10/22/2018</a:t>
+            </a:fld>
+            <a:endParaRPr lang="LID4096"/>
+          </a:p>
+        </p:txBody>
+      </p:sp>
+      <p:sp>
+        <p:nvSpPr>
+          <p:cNvPr id="5" name="Footer Placeholder 4">
+            <a:extLst>
+              <a:ext uri="{FF2B5EF4-FFF2-40B4-BE49-F238E27FC236}">
+                <a16:creationId xmlns:a16="http://schemas.microsoft.com/office/drawing/2014/main" id="{6A4C7DF7-1EE5-4AB3-B7CC-FAD1CF2652DD}"/>
+              </a:ext>
+            </a:extLst>
+          </p:cNvPr>
+          <p:cNvSpPr>
+            <a:spLocks noGrp="1"/>
+          </p:cNvSpPr>
+          <p:nvPr>
+            <p:ph type="ftr" sz="quarter" idx="11"/>
+          </p:nvPr>
+        </p:nvSpPr>
+        <p:spPr/>
+        <p:txBody>
+          <a:bodyPr/>
+          <a:lstStyle/>
+          <a:p>
+            <a:endParaRPr lang="LID4096"/>
+          </a:p>
+        </p:txBody>
+      </p:sp>
+      <p:sp>
+        <p:nvSpPr>
+          <p:cNvPr id="6" name="Slide Number Placeholder 5">
+            <a:extLst>
+              <a:ext uri="{FF2B5EF4-FFF2-40B4-BE49-F238E27FC236}">
+                <a16:creationId xmlns:a16="http://schemas.microsoft.com/office/drawing/2014/main" id="{38B81647-22CB-458B-9101-D44C39952F60}"/>
+              </a:ext>
+            </a:extLst>
+          </p:cNvPr>
+          <p:cNvSpPr>
+            <a:spLocks noGrp="1"/>
+          </p:cNvSpPr>
+          <p:nvPr>
+            <p:ph type="sldNum" sz="quarter" idx="12"/>
+          </p:nvPr>
+        </p:nvSpPr>
+        <p:spPr/>
+        <p:txBody>
+          <a:bodyPr/>
+          <a:lstStyle/>
+          <a:p>
+            <a:fld id="{1D8C28A7-6F01-49F5-9B4A-794BC8310AF0}" type="slidenum">
+              <a:rPr lang="LID4096" smtClean="0"/>
+              <a:t>‹#›</a:t>
+            </a:fld>
+            <a:endParaRPr lang="LID4096"/>
           </a:p>
         </p:txBody>
       </p:sp>
     </p:spTree>
     <p:extLst>
       <p:ext uri="{BB962C8B-B14F-4D97-AF65-F5344CB8AC3E}">
-        <p14:creationId xmlns:p14="http://schemas.microsoft.com/office/powerpoint/2010/main" val="218591190"/>
+        <p14:creationId xmlns:p14="http://schemas.microsoft.com/office/powerpoint/2010/main" val="846856851"/>
       </p:ext>
     </p:extLst>
   </p:cSld>
@@ -291,7 +374,7 @@
           <p:cNvPr id="2" name="Title 1">
             <a:extLst>
               <a:ext uri="{FF2B5EF4-FFF2-40B4-BE49-F238E27FC236}">
-                <a16:creationId xmlns:a16="http://schemas.microsoft.com/office/drawing/2014/main" id="{01955440-9F22-4878-9963-CE5BB0A3F708}"/>
+                <a16:creationId xmlns:a16="http://schemas.microsoft.com/office/drawing/2014/main" id="{7495D38D-94F8-4182-B930-F20296CAFC4B}"/>
               </a:ext>
             </a:extLst>
           </p:cNvPr>
@@ -311,7 +394,7 @@
               <a:rPr lang="en-US"/>
               <a:t>Click to edit Master title style</a:t>
             </a:r>
-            <a:endParaRPr lang="en-CH"/>
+            <a:endParaRPr lang="LID4096"/>
           </a:p>
         </p:txBody>
       </p:sp>
@@ -320,7 +403,7 @@
           <p:cNvPr id="3" name="Vertical Text Placeholder 2">
             <a:extLst>
               <a:ext uri="{FF2B5EF4-FFF2-40B4-BE49-F238E27FC236}">
-                <a16:creationId xmlns:a16="http://schemas.microsoft.com/office/drawing/2014/main" id="{DE5CB2D1-3549-4A16-809C-EB3D0F4493A0}"/>
+                <a16:creationId xmlns:a16="http://schemas.microsoft.com/office/drawing/2014/main" id="{CA47B1D9-6871-41BF-8313-009AB4F79372}"/>
               </a:ext>
             </a:extLst>
           </p:cNvPr>
@@ -369,14 +452,97 @@
               <a:rPr lang="en-US"/>
               <a:t>Fifth level</a:t>
             </a:r>
-            <a:endParaRPr lang="en-CH"/>
+            <a:endParaRPr lang="LID4096"/>
+          </a:p>
+        </p:txBody>
+      </p:sp>
+      <p:sp>
+        <p:nvSpPr>
+          <p:cNvPr id="4" name="Date Placeholder 3">
+            <a:extLst>
+              <a:ext uri="{FF2B5EF4-FFF2-40B4-BE49-F238E27FC236}">
+                <a16:creationId xmlns:a16="http://schemas.microsoft.com/office/drawing/2014/main" id="{43A7A073-F8CB-49C5-BB63-512A1920198B}"/>
+              </a:ext>
+            </a:extLst>
+          </p:cNvPr>
+          <p:cNvSpPr>
+            <a:spLocks noGrp="1"/>
+          </p:cNvSpPr>
+          <p:nvPr>
+            <p:ph type="dt" sz="half" idx="10"/>
+          </p:nvPr>
+        </p:nvSpPr>
+        <p:spPr/>
+        <p:txBody>
+          <a:bodyPr/>
+          <a:lstStyle/>
+          <a:p>
+            <a:fld id="{B3FBFF04-4A75-4201-A41C-0AA1E22CE8EE}" type="datetimeFigureOut">
+              <a:rPr lang="LID4096" smtClean="0"/>
+              <a:t>10/22/2018</a:t>
+            </a:fld>
+            <a:endParaRPr lang="LID4096"/>
+          </a:p>
+        </p:txBody>
+      </p:sp>
+      <p:sp>
+        <p:nvSpPr>
+          <p:cNvPr id="5" name="Footer Placeholder 4">
+            <a:extLst>
+              <a:ext uri="{FF2B5EF4-FFF2-40B4-BE49-F238E27FC236}">
+                <a16:creationId xmlns:a16="http://schemas.microsoft.com/office/drawing/2014/main" id="{5FF76F86-CE5E-495A-89DE-CC99074AE5FF}"/>
+              </a:ext>
+            </a:extLst>
+          </p:cNvPr>
+          <p:cNvSpPr>
+            <a:spLocks noGrp="1"/>
+          </p:cNvSpPr>
+          <p:nvPr>
+            <p:ph type="ftr" sz="quarter" idx="11"/>
+          </p:nvPr>
+        </p:nvSpPr>
+        <p:spPr/>
+        <p:txBody>
+          <a:bodyPr/>
+          <a:lstStyle/>
+          <a:p>
+            <a:endParaRPr lang="LID4096"/>
+          </a:p>
+        </p:txBody>
+      </p:sp>
+      <p:sp>
+        <p:nvSpPr>
+          <p:cNvPr id="6" name="Slide Number Placeholder 5">
+            <a:extLst>
+              <a:ext uri="{FF2B5EF4-FFF2-40B4-BE49-F238E27FC236}">
+                <a16:creationId xmlns:a16="http://schemas.microsoft.com/office/drawing/2014/main" id="{2EBC7A4D-170E-4C3F-994E-31427D637100}"/>
+              </a:ext>
+            </a:extLst>
+          </p:cNvPr>
+          <p:cNvSpPr>
+            <a:spLocks noGrp="1"/>
+          </p:cNvSpPr>
+          <p:nvPr>
+            <p:ph type="sldNum" sz="quarter" idx="12"/>
+          </p:nvPr>
+        </p:nvSpPr>
+        <p:spPr/>
+        <p:txBody>
+          <a:bodyPr/>
+          <a:lstStyle/>
+          <a:p>
+            <a:fld id="{1D8C28A7-6F01-49F5-9B4A-794BC8310AF0}" type="slidenum">
+              <a:rPr lang="LID4096" smtClean="0"/>
+              <a:t>‹#›</a:t>
+            </a:fld>
+            <a:endParaRPr lang="LID4096"/>
           </a:p>
         </p:txBody>
       </p:sp>
     </p:spTree>
     <p:extLst>
       <p:ext uri="{BB962C8B-B14F-4D97-AF65-F5344CB8AC3E}">
-        <p14:creationId xmlns:p14="http://schemas.microsoft.com/office/powerpoint/2010/main" val="3258079201"/>
+        <p14:creationId xmlns:p14="http://schemas.microsoft.com/office/powerpoint/2010/main" val="2400751779"/>
       </p:ext>
     </p:extLst>
   </p:cSld>
@@ -408,7 +574,7 @@
           <p:cNvPr id="2" name="Vertical Title 1">
             <a:extLst>
               <a:ext uri="{FF2B5EF4-FFF2-40B4-BE49-F238E27FC236}">
-                <a16:creationId xmlns:a16="http://schemas.microsoft.com/office/drawing/2014/main" id="{0F4CA516-6E39-492B-BA7C-6A3CC84DC46B}"/>
+                <a16:creationId xmlns:a16="http://schemas.microsoft.com/office/drawing/2014/main" id="{BC9EBB36-9467-4C4A-A1E3-8A54E5381971}"/>
               </a:ext>
             </a:extLst>
           </p:cNvPr>
@@ -433,7 +599,7 @@
               <a:rPr lang="en-US"/>
               <a:t>Click to edit Master title style</a:t>
             </a:r>
-            <a:endParaRPr lang="en-CH"/>
+            <a:endParaRPr lang="LID4096"/>
           </a:p>
         </p:txBody>
       </p:sp>
@@ -442,7 +608,7 @@
           <p:cNvPr id="3" name="Vertical Text Placeholder 2">
             <a:extLst>
               <a:ext uri="{FF2B5EF4-FFF2-40B4-BE49-F238E27FC236}">
-                <a16:creationId xmlns:a16="http://schemas.microsoft.com/office/drawing/2014/main" id="{7DBB3865-35FD-4B58-A930-7B794DC5DD56}"/>
+                <a16:creationId xmlns:a16="http://schemas.microsoft.com/office/drawing/2014/main" id="{D1C340FA-66EC-48E4-A7AF-CC4DA96D06A1}"/>
               </a:ext>
             </a:extLst>
           </p:cNvPr>
@@ -496,14 +662,97 @@
               <a:rPr lang="en-US"/>
               <a:t>Fifth level</a:t>
             </a:r>
-            <a:endParaRPr lang="en-CH"/>
+            <a:endParaRPr lang="LID4096"/>
+          </a:p>
+        </p:txBody>
+      </p:sp>
+      <p:sp>
+        <p:nvSpPr>
+          <p:cNvPr id="4" name="Date Placeholder 3">
+            <a:extLst>
+              <a:ext uri="{FF2B5EF4-FFF2-40B4-BE49-F238E27FC236}">
+                <a16:creationId xmlns:a16="http://schemas.microsoft.com/office/drawing/2014/main" id="{E0C61D7E-9C12-47E1-A237-B1F39C1CB33A}"/>
+              </a:ext>
+            </a:extLst>
+          </p:cNvPr>
+          <p:cNvSpPr>
+            <a:spLocks noGrp="1"/>
+          </p:cNvSpPr>
+          <p:nvPr>
+            <p:ph type="dt" sz="half" idx="10"/>
+          </p:nvPr>
+        </p:nvSpPr>
+        <p:spPr/>
+        <p:txBody>
+          <a:bodyPr/>
+          <a:lstStyle/>
+          <a:p>
+            <a:fld id="{B3FBFF04-4A75-4201-A41C-0AA1E22CE8EE}" type="datetimeFigureOut">
+              <a:rPr lang="LID4096" smtClean="0"/>
+              <a:t>10/22/2018</a:t>
+            </a:fld>
+            <a:endParaRPr lang="LID4096"/>
+          </a:p>
+        </p:txBody>
+      </p:sp>
+      <p:sp>
+        <p:nvSpPr>
+          <p:cNvPr id="5" name="Footer Placeholder 4">
+            <a:extLst>
+              <a:ext uri="{FF2B5EF4-FFF2-40B4-BE49-F238E27FC236}">
+                <a16:creationId xmlns:a16="http://schemas.microsoft.com/office/drawing/2014/main" id="{3DCB5B51-F3B0-48E8-A657-3854D3A0FAA5}"/>
+              </a:ext>
+            </a:extLst>
+          </p:cNvPr>
+          <p:cNvSpPr>
+            <a:spLocks noGrp="1"/>
+          </p:cNvSpPr>
+          <p:nvPr>
+            <p:ph type="ftr" sz="quarter" idx="11"/>
+          </p:nvPr>
+        </p:nvSpPr>
+        <p:spPr/>
+        <p:txBody>
+          <a:bodyPr/>
+          <a:lstStyle/>
+          <a:p>
+            <a:endParaRPr lang="LID4096"/>
+          </a:p>
+        </p:txBody>
+      </p:sp>
+      <p:sp>
+        <p:nvSpPr>
+          <p:cNvPr id="6" name="Slide Number Placeholder 5">
+            <a:extLst>
+              <a:ext uri="{FF2B5EF4-FFF2-40B4-BE49-F238E27FC236}">
+                <a16:creationId xmlns:a16="http://schemas.microsoft.com/office/drawing/2014/main" id="{4986A639-1B95-4108-87CA-8D7F385D0B54}"/>
+              </a:ext>
+            </a:extLst>
+          </p:cNvPr>
+          <p:cNvSpPr>
+            <a:spLocks noGrp="1"/>
+          </p:cNvSpPr>
+          <p:nvPr>
+            <p:ph type="sldNum" sz="quarter" idx="12"/>
+          </p:nvPr>
+        </p:nvSpPr>
+        <p:spPr/>
+        <p:txBody>
+          <a:bodyPr/>
+          <a:lstStyle/>
+          <a:p>
+            <a:fld id="{1D8C28A7-6F01-49F5-9B4A-794BC8310AF0}" type="slidenum">
+              <a:rPr lang="LID4096" smtClean="0"/>
+              <a:t>‹#›</a:t>
+            </a:fld>
+            <a:endParaRPr lang="LID4096"/>
           </a:p>
         </p:txBody>
       </p:sp>
     </p:spTree>
     <p:extLst>
       <p:ext uri="{BB962C8B-B14F-4D97-AF65-F5344CB8AC3E}">
-        <p14:creationId xmlns:p14="http://schemas.microsoft.com/office/powerpoint/2010/main" val="884627240"/>
+        <p14:creationId xmlns:p14="http://schemas.microsoft.com/office/powerpoint/2010/main" val="2912125361"/>
       </p:ext>
     </p:extLst>
   </p:cSld>
@@ -594,7 +843,7 @@
           <p:cNvPr id="2" name="Title 1">
             <a:extLst>
               <a:ext uri="{FF2B5EF4-FFF2-40B4-BE49-F238E27FC236}">
-                <a16:creationId xmlns:a16="http://schemas.microsoft.com/office/drawing/2014/main" id="{B93F7B18-ABC7-48CD-A653-B418473C614E}"/>
+                <a16:creationId xmlns:a16="http://schemas.microsoft.com/office/drawing/2014/main" id="{3ECDAE56-E288-4FA0-B1A7-300D680272E4}"/>
               </a:ext>
             </a:extLst>
           </p:cNvPr>
@@ -611,10 +860,10 @@
           <a:lstStyle/>
           <a:p>
             <a:r>
-              <a:rPr lang="en-US" dirty="0"/>
+              <a:rPr lang="en-US"/>
               <a:t>Click to edit Master title style</a:t>
             </a:r>
-            <a:endParaRPr lang="en-CH" dirty="0"/>
+            <a:endParaRPr lang="LID4096"/>
           </a:p>
         </p:txBody>
       </p:sp>
@@ -623,7 +872,7 @@
           <p:cNvPr id="3" name="Content Placeholder 2">
             <a:extLst>
               <a:ext uri="{FF2B5EF4-FFF2-40B4-BE49-F238E27FC236}">
-                <a16:creationId xmlns:a16="http://schemas.microsoft.com/office/drawing/2014/main" id="{98F05C4F-2BC6-4463-AA9D-A8A39ED1C59F}"/>
+                <a16:creationId xmlns:a16="http://schemas.microsoft.com/office/drawing/2014/main" id="{FB055F06-6EE2-41B4-BD92-B6DA9BEC4707}"/>
               </a:ext>
             </a:extLst>
           </p:cNvPr>
@@ -672,14 +921,97 @@
               <a:rPr lang="en-US"/>
               <a:t>Fifth level</a:t>
             </a:r>
-            <a:endParaRPr lang="en-CH"/>
+            <a:endParaRPr lang="LID4096"/>
+          </a:p>
+        </p:txBody>
+      </p:sp>
+      <p:sp>
+        <p:nvSpPr>
+          <p:cNvPr id="4" name="Date Placeholder 3">
+            <a:extLst>
+              <a:ext uri="{FF2B5EF4-FFF2-40B4-BE49-F238E27FC236}">
+                <a16:creationId xmlns:a16="http://schemas.microsoft.com/office/drawing/2014/main" id="{17229DBF-286F-46BC-8D2B-14A392C8A0D4}"/>
+              </a:ext>
+            </a:extLst>
+          </p:cNvPr>
+          <p:cNvSpPr>
+            <a:spLocks noGrp="1"/>
+          </p:cNvSpPr>
+          <p:nvPr>
+            <p:ph type="dt" sz="half" idx="10"/>
+          </p:nvPr>
+        </p:nvSpPr>
+        <p:spPr/>
+        <p:txBody>
+          <a:bodyPr/>
+          <a:lstStyle/>
+          <a:p>
+            <a:fld id="{B3FBFF04-4A75-4201-A41C-0AA1E22CE8EE}" type="datetimeFigureOut">
+              <a:rPr lang="LID4096" smtClean="0"/>
+              <a:t>10/22/2018</a:t>
+            </a:fld>
+            <a:endParaRPr lang="LID4096"/>
+          </a:p>
+        </p:txBody>
+      </p:sp>
+      <p:sp>
+        <p:nvSpPr>
+          <p:cNvPr id="5" name="Footer Placeholder 4">
+            <a:extLst>
+              <a:ext uri="{FF2B5EF4-FFF2-40B4-BE49-F238E27FC236}">
+                <a16:creationId xmlns:a16="http://schemas.microsoft.com/office/drawing/2014/main" id="{FFB0C016-03C0-4D03-BCD7-2EBDE36EC84B}"/>
+              </a:ext>
+            </a:extLst>
+          </p:cNvPr>
+          <p:cNvSpPr>
+            <a:spLocks noGrp="1"/>
+          </p:cNvSpPr>
+          <p:nvPr>
+            <p:ph type="ftr" sz="quarter" idx="11"/>
+          </p:nvPr>
+        </p:nvSpPr>
+        <p:spPr/>
+        <p:txBody>
+          <a:bodyPr/>
+          <a:lstStyle/>
+          <a:p>
+            <a:endParaRPr lang="LID4096"/>
+          </a:p>
+        </p:txBody>
+      </p:sp>
+      <p:sp>
+        <p:nvSpPr>
+          <p:cNvPr id="6" name="Slide Number Placeholder 5">
+            <a:extLst>
+              <a:ext uri="{FF2B5EF4-FFF2-40B4-BE49-F238E27FC236}">
+                <a16:creationId xmlns:a16="http://schemas.microsoft.com/office/drawing/2014/main" id="{36979BB0-5633-4BEB-842F-7F9A1ADD193D}"/>
+              </a:ext>
+            </a:extLst>
+          </p:cNvPr>
+          <p:cNvSpPr>
+            <a:spLocks noGrp="1"/>
+          </p:cNvSpPr>
+          <p:nvPr>
+            <p:ph type="sldNum" sz="quarter" idx="12"/>
+          </p:nvPr>
+        </p:nvSpPr>
+        <p:spPr/>
+        <p:txBody>
+          <a:bodyPr/>
+          <a:lstStyle/>
+          <a:p>
+            <a:fld id="{1D8C28A7-6F01-49F5-9B4A-794BC8310AF0}" type="slidenum">
+              <a:rPr lang="LID4096" smtClean="0"/>
+              <a:t>‹#›</a:t>
+            </a:fld>
+            <a:endParaRPr lang="LID4096"/>
           </a:p>
         </p:txBody>
       </p:sp>
     </p:spTree>
     <p:extLst>
       <p:ext uri="{BB962C8B-B14F-4D97-AF65-F5344CB8AC3E}">
-        <p14:creationId xmlns:p14="http://schemas.microsoft.com/office/powerpoint/2010/main" val="166300592"/>
+        <p14:creationId xmlns:p14="http://schemas.microsoft.com/office/powerpoint/2010/main" val="2666481632"/>
       </p:ext>
     </p:extLst>
   </p:cSld>
@@ -711,7 +1043,7 @@
           <p:cNvPr id="2" name="Title 1">
             <a:extLst>
               <a:ext uri="{FF2B5EF4-FFF2-40B4-BE49-F238E27FC236}">
-                <a16:creationId xmlns:a16="http://schemas.microsoft.com/office/drawing/2014/main" id="{86173C20-8CCD-426B-A6C4-5BCD7EFF571E}"/>
+                <a16:creationId xmlns:a16="http://schemas.microsoft.com/office/drawing/2014/main" id="{DAA23594-197C-4E54-BB23-63A3EE46470B}"/>
               </a:ext>
             </a:extLst>
           </p:cNvPr>
@@ -740,7 +1072,7 @@
               <a:rPr lang="en-US"/>
               <a:t>Click to edit Master title style</a:t>
             </a:r>
-            <a:endParaRPr lang="en-CH"/>
+            <a:endParaRPr lang="LID4096"/>
           </a:p>
         </p:txBody>
       </p:sp>
@@ -749,7 +1081,7 @@
           <p:cNvPr id="3" name="Text Placeholder 2">
             <a:extLst>
               <a:ext uri="{FF2B5EF4-FFF2-40B4-BE49-F238E27FC236}">
-                <a16:creationId xmlns:a16="http://schemas.microsoft.com/office/drawing/2014/main" id="{606E7598-00E2-469E-98FF-1104EC3AAF0B}"/>
+                <a16:creationId xmlns:a16="http://schemas.microsoft.com/office/drawing/2014/main" id="{7DDE6FE5-C823-4F64-A55E-C2C4ED040F79}"/>
               </a:ext>
             </a:extLst>
           </p:cNvPr>
@@ -869,10 +1201,93 @@
           </a:p>
         </p:txBody>
       </p:sp>
+      <p:sp>
+        <p:nvSpPr>
+          <p:cNvPr id="4" name="Date Placeholder 3">
+            <a:extLst>
+              <a:ext uri="{FF2B5EF4-FFF2-40B4-BE49-F238E27FC236}">
+                <a16:creationId xmlns:a16="http://schemas.microsoft.com/office/drawing/2014/main" id="{2592DA4C-3B40-427E-934C-593E9180DFCB}"/>
+              </a:ext>
+            </a:extLst>
+          </p:cNvPr>
+          <p:cNvSpPr>
+            <a:spLocks noGrp="1"/>
+          </p:cNvSpPr>
+          <p:nvPr>
+            <p:ph type="dt" sz="half" idx="10"/>
+          </p:nvPr>
+        </p:nvSpPr>
+        <p:spPr/>
+        <p:txBody>
+          <a:bodyPr/>
+          <a:lstStyle/>
+          <a:p>
+            <a:fld id="{B3FBFF04-4A75-4201-A41C-0AA1E22CE8EE}" type="datetimeFigureOut">
+              <a:rPr lang="LID4096" smtClean="0"/>
+              <a:t>10/22/2018</a:t>
+            </a:fld>
+            <a:endParaRPr lang="LID4096"/>
+          </a:p>
+        </p:txBody>
+      </p:sp>
+      <p:sp>
+        <p:nvSpPr>
+          <p:cNvPr id="5" name="Footer Placeholder 4">
+            <a:extLst>
+              <a:ext uri="{FF2B5EF4-FFF2-40B4-BE49-F238E27FC236}">
+                <a16:creationId xmlns:a16="http://schemas.microsoft.com/office/drawing/2014/main" id="{F918EB84-A5FF-47DD-A2D0-9BEDDB87A084}"/>
+              </a:ext>
+            </a:extLst>
+          </p:cNvPr>
+          <p:cNvSpPr>
+            <a:spLocks noGrp="1"/>
+          </p:cNvSpPr>
+          <p:nvPr>
+            <p:ph type="ftr" sz="quarter" idx="11"/>
+          </p:nvPr>
+        </p:nvSpPr>
+        <p:spPr/>
+        <p:txBody>
+          <a:bodyPr/>
+          <a:lstStyle/>
+          <a:p>
+            <a:endParaRPr lang="LID4096"/>
+          </a:p>
+        </p:txBody>
+      </p:sp>
+      <p:sp>
+        <p:nvSpPr>
+          <p:cNvPr id="6" name="Slide Number Placeholder 5">
+            <a:extLst>
+              <a:ext uri="{FF2B5EF4-FFF2-40B4-BE49-F238E27FC236}">
+                <a16:creationId xmlns:a16="http://schemas.microsoft.com/office/drawing/2014/main" id="{5DF3D847-B47E-4052-9831-6A4E72840EE8}"/>
+              </a:ext>
+            </a:extLst>
+          </p:cNvPr>
+          <p:cNvSpPr>
+            <a:spLocks noGrp="1"/>
+          </p:cNvSpPr>
+          <p:nvPr>
+            <p:ph type="sldNum" sz="quarter" idx="12"/>
+          </p:nvPr>
+        </p:nvSpPr>
+        <p:spPr/>
+        <p:txBody>
+          <a:bodyPr/>
+          <a:lstStyle/>
+          <a:p>
+            <a:fld id="{1D8C28A7-6F01-49F5-9B4A-794BC8310AF0}" type="slidenum">
+              <a:rPr lang="LID4096" smtClean="0"/>
+              <a:t>‹#›</a:t>
+            </a:fld>
+            <a:endParaRPr lang="LID4096"/>
+          </a:p>
+        </p:txBody>
+      </p:sp>
     </p:spTree>
     <p:extLst>
       <p:ext uri="{BB962C8B-B14F-4D97-AF65-F5344CB8AC3E}">
-        <p14:creationId xmlns:p14="http://schemas.microsoft.com/office/powerpoint/2010/main" val="830666875"/>
+        <p14:creationId xmlns:p14="http://schemas.microsoft.com/office/powerpoint/2010/main" val="1573696530"/>
       </p:ext>
     </p:extLst>
   </p:cSld>
@@ -904,7 +1319,7 @@
           <p:cNvPr id="2" name="Title 1">
             <a:extLst>
               <a:ext uri="{FF2B5EF4-FFF2-40B4-BE49-F238E27FC236}">
-                <a16:creationId xmlns:a16="http://schemas.microsoft.com/office/drawing/2014/main" id="{15FB3FE5-D6AE-4F3D-909A-9CB747223650}"/>
+                <a16:creationId xmlns:a16="http://schemas.microsoft.com/office/drawing/2014/main" id="{C19F37E7-F4C5-405A-8750-560E887EE59F}"/>
               </a:ext>
             </a:extLst>
           </p:cNvPr>
@@ -924,7 +1339,7 @@
               <a:rPr lang="en-US"/>
               <a:t>Click to edit Master title style</a:t>
             </a:r>
-            <a:endParaRPr lang="en-CH"/>
+            <a:endParaRPr lang="LID4096"/>
           </a:p>
         </p:txBody>
       </p:sp>
@@ -933,7 +1348,7 @@
           <p:cNvPr id="3" name="Content Placeholder 2">
             <a:extLst>
               <a:ext uri="{FF2B5EF4-FFF2-40B4-BE49-F238E27FC236}">
-                <a16:creationId xmlns:a16="http://schemas.microsoft.com/office/drawing/2014/main" id="{151A1D2E-A08A-4E36-87B2-466A3ED04A71}"/>
+                <a16:creationId xmlns:a16="http://schemas.microsoft.com/office/drawing/2014/main" id="{FCA6022F-5C9A-42CB-9321-CFC555FB22AD}"/>
               </a:ext>
             </a:extLst>
           </p:cNvPr>
@@ -987,7 +1402,7 @@
               <a:rPr lang="en-US"/>
               <a:t>Fifth level</a:t>
             </a:r>
-            <a:endParaRPr lang="en-CH"/>
+            <a:endParaRPr lang="LID4096"/>
           </a:p>
         </p:txBody>
       </p:sp>
@@ -996,7 +1411,7 @@
           <p:cNvPr id="4" name="Content Placeholder 3">
             <a:extLst>
               <a:ext uri="{FF2B5EF4-FFF2-40B4-BE49-F238E27FC236}">
-                <a16:creationId xmlns:a16="http://schemas.microsoft.com/office/drawing/2014/main" id="{C9B1FE37-F9AB-479D-BDC1-0CDE3CFEBD90}"/>
+                <a16:creationId xmlns:a16="http://schemas.microsoft.com/office/drawing/2014/main" id="{656D3448-CD29-463D-B28B-BD4065792ECD}"/>
               </a:ext>
             </a:extLst>
           </p:cNvPr>
@@ -1050,14 +1465,97 @@
               <a:rPr lang="en-US"/>
               <a:t>Fifth level</a:t>
             </a:r>
-            <a:endParaRPr lang="en-CH"/>
+            <a:endParaRPr lang="LID4096"/>
+          </a:p>
+        </p:txBody>
+      </p:sp>
+      <p:sp>
+        <p:nvSpPr>
+          <p:cNvPr id="5" name="Date Placeholder 4">
+            <a:extLst>
+              <a:ext uri="{FF2B5EF4-FFF2-40B4-BE49-F238E27FC236}">
+                <a16:creationId xmlns:a16="http://schemas.microsoft.com/office/drawing/2014/main" id="{297C4D93-F71F-4B5D-8470-C918F37FA5AD}"/>
+              </a:ext>
+            </a:extLst>
+          </p:cNvPr>
+          <p:cNvSpPr>
+            <a:spLocks noGrp="1"/>
+          </p:cNvSpPr>
+          <p:nvPr>
+            <p:ph type="dt" sz="half" idx="10"/>
+          </p:nvPr>
+        </p:nvSpPr>
+        <p:spPr/>
+        <p:txBody>
+          <a:bodyPr/>
+          <a:lstStyle/>
+          <a:p>
+            <a:fld id="{B3FBFF04-4A75-4201-A41C-0AA1E22CE8EE}" type="datetimeFigureOut">
+              <a:rPr lang="LID4096" smtClean="0"/>
+              <a:t>10/22/2018</a:t>
+            </a:fld>
+            <a:endParaRPr lang="LID4096"/>
+          </a:p>
+        </p:txBody>
+      </p:sp>
+      <p:sp>
+        <p:nvSpPr>
+          <p:cNvPr id="6" name="Footer Placeholder 5">
+            <a:extLst>
+              <a:ext uri="{FF2B5EF4-FFF2-40B4-BE49-F238E27FC236}">
+                <a16:creationId xmlns:a16="http://schemas.microsoft.com/office/drawing/2014/main" id="{7A4E4D36-9478-427E-AC6A-0670D36CE8AC}"/>
+              </a:ext>
+            </a:extLst>
+          </p:cNvPr>
+          <p:cNvSpPr>
+            <a:spLocks noGrp="1"/>
+          </p:cNvSpPr>
+          <p:nvPr>
+            <p:ph type="ftr" sz="quarter" idx="11"/>
+          </p:nvPr>
+        </p:nvSpPr>
+        <p:spPr/>
+        <p:txBody>
+          <a:bodyPr/>
+          <a:lstStyle/>
+          <a:p>
+            <a:endParaRPr lang="LID4096"/>
+          </a:p>
+        </p:txBody>
+      </p:sp>
+      <p:sp>
+        <p:nvSpPr>
+          <p:cNvPr id="7" name="Slide Number Placeholder 6">
+            <a:extLst>
+              <a:ext uri="{FF2B5EF4-FFF2-40B4-BE49-F238E27FC236}">
+                <a16:creationId xmlns:a16="http://schemas.microsoft.com/office/drawing/2014/main" id="{15A97CA1-BF73-445E-BC88-9CCEC414AE6D}"/>
+              </a:ext>
+            </a:extLst>
+          </p:cNvPr>
+          <p:cNvSpPr>
+            <a:spLocks noGrp="1"/>
+          </p:cNvSpPr>
+          <p:nvPr>
+            <p:ph type="sldNum" sz="quarter" idx="12"/>
+          </p:nvPr>
+        </p:nvSpPr>
+        <p:spPr/>
+        <p:txBody>
+          <a:bodyPr/>
+          <a:lstStyle/>
+          <a:p>
+            <a:fld id="{1D8C28A7-6F01-49F5-9B4A-794BC8310AF0}" type="slidenum">
+              <a:rPr lang="LID4096" smtClean="0"/>
+              <a:t>‹#›</a:t>
+            </a:fld>
+            <a:endParaRPr lang="LID4096"/>
           </a:p>
         </p:txBody>
       </p:sp>
     </p:spTree>
     <p:extLst>
       <p:ext uri="{BB962C8B-B14F-4D97-AF65-F5344CB8AC3E}">
-        <p14:creationId xmlns:p14="http://schemas.microsoft.com/office/powerpoint/2010/main" val="2540628752"/>
+        <p14:creationId xmlns:p14="http://schemas.microsoft.com/office/powerpoint/2010/main" val="3046976450"/>
       </p:ext>
     </p:extLst>
   </p:cSld>
@@ -1089,7 +1587,7 @@
           <p:cNvPr id="2" name="Title 1">
             <a:extLst>
               <a:ext uri="{FF2B5EF4-FFF2-40B4-BE49-F238E27FC236}">
-                <a16:creationId xmlns:a16="http://schemas.microsoft.com/office/drawing/2014/main" id="{79BABCE7-71BF-4CCD-8B2A-FB3DB6342196}"/>
+                <a16:creationId xmlns:a16="http://schemas.microsoft.com/office/drawing/2014/main" id="{89185655-7E25-4F03-82E8-B1FE3A029731}"/>
               </a:ext>
             </a:extLst>
           </p:cNvPr>
@@ -1114,7 +1612,7 @@
               <a:rPr lang="en-US"/>
               <a:t>Click to edit Master title style</a:t>
             </a:r>
-            <a:endParaRPr lang="en-CH"/>
+            <a:endParaRPr lang="LID4096"/>
           </a:p>
         </p:txBody>
       </p:sp>
@@ -1123,7 +1621,7 @@
           <p:cNvPr id="3" name="Text Placeholder 2">
             <a:extLst>
               <a:ext uri="{FF2B5EF4-FFF2-40B4-BE49-F238E27FC236}">
-                <a16:creationId xmlns:a16="http://schemas.microsoft.com/office/drawing/2014/main" id="{F62037C8-EFF9-4413-B18F-820FAF77DB20}"/>
+                <a16:creationId xmlns:a16="http://schemas.microsoft.com/office/drawing/2014/main" id="{0456E764-C28A-46EA-BBDF-43B06E63F452}"/>
               </a:ext>
             </a:extLst>
           </p:cNvPr>
@@ -1194,7 +1692,7 @@
           <p:cNvPr id="4" name="Content Placeholder 3">
             <a:extLst>
               <a:ext uri="{FF2B5EF4-FFF2-40B4-BE49-F238E27FC236}">
-                <a16:creationId xmlns:a16="http://schemas.microsoft.com/office/drawing/2014/main" id="{AC34EF99-30AC-4339-A5DD-7954130E694F}"/>
+                <a16:creationId xmlns:a16="http://schemas.microsoft.com/office/drawing/2014/main" id="{EABE87A1-EE7F-4F01-B87C-05140791BBCC}"/>
               </a:ext>
             </a:extLst>
           </p:cNvPr>
@@ -1248,7 +1746,7 @@
               <a:rPr lang="en-US"/>
               <a:t>Fifth level</a:t>
             </a:r>
-            <a:endParaRPr lang="en-CH"/>
+            <a:endParaRPr lang="LID4096"/>
           </a:p>
         </p:txBody>
       </p:sp>
@@ -1257,7 +1755,7 @@
           <p:cNvPr id="5" name="Text Placeholder 4">
             <a:extLst>
               <a:ext uri="{FF2B5EF4-FFF2-40B4-BE49-F238E27FC236}">
-                <a16:creationId xmlns:a16="http://schemas.microsoft.com/office/drawing/2014/main" id="{E4454F61-41F6-42B8-ADF4-9B1A4F1E1958}"/>
+                <a16:creationId xmlns:a16="http://schemas.microsoft.com/office/drawing/2014/main" id="{32751CAF-E0BA-4EF5-B127-98E76BCF83B7}"/>
               </a:ext>
             </a:extLst>
           </p:cNvPr>
@@ -1328,7 +1826,7 @@
           <p:cNvPr id="6" name="Content Placeholder 5">
             <a:extLst>
               <a:ext uri="{FF2B5EF4-FFF2-40B4-BE49-F238E27FC236}">
-                <a16:creationId xmlns:a16="http://schemas.microsoft.com/office/drawing/2014/main" id="{F72C8786-D4C2-4918-AC07-C4AB2097E6B9}"/>
+                <a16:creationId xmlns:a16="http://schemas.microsoft.com/office/drawing/2014/main" id="{2470B77A-4BC0-4ED6-8B8F-B63C2AD4237C}"/>
               </a:ext>
             </a:extLst>
           </p:cNvPr>
@@ -1382,14 +1880,97 @@
               <a:rPr lang="en-US"/>
               <a:t>Fifth level</a:t>
             </a:r>
-            <a:endParaRPr lang="en-CH"/>
+            <a:endParaRPr lang="LID4096"/>
+          </a:p>
+        </p:txBody>
+      </p:sp>
+      <p:sp>
+        <p:nvSpPr>
+          <p:cNvPr id="7" name="Date Placeholder 6">
+            <a:extLst>
+              <a:ext uri="{FF2B5EF4-FFF2-40B4-BE49-F238E27FC236}">
+                <a16:creationId xmlns:a16="http://schemas.microsoft.com/office/drawing/2014/main" id="{2CA2E74E-23DA-4439-A16C-FEA66061C691}"/>
+              </a:ext>
+            </a:extLst>
+          </p:cNvPr>
+          <p:cNvSpPr>
+            <a:spLocks noGrp="1"/>
+          </p:cNvSpPr>
+          <p:nvPr>
+            <p:ph type="dt" sz="half" idx="10"/>
+          </p:nvPr>
+        </p:nvSpPr>
+        <p:spPr/>
+        <p:txBody>
+          <a:bodyPr/>
+          <a:lstStyle/>
+          <a:p>
+            <a:fld id="{B3FBFF04-4A75-4201-A41C-0AA1E22CE8EE}" type="datetimeFigureOut">
+              <a:rPr lang="LID4096" smtClean="0"/>
+              <a:t>10/22/2018</a:t>
+            </a:fld>
+            <a:endParaRPr lang="LID4096"/>
+          </a:p>
+        </p:txBody>
+      </p:sp>
+      <p:sp>
+        <p:nvSpPr>
+          <p:cNvPr id="8" name="Footer Placeholder 7">
+            <a:extLst>
+              <a:ext uri="{FF2B5EF4-FFF2-40B4-BE49-F238E27FC236}">
+                <a16:creationId xmlns:a16="http://schemas.microsoft.com/office/drawing/2014/main" id="{F00715BE-3130-4F3F-9FD9-0CC52F4C3899}"/>
+              </a:ext>
+            </a:extLst>
+          </p:cNvPr>
+          <p:cNvSpPr>
+            <a:spLocks noGrp="1"/>
+          </p:cNvSpPr>
+          <p:nvPr>
+            <p:ph type="ftr" sz="quarter" idx="11"/>
+          </p:nvPr>
+        </p:nvSpPr>
+        <p:spPr/>
+        <p:txBody>
+          <a:bodyPr/>
+          <a:lstStyle/>
+          <a:p>
+            <a:endParaRPr lang="LID4096"/>
+          </a:p>
+        </p:txBody>
+      </p:sp>
+      <p:sp>
+        <p:nvSpPr>
+          <p:cNvPr id="9" name="Slide Number Placeholder 8">
+            <a:extLst>
+              <a:ext uri="{FF2B5EF4-FFF2-40B4-BE49-F238E27FC236}">
+                <a16:creationId xmlns:a16="http://schemas.microsoft.com/office/drawing/2014/main" id="{CA9BF38D-279C-4863-B0B3-BE074D14B07B}"/>
+              </a:ext>
+            </a:extLst>
+          </p:cNvPr>
+          <p:cNvSpPr>
+            <a:spLocks noGrp="1"/>
+          </p:cNvSpPr>
+          <p:nvPr>
+            <p:ph type="sldNum" sz="quarter" idx="12"/>
+          </p:nvPr>
+        </p:nvSpPr>
+        <p:spPr/>
+        <p:txBody>
+          <a:bodyPr/>
+          <a:lstStyle/>
+          <a:p>
+            <a:fld id="{1D8C28A7-6F01-49F5-9B4A-794BC8310AF0}" type="slidenum">
+              <a:rPr lang="LID4096" smtClean="0"/>
+              <a:t>‹#›</a:t>
+            </a:fld>
+            <a:endParaRPr lang="LID4096"/>
           </a:p>
         </p:txBody>
       </p:sp>
     </p:spTree>
     <p:extLst>
       <p:ext uri="{BB962C8B-B14F-4D97-AF65-F5344CB8AC3E}">
-        <p14:creationId xmlns:p14="http://schemas.microsoft.com/office/powerpoint/2010/main" val="2394648353"/>
+        <p14:creationId xmlns:p14="http://schemas.microsoft.com/office/powerpoint/2010/main" val="2303803686"/>
       </p:ext>
     </p:extLst>
   </p:cSld>
@@ -1421,7 +2002,7 @@
           <p:cNvPr id="2" name="Title 1">
             <a:extLst>
               <a:ext uri="{FF2B5EF4-FFF2-40B4-BE49-F238E27FC236}">
-                <a16:creationId xmlns:a16="http://schemas.microsoft.com/office/drawing/2014/main" id="{DC380A58-39D7-4B65-852F-6EF948F33936}"/>
+                <a16:creationId xmlns:a16="http://schemas.microsoft.com/office/drawing/2014/main" id="{4CF65A6D-AE59-4E12-A738-8597810D81EB}"/>
               </a:ext>
             </a:extLst>
           </p:cNvPr>
@@ -1441,14 +2022,97 @@
               <a:rPr lang="en-US"/>
               <a:t>Click to edit Master title style</a:t>
             </a:r>
-            <a:endParaRPr lang="en-CH"/>
+            <a:endParaRPr lang="LID4096"/>
+          </a:p>
+        </p:txBody>
+      </p:sp>
+      <p:sp>
+        <p:nvSpPr>
+          <p:cNvPr id="3" name="Date Placeholder 2">
+            <a:extLst>
+              <a:ext uri="{FF2B5EF4-FFF2-40B4-BE49-F238E27FC236}">
+                <a16:creationId xmlns:a16="http://schemas.microsoft.com/office/drawing/2014/main" id="{F1228116-93B2-44DE-A672-573E40D35324}"/>
+              </a:ext>
+            </a:extLst>
+          </p:cNvPr>
+          <p:cNvSpPr>
+            <a:spLocks noGrp="1"/>
+          </p:cNvSpPr>
+          <p:nvPr>
+            <p:ph type="dt" sz="half" idx="10"/>
+          </p:nvPr>
+        </p:nvSpPr>
+        <p:spPr/>
+        <p:txBody>
+          <a:bodyPr/>
+          <a:lstStyle/>
+          <a:p>
+            <a:fld id="{B3FBFF04-4A75-4201-A41C-0AA1E22CE8EE}" type="datetimeFigureOut">
+              <a:rPr lang="LID4096" smtClean="0"/>
+              <a:t>10/22/2018</a:t>
+            </a:fld>
+            <a:endParaRPr lang="LID4096"/>
+          </a:p>
+        </p:txBody>
+      </p:sp>
+      <p:sp>
+        <p:nvSpPr>
+          <p:cNvPr id="4" name="Footer Placeholder 3">
+            <a:extLst>
+              <a:ext uri="{FF2B5EF4-FFF2-40B4-BE49-F238E27FC236}">
+                <a16:creationId xmlns:a16="http://schemas.microsoft.com/office/drawing/2014/main" id="{E59DDBD4-27FC-4378-9B43-5725838D667A}"/>
+              </a:ext>
+            </a:extLst>
+          </p:cNvPr>
+          <p:cNvSpPr>
+            <a:spLocks noGrp="1"/>
+          </p:cNvSpPr>
+          <p:nvPr>
+            <p:ph type="ftr" sz="quarter" idx="11"/>
+          </p:nvPr>
+        </p:nvSpPr>
+        <p:spPr/>
+        <p:txBody>
+          <a:bodyPr/>
+          <a:lstStyle/>
+          <a:p>
+            <a:endParaRPr lang="LID4096"/>
+          </a:p>
+        </p:txBody>
+      </p:sp>
+      <p:sp>
+        <p:nvSpPr>
+          <p:cNvPr id="5" name="Slide Number Placeholder 4">
+            <a:extLst>
+              <a:ext uri="{FF2B5EF4-FFF2-40B4-BE49-F238E27FC236}">
+                <a16:creationId xmlns:a16="http://schemas.microsoft.com/office/drawing/2014/main" id="{811AE65A-6A90-4664-A885-529B599C5AD2}"/>
+              </a:ext>
+            </a:extLst>
+          </p:cNvPr>
+          <p:cNvSpPr>
+            <a:spLocks noGrp="1"/>
+          </p:cNvSpPr>
+          <p:nvPr>
+            <p:ph type="sldNum" sz="quarter" idx="12"/>
+          </p:nvPr>
+        </p:nvSpPr>
+        <p:spPr/>
+        <p:txBody>
+          <a:bodyPr/>
+          <a:lstStyle/>
+          <a:p>
+            <a:fld id="{1D8C28A7-6F01-49F5-9B4A-794BC8310AF0}" type="slidenum">
+              <a:rPr lang="LID4096" smtClean="0"/>
+              <a:t>‹#›</a:t>
+            </a:fld>
+            <a:endParaRPr lang="LID4096"/>
           </a:p>
         </p:txBody>
       </p:sp>
     </p:spTree>
     <p:extLst>
       <p:ext uri="{BB962C8B-B14F-4D97-AF65-F5344CB8AC3E}">
-        <p14:creationId xmlns:p14="http://schemas.microsoft.com/office/powerpoint/2010/main" val="3344805472"/>
+        <p14:creationId xmlns:p14="http://schemas.microsoft.com/office/powerpoint/2010/main" val="3746562234"/>
       </p:ext>
     </p:extLst>
   </p:cSld>
@@ -1475,10 +2139,93 @@
           <a:chExt cx="0" cy="0"/>
         </a:xfrm>
       </p:grpSpPr>
+      <p:sp>
+        <p:nvSpPr>
+          <p:cNvPr id="2" name="Date Placeholder 1">
+            <a:extLst>
+              <a:ext uri="{FF2B5EF4-FFF2-40B4-BE49-F238E27FC236}">
+                <a16:creationId xmlns:a16="http://schemas.microsoft.com/office/drawing/2014/main" id="{47CC8E34-4811-43D3-825E-9C11CA72B282}"/>
+              </a:ext>
+            </a:extLst>
+          </p:cNvPr>
+          <p:cNvSpPr>
+            <a:spLocks noGrp="1"/>
+          </p:cNvSpPr>
+          <p:nvPr>
+            <p:ph type="dt" sz="half" idx="10"/>
+          </p:nvPr>
+        </p:nvSpPr>
+        <p:spPr/>
+        <p:txBody>
+          <a:bodyPr/>
+          <a:lstStyle/>
+          <a:p>
+            <a:fld id="{B3FBFF04-4A75-4201-A41C-0AA1E22CE8EE}" type="datetimeFigureOut">
+              <a:rPr lang="LID4096" smtClean="0"/>
+              <a:t>10/22/2018</a:t>
+            </a:fld>
+            <a:endParaRPr lang="LID4096"/>
+          </a:p>
+        </p:txBody>
+      </p:sp>
+      <p:sp>
+        <p:nvSpPr>
+          <p:cNvPr id="3" name="Footer Placeholder 2">
+            <a:extLst>
+              <a:ext uri="{FF2B5EF4-FFF2-40B4-BE49-F238E27FC236}">
+                <a16:creationId xmlns:a16="http://schemas.microsoft.com/office/drawing/2014/main" id="{7E21E36A-B8A5-445E-BF0A-427783FC345B}"/>
+              </a:ext>
+            </a:extLst>
+          </p:cNvPr>
+          <p:cNvSpPr>
+            <a:spLocks noGrp="1"/>
+          </p:cNvSpPr>
+          <p:nvPr>
+            <p:ph type="ftr" sz="quarter" idx="11"/>
+          </p:nvPr>
+        </p:nvSpPr>
+        <p:spPr/>
+        <p:txBody>
+          <a:bodyPr/>
+          <a:lstStyle/>
+          <a:p>
+            <a:endParaRPr lang="LID4096"/>
+          </a:p>
+        </p:txBody>
+      </p:sp>
+      <p:sp>
+        <p:nvSpPr>
+          <p:cNvPr id="4" name="Slide Number Placeholder 3">
+            <a:extLst>
+              <a:ext uri="{FF2B5EF4-FFF2-40B4-BE49-F238E27FC236}">
+                <a16:creationId xmlns:a16="http://schemas.microsoft.com/office/drawing/2014/main" id="{C7660915-365E-48CE-96A9-0DC2F1620DDC}"/>
+              </a:ext>
+            </a:extLst>
+          </p:cNvPr>
+          <p:cNvSpPr>
+            <a:spLocks noGrp="1"/>
+          </p:cNvSpPr>
+          <p:nvPr>
+            <p:ph type="sldNum" sz="quarter" idx="12"/>
+          </p:nvPr>
+        </p:nvSpPr>
+        <p:spPr/>
+        <p:txBody>
+          <a:bodyPr/>
+          <a:lstStyle/>
+          <a:p>
+            <a:fld id="{1D8C28A7-6F01-49F5-9B4A-794BC8310AF0}" type="slidenum">
+              <a:rPr lang="LID4096" smtClean="0"/>
+              <a:t>‹#›</a:t>
+            </a:fld>
+            <a:endParaRPr lang="LID4096"/>
+          </a:p>
+        </p:txBody>
+      </p:sp>
     </p:spTree>
     <p:extLst>
       <p:ext uri="{BB962C8B-B14F-4D97-AF65-F5344CB8AC3E}">
-        <p14:creationId xmlns:p14="http://schemas.microsoft.com/office/powerpoint/2010/main" val="501174998"/>
+        <p14:creationId xmlns:p14="http://schemas.microsoft.com/office/powerpoint/2010/main" val="1407746131"/>
       </p:ext>
     </p:extLst>
   </p:cSld>
@@ -1510,7 +2257,7 @@
           <p:cNvPr id="2" name="Title 1">
             <a:extLst>
               <a:ext uri="{FF2B5EF4-FFF2-40B4-BE49-F238E27FC236}">
-                <a16:creationId xmlns:a16="http://schemas.microsoft.com/office/drawing/2014/main" id="{0E2864C8-84FF-48AF-A847-2FF7295C4F65}"/>
+                <a16:creationId xmlns:a16="http://schemas.microsoft.com/office/drawing/2014/main" id="{177D0D40-D341-4FD0-8D27-ADD941807955}"/>
               </a:ext>
             </a:extLst>
           </p:cNvPr>
@@ -1539,7 +2286,7 @@
               <a:rPr lang="en-US"/>
               <a:t>Click to edit Master title style</a:t>
             </a:r>
-            <a:endParaRPr lang="en-CH"/>
+            <a:endParaRPr lang="LID4096"/>
           </a:p>
         </p:txBody>
       </p:sp>
@@ -1548,7 +2295,7 @@
           <p:cNvPr id="3" name="Content Placeholder 2">
             <a:extLst>
               <a:ext uri="{FF2B5EF4-FFF2-40B4-BE49-F238E27FC236}">
-                <a16:creationId xmlns:a16="http://schemas.microsoft.com/office/drawing/2014/main" id="{E2683D52-B916-49FB-A41A-9B9D641EF821}"/>
+                <a16:creationId xmlns:a16="http://schemas.microsoft.com/office/drawing/2014/main" id="{B46F101C-E079-4094-940B-5EA821D0101C}"/>
               </a:ext>
             </a:extLst>
           </p:cNvPr>
@@ -1630,7 +2377,7 @@
               <a:rPr lang="en-US"/>
               <a:t>Fifth level</a:t>
             </a:r>
-            <a:endParaRPr lang="en-CH"/>
+            <a:endParaRPr lang="LID4096"/>
           </a:p>
         </p:txBody>
       </p:sp>
@@ -1639,7 +2386,7 @@
           <p:cNvPr id="4" name="Text Placeholder 3">
             <a:extLst>
               <a:ext uri="{FF2B5EF4-FFF2-40B4-BE49-F238E27FC236}">
-                <a16:creationId xmlns:a16="http://schemas.microsoft.com/office/drawing/2014/main" id="{C60FA9B0-A35A-4AB1-A0A3-7F9540BF9F0A}"/>
+                <a16:creationId xmlns:a16="http://schemas.microsoft.com/office/drawing/2014/main" id="{19038091-A87E-41AC-A6DB-18A581A24254}"/>
               </a:ext>
             </a:extLst>
           </p:cNvPr>
@@ -1705,10 +2452,93 @@
           </a:p>
         </p:txBody>
       </p:sp>
+      <p:sp>
+        <p:nvSpPr>
+          <p:cNvPr id="5" name="Date Placeholder 4">
+            <a:extLst>
+              <a:ext uri="{FF2B5EF4-FFF2-40B4-BE49-F238E27FC236}">
+                <a16:creationId xmlns:a16="http://schemas.microsoft.com/office/drawing/2014/main" id="{7B0FA34A-6465-4270-975D-630D822F51E3}"/>
+              </a:ext>
+            </a:extLst>
+          </p:cNvPr>
+          <p:cNvSpPr>
+            <a:spLocks noGrp="1"/>
+          </p:cNvSpPr>
+          <p:nvPr>
+            <p:ph type="dt" sz="half" idx="10"/>
+          </p:nvPr>
+        </p:nvSpPr>
+        <p:spPr/>
+        <p:txBody>
+          <a:bodyPr/>
+          <a:lstStyle/>
+          <a:p>
+            <a:fld id="{B3FBFF04-4A75-4201-A41C-0AA1E22CE8EE}" type="datetimeFigureOut">
+              <a:rPr lang="LID4096" smtClean="0"/>
+              <a:t>10/22/2018</a:t>
+            </a:fld>
+            <a:endParaRPr lang="LID4096"/>
+          </a:p>
+        </p:txBody>
+      </p:sp>
+      <p:sp>
+        <p:nvSpPr>
+          <p:cNvPr id="6" name="Footer Placeholder 5">
+            <a:extLst>
+              <a:ext uri="{FF2B5EF4-FFF2-40B4-BE49-F238E27FC236}">
+                <a16:creationId xmlns:a16="http://schemas.microsoft.com/office/drawing/2014/main" id="{40560AB8-EB3F-4F3D-9109-8D9DFC1CD85A}"/>
+              </a:ext>
+            </a:extLst>
+          </p:cNvPr>
+          <p:cNvSpPr>
+            <a:spLocks noGrp="1"/>
+          </p:cNvSpPr>
+          <p:nvPr>
+            <p:ph type="ftr" sz="quarter" idx="11"/>
+          </p:nvPr>
+        </p:nvSpPr>
+        <p:spPr/>
+        <p:txBody>
+          <a:bodyPr/>
+          <a:lstStyle/>
+          <a:p>
+            <a:endParaRPr lang="LID4096"/>
+          </a:p>
+        </p:txBody>
+      </p:sp>
+      <p:sp>
+        <p:nvSpPr>
+          <p:cNvPr id="7" name="Slide Number Placeholder 6">
+            <a:extLst>
+              <a:ext uri="{FF2B5EF4-FFF2-40B4-BE49-F238E27FC236}">
+                <a16:creationId xmlns:a16="http://schemas.microsoft.com/office/drawing/2014/main" id="{F51BD8D5-3A5A-43F1-91C2-54324F139A0F}"/>
+              </a:ext>
+            </a:extLst>
+          </p:cNvPr>
+          <p:cNvSpPr>
+            <a:spLocks noGrp="1"/>
+          </p:cNvSpPr>
+          <p:nvPr>
+            <p:ph type="sldNum" sz="quarter" idx="12"/>
+          </p:nvPr>
+        </p:nvSpPr>
+        <p:spPr/>
+        <p:txBody>
+          <a:bodyPr/>
+          <a:lstStyle/>
+          <a:p>
+            <a:fld id="{1D8C28A7-6F01-49F5-9B4A-794BC8310AF0}" type="slidenum">
+              <a:rPr lang="LID4096" smtClean="0"/>
+              <a:t>‹#›</a:t>
+            </a:fld>
+            <a:endParaRPr lang="LID4096"/>
+          </a:p>
+        </p:txBody>
+      </p:sp>
     </p:spTree>
     <p:extLst>
       <p:ext uri="{BB962C8B-B14F-4D97-AF65-F5344CB8AC3E}">
-        <p14:creationId xmlns:p14="http://schemas.microsoft.com/office/powerpoint/2010/main" val="1990722655"/>
+        <p14:creationId xmlns:p14="http://schemas.microsoft.com/office/powerpoint/2010/main" val="3077039632"/>
       </p:ext>
     </p:extLst>
   </p:cSld>
@@ -1740,7 +2570,7 @@
           <p:cNvPr id="2" name="Title 1">
             <a:extLst>
               <a:ext uri="{FF2B5EF4-FFF2-40B4-BE49-F238E27FC236}">
-                <a16:creationId xmlns:a16="http://schemas.microsoft.com/office/drawing/2014/main" id="{7118D54F-3113-43CB-83CB-B67D8F045306}"/>
+                <a16:creationId xmlns:a16="http://schemas.microsoft.com/office/drawing/2014/main" id="{2D7918E1-D048-4EA5-B7D0-148CD6345499}"/>
               </a:ext>
             </a:extLst>
           </p:cNvPr>
@@ -1769,7 +2599,7 @@
               <a:rPr lang="en-US"/>
               <a:t>Click to edit Master title style</a:t>
             </a:r>
-            <a:endParaRPr lang="en-CH"/>
+            <a:endParaRPr lang="LID4096"/>
           </a:p>
         </p:txBody>
       </p:sp>
@@ -1778,7 +2608,7 @@
           <p:cNvPr id="3" name="Picture Placeholder 2">
             <a:extLst>
               <a:ext uri="{FF2B5EF4-FFF2-40B4-BE49-F238E27FC236}">
-                <a16:creationId xmlns:a16="http://schemas.microsoft.com/office/drawing/2014/main" id="{CDE97376-4780-4E3C-AAB1-18A00E2EF8F1}"/>
+                <a16:creationId xmlns:a16="http://schemas.microsoft.com/office/drawing/2014/main" id="{A166FEA2-A2FA-4D1C-83C9-1A04E96447A5}"/>
               </a:ext>
             </a:extLst>
           </p:cNvPr>
@@ -1836,7 +2666,7 @@
             </a:lvl9pPr>
           </a:lstStyle>
           <a:p>
-            <a:endParaRPr lang="en-CH"/>
+            <a:endParaRPr lang="LID4096"/>
           </a:p>
         </p:txBody>
       </p:sp>
@@ -1845,7 +2675,7 @@
           <p:cNvPr id="4" name="Text Placeholder 3">
             <a:extLst>
               <a:ext uri="{FF2B5EF4-FFF2-40B4-BE49-F238E27FC236}">
-                <a16:creationId xmlns:a16="http://schemas.microsoft.com/office/drawing/2014/main" id="{6667570B-179A-4833-AF27-6EB080687677}"/>
+                <a16:creationId xmlns:a16="http://schemas.microsoft.com/office/drawing/2014/main" id="{87CB434F-64BB-4D5C-A266-784AFADC7240}"/>
               </a:ext>
             </a:extLst>
           </p:cNvPr>
@@ -1911,10 +2741,93 @@
           </a:p>
         </p:txBody>
       </p:sp>
+      <p:sp>
+        <p:nvSpPr>
+          <p:cNvPr id="5" name="Date Placeholder 4">
+            <a:extLst>
+              <a:ext uri="{FF2B5EF4-FFF2-40B4-BE49-F238E27FC236}">
+                <a16:creationId xmlns:a16="http://schemas.microsoft.com/office/drawing/2014/main" id="{3C318025-F07E-415A-98E4-D96AB353BA8D}"/>
+              </a:ext>
+            </a:extLst>
+          </p:cNvPr>
+          <p:cNvSpPr>
+            <a:spLocks noGrp="1"/>
+          </p:cNvSpPr>
+          <p:nvPr>
+            <p:ph type="dt" sz="half" idx="10"/>
+          </p:nvPr>
+        </p:nvSpPr>
+        <p:spPr/>
+        <p:txBody>
+          <a:bodyPr/>
+          <a:lstStyle/>
+          <a:p>
+            <a:fld id="{B3FBFF04-4A75-4201-A41C-0AA1E22CE8EE}" type="datetimeFigureOut">
+              <a:rPr lang="LID4096" smtClean="0"/>
+              <a:t>10/22/2018</a:t>
+            </a:fld>
+            <a:endParaRPr lang="LID4096"/>
+          </a:p>
+        </p:txBody>
+      </p:sp>
+      <p:sp>
+        <p:nvSpPr>
+          <p:cNvPr id="6" name="Footer Placeholder 5">
+            <a:extLst>
+              <a:ext uri="{FF2B5EF4-FFF2-40B4-BE49-F238E27FC236}">
+                <a16:creationId xmlns:a16="http://schemas.microsoft.com/office/drawing/2014/main" id="{10789374-5F7F-4983-96BB-F81A1223FA77}"/>
+              </a:ext>
+            </a:extLst>
+          </p:cNvPr>
+          <p:cNvSpPr>
+            <a:spLocks noGrp="1"/>
+          </p:cNvSpPr>
+          <p:nvPr>
+            <p:ph type="ftr" sz="quarter" idx="11"/>
+          </p:nvPr>
+        </p:nvSpPr>
+        <p:spPr/>
+        <p:txBody>
+          <a:bodyPr/>
+          <a:lstStyle/>
+          <a:p>
+            <a:endParaRPr lang="LID4096"/>
+          </a:p>
+        </p:txBody>
+      </p:sp>
+      <p:sp>
+        <p:nvSpPr>
+          <p:cNvPr id="7" name="Slide Number Placeholder 6">
+            <a:extLst>
+              <a:ext uri="{FF2B5EF4-FFF2-40B4-BE49-F238E27FC236}">
+                <a16:creationId xmlns:a16="http://schemas.microsoft.com/office/drawing/2014/main" id="{2FB23080-B146-48EA-818C-387C1EFC8F55}"/>
+              </a:ext>
+            </a:extLst>
+          </p:cNvPr>
+          <p:cNvSpPr>
+            <a:spLocks noGrp="1"/>
+          </p:cNvSpPr>
+          <p:nvPr>
+            <p:ph type="sldNum" sz="quarter" idx="12"/>
+          </p:nvPr>
+        </p:nvSpPr>
+        <p:spPr/>
+        <p:txBody>
+          <a:bodyPr/>
+          <a:lstStyle/>
+          <a:p>
+            <a:fld id="{1D8C28A7-6F01-49F5-9B4A-794BC8310AF0}" type="slidenum">
+              <a:rPr lang="LID4096" smtClean="0"/>
+              <a:t>‹#›</a:t>
+            </a:fld>
+            <a:endParaRPr lang="LID4096"/>
+          </a:p>
+        </p:txBody>
+      </p:sp>
     </p:spTree>
     <p:extLst>
       <p:ext uri="{BB962C8B-B14F-4D97-AF65-F5344CB8AC3E}">
-        <p14:creationId xmlns:p14="http://schemas.microsoft.com/office/powerpoint/2010/main" val="3474932899"/>
+        <p14:creationId xmlns:p14="http://schemas.microsoft.com/office/powerpoint/2010/main" val="329976216"/>
       </p:ext>
     </p:extLst>
   </p:cSld>
@@ -1951,7 +2864,7 @@
           <p:cNvPr id="2" name="Title Placeholder 1">
             <a:extLst>
               <a:ext uri="{FF2B5EF4-FFF2-40B4-BE49-F238E27FC236}">
-                <a16:creationId xmlns:a16="http://schemas.microsoft.com/office/drawing/2014/main" id="{60E8ECB6-54AB-4F82-8504-1D4ADD246870}"/>
+                <a16:creationId xmlns:a16="http://schemas.microsoft.com/office/drawing/2014/main" id="{6B0707E6-04BB-481B-8FEF-ADC8FEF1409C}"/>
               </a:ext>
             </a:extLst>
           </p:cNvPr>
@@ -1981,7 +2894,7 @@
               <a:rPr lang="en-US"/>
               <a:t>Click to edit Master title style</a:t>
             </a:r>
-            <a:endParaRPr lang="en-CH"/>
+            <a:endParaRPr lang="LID4096"/>
           </a:p>
         </p:txBody>
       </p:sp>
@@ -1990,7 +2903,7 @@
           <p:cNvPr id="3" name="Text Placeholder 2">
             <a:extLst>
               <a:ext uri="{FF2B5EF4-FFF2-40B4-BE49-F238E27FC236}">
-                <a16:creationId xmlns:a16="http://schemas.microsoft.com/office/drawing/2014/main" id="{F066D641-E979-4492-B9CC-E894A27D4A3F}"/>
+                <a16:creationId xmlns:a16="http://schemas.microsoft.com/office/drawing/2014/main" id="{ADC9464B-ACD1-49CB-9E3A-0ADDCBF73814}"/>
               </a:ext>
             </a:extLst>
           </p:cNvPr>
@@ -2049,16 +2962,153 @@
               <a:rPr lang="en-US"/>
               <a:t>Fifth level</a:t>
             </a:r>
-            <a:endParaRPr lang="en-CH"/>
-          </a:p>
-        </p:txBody>
-      </p:sp>
-      <p:sp>
-        <p:nvSpPr>
-          <p:cNvPr id="8" name="TextBox 7">
-            <a:extLst>
-              <a:ext uri="{FF2B5EF4-FFF2-40B4-BE49-F238E27FC236}">
-                <a16:creationId xmlns:a16="http://schemas.microsoft.com/office/drawing/2014/main" id="{81C8B5C6-8D0F-4097-940D-912627B9A9DC}"/>
+            <a:endParaRPr lang="LID4096"/>
+          </a:p>
+        </p:txBody>
+      </p:sp>
+      <p:sp>
+        <p:nvSpPr>
+          <p:cNvPr id="4" name="Date Placeholder 3">
+            <a:extLst>
+              <a:ext uri="{FF2B5EF4-FFF2-40B4-BE49-F238E27FC236}">
+                <a16:creationId xmlns:a16="http://schemas.microsoft.com/office/drawing/2014/main" id="{59E69963-16DF-4448-8FB6-73DDCD5D6E83}"/>
+              </a:ext>
+            </a:extLst>
+          </p:cNvPr>
+          <p:cNvSpPr>
+            <a:spLocks noGrp="1"/>
+          </p:cNvSpPr>
+          <p:nvPr>
+            <p:ph type="dt" sz="half" idx="2"/>
+          </p:nvPr>
+        </p:nvSpPr>
+        <p:spPr>
+          <a:xfrm>
+            <a:off x="838200" y="6356350"/>
+            <a:ext cx="2743200" cy="365125"/>
+          </a:xfrm>
+          <a:prstGeom prst="rect">
+            <a:avLst/>
+          </a:prstGeom>
+        </p:spPr>
+        <p:txBody>
+          <a:bodyPr vert="horz" lIns="91440" tIns="45720" rIns="91440" bIns="45720" rtlCol="0" anchor="ctr"/>
+          <a:lstStyle>
+            <a:lvl1pPr algn="l">
+              <a:defRPr sz="1200">
+                <a:solidFill>
+                  <a:schemeClr val="tx1">
+                    <a:tint val="75000"/>
+                  </a:schemeClr>
+                </a:solidFill>
+              </a:defRPr>
+            </a:lvl1pPr>
+          </a:lstStyle>
+          <a:p>
+            <a:fld id="{B3FBFF04-4A75-4201-A41C-0AA1E22CE8EE}" type="datetimeFigureOut">
+              <a:rPr lang="LID4096" smtClean="0"/>
+              <a:t>10/22/2018</a:t>
+            </a:fld>
+            <a:endParaRPr lang="LID4096"/>
+          </a:p>
+        </p:txBody>
+      </p:sp>
+      <p:sp>
+        <p:nvSpPr>
+          <p:cNvPr id="5" name="Footer Placeholder 4">
+            <a:extLst>
+              <a:ext uri="{FF2B5EF4-FFF2-40B4-BE49-F238E27FC236}">
+                <a16:creationId xmlns:a16="http://schemas.microsoft.com/office/drawing/2014/main" id="{2EDBD726-AE83-4C32-B257-5FB062E90B8A}"/>
+              </a:ext>
+            </a:extLst>
+          </p:cNvPr>
+          <p:cNvSpPr>
+            <a:spLocks noGrp="1"/>
+          </p:cNvSpPr>
+          <p:nvPr>
+            <p:ph type="ftr" sz="quarter" idx="3"/>
+          </p:nvPr>
+        </p:nvSpPr>
+        <p:spPr>
+          <a:xfrm>
+            <a:off x="4038600" y="6356350"/>
+            <a:ext cx="4114800" cy="365125"/>
+          </a:xfrm>
+          <a:prstGeom prst="rect">
+            <a:avLst/>
+          </a:prstGeom>
+        </p:spPr>
+        <p:txBody>
+          <a:bodyPr vert="horz" lIns="91440" tIns="45720" rIns="91440" bIns="45720" rtlCol="0" anchor="ctr"/>
+          <a:lstStyle>
+            <a:lvl1pPr algn="ctr">
+              <a:defRPr sz="1200">
+                <a:solidFill>
+                  <a:schemeClr val="tx1">
+                    <a:tint val="75000"/>
+                  </a:schemeClr>
+                </a:solidFill>
+              </a:defRPr>
+            </a:lvl1pPr>
+          </a:lstStyle>
+          <a:p>
+            <a:endParaRPr lang="LID4096"/>
+          </a:p>
+        </p:txBody>
+      </p:sp>
+      <p:sp>
+        <p:nvSpPr>
+          <p:cNvPr id="6" name="Slide Number Placeholder 5">
+            <a:extLst>
+              <a:ext uri="{FF2B5EF4-FFF2-40B4-BE49-F238E27FC236}">
+                <a16:creationId xmlns:a16="http://schemas.microsoft.com/office/drawing/2014/main" id="{FE9C66D5-D457-4A45-A196-B571A3466557}"/>
+              </a:ext>
+            </a:extLst>
+          </p:cNvPr>
+          <p:cNvSpPr>
+            <a:spLocks noGrp="1"/>
+          </p:cNvSpPr>
+          <p:nvPr>
+            <p:ph type="sldNum" sz="quarter" idx="4"/>
+          </p:nvPr>
+        </p:nvSpPr>
+        <p:spPr>
+          <a:xfrm>
+            <a:off x="8610600" y="6356350"/>
+            <a:ext cx="2743200" cy="365125"/>
+          </a:xfrm>
+          <a:prstGeom prst="rect">
+            <a:avLst/>
+          </a:prstGeom>
+        </p:spPr>
+        <p:txBody>
+          <a:bodyPr vert="horz" lIns="91440" tIns="45720" rIns="91440" bIns="45720" rtlCol="0" anchor="ctr"/>
+          <a:lstStyle>
+            <a:lvl1pPr algn="r">
+              <a:defRPr sz="1200">
+                <a:solidFill>
+                  <a:schemeClr val="tx1">
+                    <a:tint val="75000"/>
+                  </a:schemeClr>
+                </a:solidFill>
+              </a:defRPr>
+            </a:lvl1pPr>
+          </a:lstStyle>
+          <a:p>
+            <a:fld id="{1D8C28A7-6F01-49F5-9B4A-794BC8310AF0}" type="slidenum">
+              <a:rPr lang="LID4096" smtClean="0"/>
+              <a:t>‹#›</a:t>
+            </a:fld>
+            <a:endParaRPr lang="LID4096"/>
+          </a:p>
+        </p:txBody>
+      </p:sp>
+      <p:sp>
+        <p:nvSpPr>
+          <p:cNvPr id="7" name="TextBox 6">
+            <a:extLst>
+              <a:ext uri="{FF2B5EF4-FFF2-40B4-BE49-F238E27FC236}">
+                <a16:creationId xmlns:a16="http://schemas.microsoft.com/office/drawing/2014/main" id="{0170402F-C024-4CC8-AE39-B3A78D756C46}"/>
               </a:ext>
             </a:extLst>
           </p:cNvPr>
@@ -2118,10 +3168,10 @@
       </p:sp>
       <p:sp>
         <p:nvSpPr>
-          <p:cNvPr id="9" name="TextBox 8">
-            <a:extLst>
-              <a:ext uri="{FF2B5EF4-FFF2-40B4-BE49-F238E27FC236}">
-                <a16:creationId xmlns:a16="http://schemas.microsoft.com/office/drawing/2014/main" id="{772370AA-7037-4820-9D01-6369FEFEB4AD}"/>
+          <p:cNvPr id="8" name="TextBox 7">
+            <a:extLst>
+              <a:ext uri="{FF2B5EF4-FFF2-40B4-BE49-F238E27FC236}">
+                <a16:creationId xmlns:a16="http://schemas.microsoft.com/office/drawing/2014/main" id="{6AE2C7CC-C6D1-410B-9C7C-B9C97ABE4CA4}"/>
               </a:ext>
             </a:extLst>
           </p:cNvPr>
@@ -2171,10 +3221,10 @@
       </p:sp>
       <p:sp>
         <p:nvSpPr>
-          <p:cNvPr id="11" name="TextBox 10">
-            <a:extLst>
-              <a:ext uri="{FF2B5EF4-FFF2-40B4-BE49-F238E27FC236}">
-                <a16:creationId xmlns:a16="http://schemas.microsoft.com/office/drawing/2014/main" id="{BC88BE6C-E4D0-46CA-B9AF-7C8A5E76FDA5}"/>
+          <p:cNvPr id="9" name="TextBox 8">
+            <a:extLst>
+              <a:ext uri="{FF2B5EF4-FFF2-40B4-BE49-F238E27FC236}">
+                <a16:creationId xmlns:a16="http://schemas.microsoft.com/office/drawing/2014/main" id="{12455964-A2A0-45BA-BEC5-9936562CC4B4}"/>
               </a:ext>
             </a:extLst>
           </p:cNvPr>
@@ -2249,10 +3299,10 @@
       </p:sp>
       <p:cxnSp>
         <p:nvCxnSpPr>
-          <p:cNvPr id="12" name="Straight Connector 11">
-            <a:extLst>
-              <a:ext uri="{FF2B5EF4-FFF2-40B4-BE49-F238E27FC236}">
-                <a16:creationId xmlns:a16="http://schemas.microsoft.com/office/drawing/2014/main" id="{20595D74-BF5E-4154-994E-8A88F80D7F6E}"/>
+          <p:cNvPr id="10" name="Straight Connector 9">
+            <a:extLst>
+              <a:ext uri="{FF2B5EF4-FFF2-40B4-BE49-F238E27FC236}">
+                <a16:creationId xmlns:a16="http://schemas.microsoft.com/office/drawing/2014/main" id="{D0C18475-4365-4F46-BEE0-05EF8F052430}"/>
               </a:ext>
             </a:extLst>
           </p:cNvPr>
@@ -2295,23 +3345,23 @@
     </p:spTree>
     <p:extLst>
       <p:ext uri="{BB962C8B-B14F-4D97-AF65-F5344CB8AC3E}">
-        <p14:creationId xmlns:p14="http://schemas.microsoft.com/office/powerpoint/2010/main" val="4219300811"/>
+        <p14:creationId xmlns:p14="http://schemas.microsoft.com/office/powerpoint/2010/main" val="894312917"/>
       </p:ext>
     </p:extLst>
   </p:cSld>
   <p:clrMap bg1="lt1" tx1="dk1" bg2="lt2" tx2="dk2" accent1="accent1" accent2="accent2" accent3="accent3" accent4="accent4" accent5="accent5" accent6="accent6" hlink="hlink" folHlink="folHlink"/>
   <p:sldLayoutIdLst>
-    <p:sldLayoutId id="2147483649" r:id="rId1"/>
-    <p:sldLayoutId id="2147483650" r:id="rId2"/>
-    <p:sldLayoutId id="2147483651" r:id="rId3"/>
-    <p:sldLayoutId id="2147483652" r:id="rId4"/>
-    <p:sldLayoutId id="2147483653" r:id="rId5"/>
-    <p:sldLayoutId id="2147483654" r:id="rId6"/>
-    <p:sldLayoutId id="2147483655" r:id="rId7"/>
-    <p:sldLayoutId id="2147483656" r:id="rId8"/>
-    <p:sldLayoutId id="2147483657" r:id="rId9"/>
-    <p:sldLayoutId id="2147483658" r:id="rId10"/>
-    <p:sldLayoutId id="2147483659" r:id="rId11"/>
+    <p:sldLayoutId id="2147483662" r:id="rId1"/>
+    <p:sldLayoutId id="2147483663" r:id="rId2"/>
+    <p:sldLayoutId id="2147483664" r:id="rId3"/>
+    <p:sldLayoutId id="2147483665" r:id="rId4"/>
+    <p:sldLayoutId id="2147483666" r:id="rId5"/>
+    <p:sldLayoutId id="2147483667" r:id="rId6"/>
+    <p:sldLayoutId id="2147483668" r:id="rId7"/>
+    <p:sldLayoutId id="2147483669" r:id="rId8"/>
+    <p:sldLayoutId id="2147483670" r:id="rId9"/>
+    <p:sldLayoutId id="2147483671" r:id="rId10"/>
+    <p:sldLayoutId id="2147483672" r:id="rId11"/>
     <p:sldLayoutId id="2147483660" r:id="rId12"/>
   </p:sldLayoutIdLst>
   <p:txStyles>
@@ -2500,7 +3550,7 @@
     </p:bodyStyle>
     <p:otherStyle>
       <a:defPPr>
-        <a:defRPr lang="en-CH"/>
+        <a:defRPr lang="LID4096"/>
       </a:defPPr>
       <a:lvl1pPr marL="0" algn="l" defTabSz="914400" rtl="0" eaLnBrk="1" latinLnBrk="0" hangingPunct="1">
         <a:defRPr sz="1800" kern="1200">
@@ -2624,206 +3674,6 @@
       </p:grpSpPr>
       <p:sp>
         <p:nvSpPr>
-          <p:cNvPr id="20" name="Rectangle 14">
-            <a:extLst>
-              <a:ext uri="{FF2B5EF4-FFF2-40B4-BE49-F238E27FC236}">
-                <a16:creationId xmlns:a16="http://schemas.microsoft.com/office/drawing/2014/main" id="{D8386171-E87D-46AB-8718-4CE2A88748BD}"/>
-              </a:ext>
-              <a:ext uri="{C183D7F6-B498-43B3-948B-1728B52AA6E4}">
-                <adec:decorative xmlns:adec="http://schemas.microsoft.com/office/drawing/2017/decorative" val="1"/>
-              </a:ext>
-            </a:extLst>
-          </p:cNvPr>
-          <p:cNvSpPr>
-            <a:spLocks noGrp="1" noRot="1" noChangeAspect="1" noMove="1" noResize="1" noEditPoints="1" noAdjustHandles="1" noChangeArrowheads="1" noChangeShapeType="1" noTextEdit="1"/>
-          </p:cNvSpPr>
-          <p:nvPr>
-            <p:extLst>
-              <p:ext uri="{386F3935-93C4-4BCD-93E2-E3B085C9AB24}">
-                <p16:designElem xmlns:p16="http://schemas.microsoft.com/office/powerpoint/2015/main" val="1"/>
-              </p:ext>
-            </p:extLst>
-          </p:nvPr>
-        </p:nvSpPr>
-        <p:spPr>
-          <a:xfrm>
-            <a:off x="0" y="0"/>
-            <a:ext cx="12192000" cy="6858000"/>
-          </a:xfrm>
-          <a:prstGeom prst="rect">
-            <a:avLst/>
-          </a:prstGeom>
-          <a:solidFill>
-            <a:srgbClr val="C8CACA"/>
-          </a:solidFill>
-          <a:ln>
-            <a:noFill/>
-          </a:ln>
-        </p:spPr>
-        <p:style>
-          <a:lnRef idx="2">
-            <a:schemeClr val="accent1">
-              <a:shade val="50000"/>
-            </a:schemeClr>
-          </a:lnRef>
-          <a:fillRef idx="1">
-            <a:schemeClr val="accent1"/>
-          </a:fillRef>
-          <a:effectRef idx="0">
-            <a:schemeClr val="accent1"/>
-          </a:effectRef>
-          <a:fontRef idx="minor">
-            <a:schemeClr val="lt1"/>
-          </a:fontRef>
-        </p:style>
-        <p:txBody>
-          <a:bodyPr rtlCol="0" anchor="ctr"/>
-          <a:lstStyle/>
-          <a:p>
-            <a:pPr algn="ctr"/>
-            <a:endParaRPr lang="en-US"/>
-          </a:p>
-        </p:txBody>
-      </p:sp>
-      <p:sp>
-        <p:nvSpPr>
-          <p:cNvPr id="21" name="Rounded Rectangle 26">
-            <a:extLst>
-              <a:ext uri="{FF2B5EF4-FFF2-40B4-BE49-F238E27FC236}">
-                <a16:creationId xmlns:a16="http://schemas.microsoft.com/office/drawing/2014/main" id="{207CB456-8849-413C-8210-B663779A32E0}"/>
-              </a:ext>
-              <a:ext uri="{C183D7F6-B498-43B3-948B-1728B52AA6E4}">
-                <adec:decorative xmlns:adec="http://schemas.microsoft.com/office/drawing/2017/decorative" val="1"/>
-              </a:ext>
-            </a:extLst>
-          </p:cNvPr>
-          <p:cNvSpPr>
-            <a:spLocks noGrp="1" noRot="1" noChangeAspect="1" noMove="1" noResize="1" noEditPoints="1" noAdjustHandles="1" noChangeArrowheads="1" noChangeShapeType="1" noTextEdit="1"/>
-          </p:cNvSpPr>
-          <p:nvPr>
-            <p:extLst>
-              <p:ext uri="{386F3935-93C4-4BCD-93E2-E3B085C9AB24}">
-                <p16:designElem xmlns:p16="http://schemas.microsoft.com/office/powerpoint/2015/main" val="1"/>
-              </p:ext>
-            </p:extLst>
-          </p:nvPr>
-        </p:nvSpPr>
-        <p:spPr>
-          <a:xfrm>
-            <a:off x="646745" y="640080"/>
-            <a:ext cx="10920415" cy="5577818"/>
-          </a:xfrm>
-          <a:prstGeom prst="roundRect">
-            <a:avLst>
-              <a:gd name="adj" fmla="val 0"/>
-            </a:avLst>
-          </a:prstGeom>
-          <a:solidFill>
-            <a:srgbClr val="FFFFFF"/>
-          </a:solidFill>
-          <a:ln w="9525">
-            <a:solidFill>
-              <a:srgbClr val="C8CACA"/>
-            </a:solidFill>
-          </a:ln>
-          <a:effectLst>
-            <a:outerShdw blurRad="57150" dist="19050" dir="5400000" algn="t" rotWithShape="0">
-              <a:prstClr val="black">
-                <a:alpha val="63000"/>
-              </a:prstClr>
-            </a:outerShdw>
-          </a:effectLst>
-        </p:spPr>
-        <p:style>
-          <a:lnRef idx="2">
-            <a:schemeClr val="accent1">
-              <a:shade val="50000"/>
-            </a:schemeClr>
-          </a:lnRef>
-          <a:fillRef idx="1">
-            <a:schemeClr val="accent1"/>
-          </a:fillRef>
-          <a:effectRef idx="0">
-            <a:schemeClr val="accent1"/>
-          </a:effectRef>
-          <a:fontRef idx="minor">
-            <a:schemeClr val="lt1"/>
-          </a:fontRef>
-        </p:style>
-        <p:txBody>
-          <a:bodyPr rtlCol="0" anchor="ctr"/>
-          <a:lstStyle/>
-          <a:p>
-            <a:pPr algn="ctr"/>
-            <a:endParaRPr lang="en-US"/>
-          </a:p>
-        </p:txBody>
-      </p:sp>
-      <p:sp>
-        <p:nvSpPr>
-          <p:cNvPr id="19" name="Rectangle 18">
-            <a:extLst>
-              <a:ext uri="{FF2B5EF4-FFF2-40B4-BE49-F238E27FC236}">
-                <a16:creationId xmlns:a16="http://schemas.microsoft.com/office/drawing/2014/main" id="{E513936D-D1EB-4E42-A97F-942BA1F3DFA7}"/>
-              </a:ext>
-              <a:ext uri="{C183D7F6-B498-43B3-948B-1728B52AA6E4}">
-                <adec:decorative xmlns:adec="http://schemas.microsoft.com/office/drawing/2017/decorative" val="1"/>
-              </a:ext>
-            </a:extLst>
-          </p:cNvPr>
-          <p:cNvSpPr>
-            <a:spLocks noGrp="1" noRot="1" noChangeAspect="1" noMove="1" noResize="1" noEditPoints="1" noAdjustHandles="1" noChangeArrowheads="1" noChangeShapeType="1" noTextEdit="1"/>
-          </p:cNvSpPr>
-          <p:nvPr>
-            <p:extLst>
-              <p:ext uri="{386F3935-93C4-4BCD-93E2-E3B085C9AB24}">
-                <p16:designElem xmlns:p16="http://schemas.microsoft.com/office/powerpoint/2015/main" val="1"/>
-              </p:ext>
-            </p:extLst>
-          </p:nvPr>
-        </p:nvSpPr>
-        <p:spPr>
-          <a:xfrm>
-            <a:off x="968024" y="960109"/>
-            <a:ext cx="10277856" cy="4937760"/>
-          </a:xfrm>
-          <a:prstGeom prst="rect">
-            <a:avLst/>
-          </a:prstGeom>
-          <a:solidFill>
-            <a:schemeClr val="bg2"/>
-          </a:solidFill>
-          <a:ln>
-            <a:noFill/>
-          </a:ln>
-        </p:spPr>
-        <p:style>
-          <a:lnRef idx="2">
-            <a:schemeClr val="accent1">
-              <a:shade val="50000"/>
-            </a:schemeClr>
-          </a:lnRef>
-          <a:fillRef idx="1">
-            <a:schemeClr val="accent1"/>
-          </a:fillRef>
-          <a:effectRef idx="0">
-            <a:schemeClr val="accent1"/>
-          </a:effectRef>
-          <a:fontRef idx="minor">
-            <a:schemeClr val="lt1"/>
-          </a:fontRef>
-        </p:style>
-        <p:txBody>
-          <a:bodyPr rtlCol="0" anchor="ctr"/>
-          <a:lstStyle/>
-          <a:p>
-            <a:pPr algn="ctr"/>
-            <a:endParaRPr lang="en-US"/>
-          </a:p>
-        </p:txBody>
-      </p:sp>
-      <p:sp>
-        <p:nvSpPr>
           <p:cNvPr id="2" name="Title 1">
             <a:extLst>
               <a:ext uri="{FF2B5EF4-FFF2-40B4-BE49-F238E27FC236}">
@@ -2943,6 +3793,89 @@
           </a:p>
         </p:txBody>
       </p:sp>
+      <p:pic>
+        <p:nvPicPr>
+          <p:cNvPr id="8" name="Picture 7" descr="A close up of a logo&#10;&#10;Description generated with very high confidence">
+            <a:extLst>
+              <a:ext uri="{FF2B5EF4-FFF2-40B4-BE49-F238E27FC236}">
+                <a16:creationId xmlns:a16="http://schemas.microsoft.com/office/drawing/2014/main" id="{59291296-17DA-493F-8CCF-6CFC3AB32806}"/>
+              </a:ext>
+            </a:extLst>
+          </p:cNvPr>
+          <p:cNvPicPr>
+            <a:picLocks noChangeAspect="1"/>
+          </p:cNvPicPr>
+          <p:nvPr/>
+        </p:nvPicPr>
+        <p:blipFill>
+          <a:blip r:embed="rId2">
+            <a:extLst>
+              <a:ext uri="{28A0092B-C50C-407E-A947-70E740481C1C}">
+                <a14:useLocalDpi xmlns:a14="http://schemas.microsoft.com/office/drawing/2010/main" val="0"/>
+              </a:ext>
+            </a:extLst>
+          </a:blip>
+          <a:stretch>
+            <a:fillRect/>
+          </a:stretch>
+        </p:blipFill>
+        <p:spPr>
+          <a:xfrm>
+            <a:off x="10858477" y="75851"/>
+            <a:ext cx="1231599" cy="224700"/>
+          </a:xfrm>
+          <a:prstGeom prst="rect">
+            <a:avLst/>
+          </a:prstGeom>
+        </p:spPr>
+      </p:pic>
+      <p:pic>
+        <p:nvPicPr>
+          <p:cNvPr id="9" name="Picture 2" descr="Image result for zhaw ias logo burkhard">
+            <a:extLst>
+              <a:ext uri="{FF2B5EF4-FFF2-40B4-BE49-F238E27FC236}">
+                <a16:creationId xmlns:a16="http://schemas.microsoft.com/office/drawing/2014/main" id="{F4B7FCCB-B209-4BE0-A911-B60EC7EA17B4}"/>
+              </a:ext>
+            </a:extLst>
+          </p:cNvPr>
+          <p:cNvPicPr>
+            <a:picLocks noChangeAspect="1" noChangeArrowheads="1"/>
+          </p:cNvPicPr>
+          <p:nvPr/>
+        </p:nvPicPr>
+        <p:blipFill>
+          <a:blip r:embed="rId3">
+            <a:extLst>
+              <a:ext uri="{28A0092B-C50C-407E-A947-70E740481C1C}">
+                <a14:useLocalDpi xmlns:a14="http://schemas.microsoft.com/office/drawing/2010/main" val="0"/>
+              </a:ext>
+            </a:extLst>
+          </a:blip>
+          <a:srcRect/>
+          <a:stretch>
+            <a:fillRect/>
+          </a:stretch>
+        </p:blipFill>
+        <p:spPr bwMode="auto">
+          <a:xfrm>
+            <a:off x="10858477" y="368326"/>
+            <a:ext cx="1127067" cy="516197"/>
+          </a:xfrm>
+          <a:prstGeom prst="rect">
+            <a:avLst/>
+          </a:prstGeom>
+          <a:noFill/>
+          <a:extLst>
+            <a:ext uri="{909E8E84-426E-40DD-AFC4-6F175D3DCCD1}">
+              <a14:hiddenFill xmlns:a14="http://schemas.microsoft.com/office/drawing/2010/main">
+                <a:solidFill>
+                  <a:srgbClr val="FFFFFF"/>
+                </a:solidFill>
+              </a14:hiddenFill>
+            </a:ext>
+          </a:extLst>
+        </p:spPr>
+      </p:pic>
     </p:spTree>
     <p:extLst>
       <p:ext uri="{BB962C8B-B14F-4D97-AF65-F5344CB8AC3E}">
@@ -3087,6 +4020,89 @@
           </a:p>
         </p:txBody>
       </p:sp>
+      <p:pic>
+        <p:nvPicPr>
+          <p:cNvPr id="6" name="Picture 5" descr="A close up of a logo&#10;&#10;Description generated with very high confidence">
+            <a:extLst>
+              <a:ext uri="{FF2B5EF4-FFF2-40B4-BE49-F238E27FC236}">
+                <a16:creationId xmlns:a16="http://schemas.microsoft.com/office/drawing/2014/main" id="{28E87149-42C3-4227-AE26-66C1DCF9BF25}"/>
+              </a:ext>
+            </a:extLst>
+          </p:cNvPr>
+          <p:cNvPicPr>
+            <a:picLocks noChangeAspect="1"/>
+          </p:cNvPicPr>
+          <p:nvPr/>
+        </p:nvPicPr>
+        <p:blipFill>
+          <a:blip r:embed="rId2">
+            <a:extLst>
+              <a:ext uri="{28A0092B-C50C-407E-A947-70E740481C1C}">
+                <a14:useLocalDpi xmlns:a14="http://schemas.microsoft.com/office/drawing/2010/main" val="0"/>
+              </a:ext>
+            </a:extLst>
+          </a:blip>
+          <a:stretch>
+            <a:fillRect/>
+          </a:stretch>
+        </p:blipFill>
+        <p:spPr>
+          <a:xfrm>
+            <a:off x="10858477" y="75851"/>
+            <a:ext cx="1231599" cy="224700"/>
+          </a:xfrm>
+          <a:prstGeom prst="rect">
+            <a:avLst/>
+          </a:prstGeom>
+        </p:spPr>
+      </p:pic>
+      <p:pic>
+        <p:nvPicPr>
+          <p:cNvPr id="7" name="Picture 2" descr="Image result for zhaw ias logo burkhard">
+            <a:extLst>
+              <a:ext uri="{FF2B5EF4-FFF2-40B4-BE49-F238E27FC236}">
+                <a16:creationId xmlns:a16="http://schemas.microsoft.com/office/drawing/2014/main" id="{468E8FEE-F863-4823-BB78-B5F43E43349F}"/>
+              </a:ext>
+            </a:extLst>
+          </p:cNvPr>
+          <p:cNvPicPr>
+            <a:picLocks noChangeAspect="1" noChangeArrowheads="1"/>
+          </p:cNvPicPr>
+          <p:nvPr/>
+        </p:nvPicPr>
+        <p:blipFill>
+          <a:blip r:embed="rId3">
+            <a:extLst>
+              <a:ext uri="{28A0092B-C50C-407E-A947-70E740481C1C}">
+                <a14:useLocalDpi xmlns:a14="http://schemas.microsoft.com/office/drawing/2010/main" val="0"/>
+              </a:ext>
+            </a:extLst>
+          </a:blip>
+          <a:srcRect/>
+          <a:stretch>
+            <a:fillRect/>
+          </a:stretch>
+        </p:blipFill>
+        <p:spPr bwMode="auto">
+          <a:xfrm>
+            <a:off x="10858477" y="368326"/>
+            <a:ext cx="1127067" cy="516197"/>
+          </a:xfrm>
+          <a:prstGeom prst="rect">
+            <a:avLst/>
+          </a:prstGeom>
+          <a:noFill/>
+          <a:extLst>
+            <a:ext uri="{909E8E84-426E-40DD-AFC4-6F175D3DCCD1}">
+              <a14:hiddenFill xmlns:a14="http://schemas.microsoft.com/office/drawing/2010/main">
+                <a:solidFill>
+                  <a:srgbClr val="FFFFFF"/>
+                </a:solidFill>
+              </a14:hiddenFill>
+            </a:ext>
+          </a:extLst>
+        </p:spPr>
+      </p:pic>
     </p:spTree>
     <p:extLst>
       <p:ext uri="{BB962C8B-B14F-4D97-AF65-F5344CB8AC3E}">
@@ -3342,6 +4358,89 @@
           </a:p>
         </p:txBody>
       </p:sp>
+      <p:pic>
+        <p:nvPicPr>
+          <p:cNvPr id="6" name="Picture 5" descr="A close up of a logo&#10;&#10;Description generated with very high confidence">
+            <a:extLst>
+              <a:ext uri="{FF2B5EF4-FFF2-40B4-BE49-F238E27FC236}">
+                <a16:creationId xmlns:a16="http://schemas.microsoft.com/office/drawing/2014/main" id="{54AABF11-B809-468C-BD5F-E194D2EE9219}"/>
+              </a:ext>
+            </a:extLst>
+          </p:cNvPr>
+          <p:cNvPicPr>
+            <a:picLocks noChangeAspect="1"/>
+          </p:cNvPicPr>
+          <p:nvPr/>
+        </p:nvPicPr>
+        <p:blipFill>
+          <a:blip r:embed="rId2">
+            <a:extLst>
+              <a:ext uri="{28A0092B-C50C-407E-A947-70E740481C1C}">
+                <a14:useLocalDpi xmlns:a14="http://schemas.microsoft.com/office/drawing/2010/main" val="0"/>
+              </a:ext>
+            </a:extLst>
+          </a:blip>
+          <a:stretch>
+            <a:fillRect/>
+          </a:stretch>
+        </p:blipFill>
+        <p:spPr>
+          <a:xfrm>
+            <a:off x="10858477" y="75851"/>
+            <a:ext cx="1231599" cy="224700"/>
+          </a:xfrm>
+          <a:prstGeom prst="rect">
+            <a:avLst/>
+          </a:prstGeom>
+        </p:spPr>
+      </p:pic>
+      <p:pic>
+        <p:nvPicPr>
+          <p:cNvPr id="7" name="Picture 2" descr="Image result for zhaw ias logo burkhard">
+            <a:extLst>
+              <a:ext uri="{FF2B5EF4-FFF2-40B4-BE49-F238E27FC236}">
+                <a16:creationId xmlns:a16="http://schemas.microsoft.com/office/drawing/2014/main" id="{EE79AFEE-E439-468D-8D5E-E19F6A9DB5F7}"/>
+              </a:ext>
+            </a:extLst>
+          </p:cNvPr>
+          <p:cNvPicPr>
+            <a:picLocks noChangeAspect="1" noChangeArrowheads="1"/>
+          </p:cNvPicPr>
+          <p:nvPr/>
+        </p:nvPicPr>
+        <p:blipFill>
+          <a:blip r:embed="rId3">
+            <a:extLst>
+              <a:ext uri="{28A0092B-C50C-407E-A947-70E740481C1C}">
+                <a14:useLocalDpi xmlns:a14="http://schemas.microsoft.com/office/drawing/2010/main" val="0"/>
+              </a:ext>
+            </a:extLst>
+          </a:blip>
+          <a:srcRect/>
+          <a:stretch>
+            <a:fillRect/>
+          </a:stretch>
+        </p:blipFill>
+        <p:spPr bwMode="auto">
+          <a:xfrm>
+            <a:off x="10858477" y="368326"/>
+            <a:ext cx="1127067" cy="516197"/>
+          </a:xfrm>
+          <a:prstGeom prst="rect">
+            <a:avLst/>
+          </a:prstGeom>
+          <a:noFill/>
+          <a:extLst>
+            <a:ext uri="{909E8E84-426E-40DD-AFC4-6F175D3DCCD1}">
+              <a14:hiddenFill xmlns:a14="http://schemas.microsoft.com/office/drawing/2010/main">
+                <a:solidFill>
+                  <a:srgbClr val="FFFFFF"/>
+                </a:solidFill>
+              </a14:hiddenFill>
+            </a:ext>
+          </a:extLst>
+        </p:spPr>
+      </p:pic>
     </p:spTree>
     <p:extLst>
       <p:ext uri="{BB962C8B-B14F-4D97-AF65-F5344CB8AC3E}">
@@ -3486,6 +4585,89 @@
           </a:p>
         </p:txBody>
       </p:sp>
+      <p:pic>
+        <p:nvPicPr>
+          <p:cNvPr id="6" name="Picture 5" descr="A close up of a logo&#10;&#10;Description generated with very high confidence">
+            <a:extLst>
+              <a:ext uri="{FF2B5EF4-FFF2-40B4-BE49-F238E27FC236}">
+                <a16:creationId xmlns:a16="http://schemas.microsoft.com/office/drawing/2014/main" id="{83F77EFA-D343-47A8-B528-03AF709240DB}"/>
+              </a:ext>
+            </a:extLst>
+          </p:cNvPr>
+          <p:cNvPicPr>
+            <a:picLocks noChangeAspect="1"/>
+          </p:cNvPicPr>
+          <p:nvPr/>
+        </p:nvPicPr>
+        <p:blipFill>
+          <a:blip r:embed="rId2">
+            <a:extLst>
+              <a:ext uri="{28A0092B-C50C-407E-A947-70E740481C1C}">
+                <a14:useLocalDpi xmlns:a14="http://schemas.microsoft.com/office/drawing/2010/main" val="0"/>
+              </a:ext>
+            </a:extLst>
+          </a:blip>
+          <a:stretch>
+            <a:fillRect/>
+          </a:stretch>
+        </p:blipFill>
+        <p:spPr>
+          <a:xfrm>
+            <a:off x="10858477" y="75851"/>
+            <a:ext cx="1231599" cy="224700"/>
+          </a:xfrm>
+          <a:prstGeom prst="rect">
+            <a:avLst/>
+          </a:prstGeom>
+        </p:spPr>
+      </p:pic>
+      <p:pic>
+        <p:nvPicPr>
+          <p:cNvPr id="7" name="Picture 2" descr="Image result for zhaw ias logo burkhard">
+            <a:extLst>
+              <a:ext uri="{FF2B5EF4-FFF2-40B4-BE49-F238E27FC236}">
+                <a16:creationId xmlns:a16="http://schemas.microsoft.com/office/drawing/2014/main" id="{2A7EB747-EC29-467F-A15F-C46EA2578364}"/>
+              </a:ext>
+            </a:extLst>
+          </p:cNvPr>
+          <p:cNvPicPr>
+            <a:picLocks noChangeAspect="1" noChangeArrowheads="1"/>
+          </p:cNvPicPr>
+          <p:nvPr/>
+        </p:nvPicPr>
+        <p:blipFill>
+          <a:blip r:embed="rId3">
+            <a:extLst>
+              <a:ext uri="{28A0092B-C50C-407E-A947-70E740481C1C}">
+                <a14:useLocalDpi xmlns:a14="http://schemas.microsoft.com/office/drawing/2010/main" val="0"/>
+              </a:ext>
+            </a:extLst>
+          </a:blip>
+          <a:srcRect/>
+          <a:stretch>
+            <a:fillRect/>
+          </a:stretch>
+        </p:blipFill>
+        <p:spPr bwMode="auto">
+          <a:xfrm>
+            <a:off x="10858477" y="368326"/>
+            <a:ext cx="1127067" cy="516197"/>
+          </a:xfrm>
+          <a:prstGeom prst="rect">
+            <a:avLst/>
+          </a:prstGeom>
+          <a:noFill/>
+          <a:extLst>
+            <a:ext uri="{909E8E84-426E-40DD-AFC4-6F175D3DCCD1}">
+              <a14:hiddenFill xmlns:a14="http://schemas.microsoft.com/office/drawing/2010/main">
+                <a:solidFill>
+                  <a:srgbClr val="FFFFFF"/>
+                </a:solidFill>
+              </a14:hiddenFill>
+            </a:ext>
+          </a:extLst>
+        </p:spPr>
+      </p:pic>
     </p:spTree>
     <p:extLst>
       <p:ext uri="{BB962C8B-B14F-4D97-AF65-F5344CB8AC3E}">
@@ -3662,6 +4844,89 @@
           </a:p>
         </p:txBody>
       </p:sp>
+      <p:pic>
+        <p:nvPicPr>
+          <p:cNvPr id="6" name="Picture 5" descr="A close up of a logo&#10;&#10;Description generated with very high confidence">
+            <a:extLst>
+              <a:ext uri="{FF2B5EF4-FFF2-40B4-BE49-F238E27FC236}">
+                <a16:creationId xmlns:a16="http://schemas.microsoft.com/office/drawing/2014/main" id="{5A4A5FCE-E22E-44FE-B4DC-9027BF6C257B}"/>
+              </a:ext>
+            </a:extLst>
+          </p:cNvPr>
+          <p:cNvPicPr>
+            <a:picLocks noChangeAspect="1"/>
+          </p:cNvPicPr>
+          <p:nvPr/>
+        </p:nvPicPr>
+        <p:blipFill>
+          <a:blip r:embed="rId2">
+            <a:extLst>
+              <a:ext uri="{28A0092B-C50C-407E-A947-70E740481C1C}">
+                <a14:useLocalDpi xmlns:a14="http://schemas.microsoft.com/office/drawing/2010/main" val="0"/>
+              </a:ext>
+            </a:extLst>
+          </a:blip>
+          <a:stretch>
+            <a:fillRect/>
+          </a:stretch>
+        </p:blipFill>
+        <p:spPr>
+          <a:xfrm>
+            <a:off x="10858477" y="75851"/>
+            <a:ext cx="1231599" cy="224700"/>
+          </a:xfrm>
+          <a:prstGeom prst="rect">
+            <a:avLst/>
+          </a:prstGeom>
+        </p:spPr>
+      </p:pic>
+      <p:pic>
+        <p:nvPicPr>
+          <p:cNvPr id="7" name="Picture 2" descr="Image result for zhaw ias logo burkhard">
+            <a:extLst>
+              <a:ext uri="{FF2B5EF4-FFF2-40B4-BE49-F238E27FC236}">
+                <a16:creationId xmlns:a16="http://schemas.microsoft.com/office/drawing/2014/main" id="{DB077509-F4D5-4A6A-B69A-8C514F56CE8B}"/>
+              </a:ext>
+            </a:extLst>
+          </p:cNvPr>
+          <p:cNvPicPr>
+            <a:picLocks noChangeAspect="1" noChangeArrowheads="1"/>
+          </p:cNvPicPr>
+          <p:nvPr/>
+        </p:nvPicPr>
+        <p:blipFill>
+          <a:blip r:embed="rId3">
+            <a:extLst>
+              <a:ext uri="{28A0092B-C50C-407E-A947-70E740481C1C}">
+                <a14:useLocalDpi xmlns:a14="http://schemas.microsoft.com/office/drawing/2010/main" val="0"/>
+              </a:ext>
+            </a:extLst>
+          </a:blip>
+          <a:srcRect/>
+          <a:stretch>
+            <a:fillRect/>
+          </a:stretch>
+        </p:blipFill>
+        <p:spPr bwMode="auto">
+          <a:xfrm>
+            <a:off x="10858477" y="368326"/>
+            <a:ext cx="1127067" cy="516197"/>
+          </a:xfrm>
+          <a:prstGeom prst="rect">
+            <a:avLst/>
+          </a:prstGeom>
+          <a:noFill/>
+          <a:extLst>
+            <a:ext uri="{909E8E84-426E-40DD-AFC4-6F175D3DCCD1}">
+              <a14:hiddenFill xmlns:a14="http://schemas.microsoft.com/office/drawing/2010/main">
+                <a:solidFill>
+                  <a:srgbClr val="FFFFFF"/>
+                </a:solidFill>
+              </a14:hiddenFill>
+            </a:ext>
+          </a:extLst>
+        </p:spPr>
+      </p:pic>
     </p:spTree>
     <p:extLst>
       <p:ext uri="{BB962C8B-B14F-4D97-AF65-F5344CB8AC3E}">
@@ -3806,6 +5071,89 @@
           </a:p>
         </p:txBody>
       </p:sp>
+      <p:pic>
+        <p:nvPicPr>
+          <p:cNvPr id="6" name="Picture 5" descr="A close up of a logo&#10;&#10;Description generated with very high confidence">
+            <a:extLst>
+              <a:ext uri="{FF2B5EF4-FFF2-40B4-BE49-F238E27FC236}">
+                <a16:creationId xmlns:a16="http://schemas.microsoft.com/office/drawing/2014/main" id="{E360983F-1AC7-453D-A7B6-93B4E0B25420}"/>
+              </a:ext>
+            </a:extLst>
+          </p:cNvPr>
+          <p:cNvPicPr>
+            <a:picLocks noChangeAspect="1"/>
+          </p:cNvPicPr>
+          <p:nvPr/>
+        </p:nvPicPr>
+        <p:blipFill>
+          <a:blip r:embed="rId2">
+            <a:extLst>
+              <a:ext uri="{28A0092B-C50C-407E-A947-70E740481C1C}">
+                <a14:useLocalDpi xmlns:a14="http://schemas.microsoft.com/office/drawing/2010/main" val="0"/>
+              </a:ext>
+            </a:extLst>
+          </a:blip>
+          <a:stretch>
+            <a:fillRect/>
+          </a:stretch>
+        </p:blipFill>
+        <p:spPr>
+          <a:xfrm>
+            <a:off x="10858477" y="75851"/>
+            <a:ext cx="1231599" cy="224700"/>
+          </a:xfrm>
+          <a:prstGeom prst="rect">
+            <a:avLst/>
+          </a:prstGeom>
+        </p:spPr>
+      </p:pic>
+      <p:pic>
+        <p:nvPicPr>
+          <p:cNvPr id="7" name="Picture 2" descr="Image result for zhaw ias logo burkhard">
+            <a:extLst>
+              <a:ext uri="{FF2B5EF4-FFF2-40B4-BE49-F238E27FC236}">
+                <a16:creationId xmlns:a16="http://schemas.microsoft.com/office/drawing/2014/main" id="{D64A7523-A331-4534-A92D-136A8542CB02}"/>
+              </a:ext>
+            </a:extLst>
+          </p:cNvPr>
+          <p:cNvPicPr>
+            <a:picLocks noChangeAspect="1" noChangeArrowheads="1"/>
+          </p:cNvPicPr>
+          <p:nvPr/>
+        </p:nvPicPr>
+        <p:blipFill>
+          <a:blip r:embed="rId3">
+            <a:extLst>
+              <a:ext uri="{28A0092B-C50C-407E-A947-70E740481C1C}">
+                <a14:useLocalDpi xmlns:a14="http://schemas.microsoft.com/office/drawing/2010/main" val="0"/>
+              </a:ext>
+            </a:extLst>
+          </a:blip>
+          <a:srcRect/>
+          <a:stretch>
+            <a:fillRect/>
+          </a:stretch>
+        </p:blipFill>
+        <p:spPr bwMode="auto">
+          <a:xfrm>
+            <a:off x="10858477" y="368326"/>
+            <a:ext cx="1127067" cy="516197"/>
+          </a:xfrm>
+          <a:prstGeom prst="rect">
+            <a:avLst/>
+          </a:prstGeom>
+          <a:noFill/>
+          <a:extLst>
+            <a:ext uri="{909E8E84-426E-40DD-AFC4-6F175D3DCCD1}">
+              <a14:hiddenFill xmlns:a14="http://schemas.microsoft.com/office/drawing/2010/main">
+                <a:solidFill>
+                  <a:srgbClr val="FFFFFF"/>
+                </a:solidFill>
+              </a14:hiddenFill>
+            </a:ext>
+          </a:extLst>
+        </p:spPr>
+      </p:pic>
     </p:spTree>
     <p:extLst>
       <p:ext uri="{BB962C8B-B14F-4D97-AF65-F5344CB8AC3E}">
@@ -3997,6 +5345,89 @@
           </a:p>
         </p:txBody>
       </p:sp>
+      <p:pic>
+        <p:nvPicPr>
+          <p:cNvPr id="6" name="Picture 5" descr="A close up of a logo&#10;&#10;Description generated with very high confidence">
+            <a:extLst>
+              <a:ext uri="{FF2B5EF4-FFF2-40B4-BE49-F238E27FC236}">
+                <a16:creationId xmlns:a16="http://schemas.microsoft.com/office/drawing/2014/main" id="{13E81D7F-5F3F-4DA8-BBFA-1B81038FEB1C}"/>
+              </a:ext>
+            </a:extLst>
+          </p:cNvPr>
+          <p:cNvPicPr>
+            <a:picLocks noChangeAspect="1"/>
+          </p:cNvPicPr>
+          <p:nvPr/>
+        </p:nvPicPr>
+        <p:blipFill>
+          <a:blip r:embed="rId2">
+            <a:extLst>
+              <a:ext uri="{28A0092B-C50C-407E-A947-70E740481C1C}">
+                <a14:useLocalDpi xmlns:a14="http://schemas.microsoft.com/office/drawing/2010/main" val="0"/>
+              </a:ext>
+            </a:extLst>
+          </a:blip>
+          <a:stretch>
+            <a:fillRect/>
+          </a:stretch>
+        </p:blipFill>
+        <p:spPr>
+          <a:xfrm>
+            <a:off x="10858477" y="75851"/>
+            <a:ext cx="1231599" cy="224700"/>
+          </a:xfrm>
+          <a:prstGeom prst="rect">
+            <a:avLst/>
+          </a:prstGeom>
+        </p:spPr>
+      </p:pic>
+      <p:pic>
+        <p:nvPicPr>
+          <p:cNvPr id="7" name="Picture 2" descr="Image result for zhaw ias logo burkhard">
+            <a:extLst>
+              <a:ext uri="{FF2B5EF4-FFF2-40B4-BE49-F238E27FC236}">
+                <a16:creationId xmlns:a16="http://schemas.microsoft.com/office/drawing/2014/main" id="{0AE42F97-0AA2-454C-A337-94663DEBC39D}"/>
+              </a:ext>
+            </a:extLst>
+          </p:cNvPr>
+          <p:cNvPicPr>
+            <a:picLocks noChangeAspect="1" noChangeArrowheads="1"/>
+          </p:cNvPicPr>
+          <p:nvPr/>
+        </p:nvPicPr>
+        <p:blipFill>
+          <a:blip r:embed="rId3">
+            <a:extLst>
+              <a:ext uri="{28A0092B-C50C-407E-A947-70E740481C1C}">
+                <a14:useLocalDpi xmlns:a14="http://schemas.microsoft.com/office/drawing/2010/main" val="0"/>
+              </a:ext>
+            </a:extLst>
+          </a:blip>
+          <a:srcRect/>
+          <a:stretch>
+            <a:fillRect/>
+          </a:stretch>
+        </p:blipFill>
+        <p:spPr bwMode="auto">
+          <a:xfrm>
+            <a:off x="10858477" y="368326"/>
+            <a:ext cx="1127067" cy="516197"/>
+          </a:xfrm>
+          <a:prstGeom prst="rect">
+            <a:avLst/>
+          </a:prstGeom>
+          <a:noFill/>
+          <a:extLst>
+            <a:ext uri="{909E8E84-426E-40DD-AFC4-6F175D3DCCD1}">
+              <a14:hiddenFill xmlns:a14="http://schemas.microsoft.com/office/drawing/2010/main">
+                <a:solidFill>
+                  <a:srgbClr val="FFFFFF"/>
+                </a:solidFill>
+              </a14:hiddenFill>
+            </a:ext>
+          </a:extLst>
+        </p:spPr>
+      </p:pic>
     </p:spTree>
     <p:extLst>
       <p:ext uri="{BB962C8B-B14F-4D97-AF65-F5344CB8AC3E}">
@@ -4141,6 +5572,89 @@
           </a:p>
         </p:txBody>
       </p:sp>
+      <p:pic>
+        <p:nvPicPr>
+          <p:cNvPr id="6" name="Picture 5" descr="A close up of a logo&#10;&#10;Description generated with very high confidence">
+            <a:extLst>
+              <a:ext uri="{FF2B5EF4-FFF2-40B4-BE49-F238E27FC236}">
+                <a16:creationId xmlns:a16="http://schemas.microsoft.com/office/drawing/2014/main" id="{3E57DE5A-7DAF-4D15-ACD9-3C6233753849}"/>
+              </a:ext>
+            </a:extLst>
+          </p:cNvPr>
+          <p:cNvPicPr>
+            <a:picLocks noChangeAspect="1"/>
+          </p:cNvPicPr>
+          <p:nvPr/>
+        </p:nvPicPr>
+        <p:blipFill>
+          <a:blip r:embed="rId2">
+            <a:extLst>
+              <a:ext uri="{28A0092B-C50C-407E-A947-70E740481C1C}">
+                <a14:useLocalDpi xmlns:a14="http://schemas.microsoft.com/office/drawing/2010/main" val="0"/>
+              </a:ext>
+            </a:extLst>
+          </a:blip>
+          <a:stretch>
+            <a:fillRect/>
+          </a:stretch>
+        </p:blipFill>
+        <p:spPr>
+          <a:xfrm>
+            <a:off x="10858477" y="75851"/>
+            <a:ext cx="1231599" cy="224700"/>
+          </a:xfrm>
+          <a:prstGeom prst="rect">
+            <a:avLst/>
+          </a:prstGeom>
+        </p:spPr>
+      </p:pic>
+      <p:pic>
+        <p:nvPicPr>
+          <p:cNvPr id="7" name="Picture 2" descr="Image result for zhaw ias logo burkhard">
+            <a:extLst>
+              <a:ext uri="{FF2B5EF4-FFF2-40B4-BE49-F238E27FC236}">
+                <a16:creationId xmlns:a16="http://schemas.microsoft.com/office/drawing/2014/main" id="{7BFE0920-B1CB-438C-A2E4-6A60BCB456C4}"/>
+              </a:ext>
+            </a:extLst>
+          </p:cNvPr>
+          <p:cNvPicPr>
+            <a:picLocks noChangeAspect="1" noChangeArrowheads="1"/>
+          </p:cNvPicPr>
+          <p:nvPr/>
+        </p:nvPicPr>
+        <p:blipFill>
+          <a:blip r:embed="rId3">
+            <a:extLst>
+              <a:ext uri="{28A0092B-C50C-407E-A947-70E740481C1C}">
+                <a14:useLocalDpi xmlns:a14="http://schemas.microsoft.com/office/drawing/2010/main" val="0"/>
+              </a:ext>
+            </a:extLst>
+          </a:blip>
+          <a:srcRect/>
+          <a:stretch>
+            <a:fillRect/>
+          </a:stretch>
+        </p:blipFill>
+        <p:spPr bwMode="auto">
+          <a:xfrm>
+            <a:off x="10858477" y="368326"/>
+            <a:ext cx="1127067" cy="516197"/>
+          </a:xfrm>
+          <a:prstGeom prst="rect">
+            <a:avLst/>
+          </a:prstGeom>
+          <a:noFill/>
+          <a:extLst>
+            <a:ext uri="{909E8E84-426E-40DD-AFC4-6F175D3DCCD1}">
+              <a14:hiddenFill xmlns:a14="http://schemas.microsoft.com/office/drawing/2010/main">
+                <a:solidFill>
+                  <a:srgbClr val="FFFFFF"/>
+                </a:solidFill>
+              </a14:hiddenFill>
+            </a:ext>
+          </a:extLst>
+        </p:spPr>
+      </p:pic>
     </p:spTree>
     <p:extLst>
       <p:ext uri="{BB962C8B-B14F-4D97-AF65-F5344CB8AC3E}">
@@ -4391,6 +5905,89 @@
           </a:p>
         </p:txBody>
       </p:sp>
+      <p:pic>
+        <p:nvPicPr>
+          <p:cNvPr id="6" name="Picture 5" descr="A close up of a logo&#10;&#10;Description generated with very high confidence">
+            <a:extLst>
+              <a:ext uri="{FF2B5EF4-FFF2-40B4-BE49-F238E27FC236}">
+                <a16:creationId xmlns:a16="http://schemas.microsoft.com/office/drawing/2014/main" id="{54F84D0F-00C6-4F3D-AB66-3AAEF4BC430E}"/>
+              </a:ext>
+            </a:extLst>
+          </p:cNvPr>
+          <p:cNvPicPr>
+            <a:picLocks noChangeAspect="1"/>
+          </p:cNvPicPr>
+          <p:nvPr/>
+        </p:nvPicPr>
+        <p:blipFill>
+          <a:blip r:embed="rId2">
+            <a:extLst>
+              <a:ext uri="{28A0092B-C50C-407E-A947-70E740481C1C}">
+                <a14:useLocalDpi xmlns:a14="http://schemas.microsoft.com/office/drawing/2010/main" val="0"/>
+              </a:ext>
+            </a:extLst>
+          </a:blip>
+          <a:stretch>
+            <a:fillRect/>
+          </a:stretch>
+        </p:blipFill>
+        <p:spPr>
+          <a:xfrm>
+            <a:off x="10858477" y="75851"/>
+            <a:ext cx="1231599" cy="224700"/>
+          </a:xfrm>
+          <a:prstGeom prst="rect">
+            <a:avLst/>
+          </a:prstGeom>
+        </p:spPr>
+      </p:pic>
+      <p:pic>
+        <p:nvPicPr>
+          <p:cNvPr id="7" name="Picture 2" descr="Image result for zhaw ias logo burkhard">
+            <a:extLst>
+              <a:ext uri="{FF2B5EF4-FFF2-40B4-BE49-F238E27FC236}">
+                <a16:creationId xmlns:a16="http://schemas.microsoft.com/office/drawing/2014/main" id="{57E42739-71BB-4F3D-BC37-08BA696648A4}"/>
+              </a:ext>
+            </a:extLst>
+          </p:cNvPr>
+          <p:cNvPicPr>
+            <a:picLocks noChangeAspect="1" noChangeArrowheads="1"/>
+          </p:cNvPicPr>
+          <p:nvPr/>
+        </p:nvPicPr>
+        <p:blipFill>
+          <a:blip r:embed="rId3">
+            <a:extLst>
+              <a:ext uri="{28A0092B-C50C-407E-A947-70E740481C1C}">
+                <a14:useLocalDpi xmlns:a14="http://schemas.microsoft.com/office/drawing/2010/main" val="0"/>
+              </a:ext>
+            </a:extLst>
+          </a:blip>
+          <a:srcRect/>
+          <a:stretch>
+            <a:fillRect/>
+          </a:stretch>
+        </p:blipFill>
+        <p:spPr bwMode="auto">
+          <a:xfrm>
+            <a:off x="10858477" y="368326"/>
+            <a:ext cx="1127067" cy="516197"/>
+          </a:xfrm>
+          <a:prstGeom prst="rect">
+            <a:avLst/>
+          </a:prstGeom>
+          <a:noFill/>
+          <a:extLst>
+            <a:ext uri="{909E8E84-426E-40DD-AFC4-6F175D3DCCD1}">
+              <a14:hiddenFill xmlns:a14="http://schemas.microsoft.com/office/drawing/2010/main">
+                <a:solidFill>
+                  <a:srgbClr val="FFFFFF"/>
+                </a:solidFill>
+              </a14:hiddenFill>
+            </a:ext>
+          </a:extLst>
+        </p:spPr>
+      </p:pic>
     </p:spTree>
     <p:extLst>
       <p:ext uri="{BB962C8B-B14F-4D97-AF65-F5344CB8AC3E}">
@@ -4535,6 +6132,89 @@
           </a:p>
         </p:txBody>
       </p:sp>
+      <p:pic>
+        <p:nvPicPr>
+          <p:cNvPr id="6" name="Picture 5" descr="A close up of a logo&#10;&#10;Description generated with very high confidence">
+            <a:extLst>
+              <a:ext uri="{FF2B5EF4-FFF2-40B4-BE49-F238E27FC236}">
+                <a16:creationId xmlns:a16="http://schemas.microsoft.com/office/drawing/2014/main" id="{E2967778-8E2B-4B62-91D2-677F2AEADE1E}"/>
+              </a:ext>
+            </a:extLst>
+          </p:cNvPr>
+          <p:cNvPicPr>
+            <a:picLocks noChangeAspect="1"/>
+          </p:cNvPicPr>
+          <p:nvPr/>
+        </p:nvPicPr>
+        <p:blipFill>
+          <a:blip r:embed="rId2">
+            <a:extLst>
+              <a:ext uri="{28A0092B-C50C-407E-A947-70E740481C1C}">
+                <a14:useLocalDpi xmlns:a14="http://schemas.microsoft.com/office/drawing/2010/main" val="0"/>
+              </a:ext>
+            </a:extLst>
+          </a:blip>
+          <a:stretch>
+            <a:fillRect/>
+          </a:stretch>
+        </p:blipFill>
+        <p:spPr>
+          <a:xfrm>
+            <a:off x="10858477" y="75851"/>
+            <a:ext cx="1231599" cy="224700"/>
+          </a:xfrm>
+          <a:prstGeom prst="rect">
+            <a:avLst/>
+          </a:prstGeom>
+        </p:spPr>
+      </p:pic>
+      <p:pic>
+        <p:nvPicPr>
+          <p:cNvPr id="7" name="Picture 2" descr="Image result for zhaw ias logo burkhard">
+            <a:extLst>
+              <a:ext uri="{FF2B5EF4-FFF2-40B4-BE49-F238E27FC236}">
+                <a16:creationId xmlns:a16="http://schemas.microsoft.com/office/drawing/2014/main" id="{95E02B90-FF89-4706-B2E8-14FDD5AB29D2}"/>
+              </a:ext>
+            </a:extLst>
+          </p:cNvPr>
+          <p:cNvPicPr>
+            <a:picLocks noChangeAspect="1" noChangeArrowheads="1"/>
+          </p:cNvPicPr>
+          <p:nvPr/>
+        </p:nvPicPr>
+        <p:blipFill>
+          <a:blip r:embed="rId3">
+            <a:extLst>
+              <a:ext uri="{28A0092B-C50C-407E-A947-70E740481C1C}">
+                <a14:useLocalDpi xmlns:a14="http://schemas.microsoft.com/office/drawing/2010/main" val="0"/>
+              </a:ext>
+            </a:extLst>
+          </a:blip>
+          <a:srcRect/>
+          <a:stretch>
+            <a:fillRect/>
+          </a:stretch>
+        </p:blipFill>
+        <p:spPr bwMode="auto">
+          <a:xfrm>
+            <a:off x="10858477" y="368326"/>
+            <a:ext cx="1127067" cy="516197"/>
+          </a:xfrm>
+          <a:prstGeom prst="rect">
+            <a:avLst/>
+          </a:prstGeom>
+          <a:noFill/>
+          <a:extLst>
+            <a:ext uri="{909E8E84-426E-40DD-AFC4-6F175D3DCCD1}">
+              <a14:hiddenFill xmlns:a14="http://schemas.microsoft.com/office/drawing/2010/main">
+                <a:solidFill>
+                  <a:srgbClr val="FFFFFF"/>
+                </a:solidFill>
+              </a14:hiddenFill>
+            </a:ext>
+          </a:extLst>
+        </p:spPr>
+      </p:pic>
     </p:spTree>
     <p:extLst>
       <p:ext uri="{BB962C8B-B14F-4D97-AF65-F5344CB8AC3E}">
@@ -4710,6 +6390,89 @@
           </a:p>
         </p:txBody>
       </p:sp>
+      <p:pic>
+        <p:nvPicPr>
+          <p:cNvPr id="6" name="Picture 5" descr="A close up of a logo&#10;&#10;Description generated with very high confidence">
+            <a:extLst>
+              <a:ext uri="{FF2B5EF4-FFF2-40B4-BE49-F238E27FC236}">
+                <a16:creationId xmlns:a16="http://schemas.microsoft.com/office/drawing/2014/main" id="{71419359-C8E8-459F-BFC9-C3BACC731108}"/>
+              </a:ext>
+            </a:extLst>
+          </p:cNvPr>
+          <p:cNvPicPr>
+            <a:picLocks noChangeAspect="1"/>
+          </p:cNvPicPr>
+          <p:nvPr/>
+        </p:nvPicPr>
+        <p:blipFill>
+          <a:blip r:embed="rId2">
+            <a:extLst>
+              <a:ext uri="{28A0092B-C50C-407E-A947-70E740481C1C}">
+                <a14:useLocalDpi xmlns:a14="http://schemas.microsoft.com/office/drawing/2010/main" val="0"/>
+              </a:ext>
+            </a:extLst>
+          </a:blip>
+          <a:stretch>
+            <a:fillRect/>
+          </a:stretch>
+        </p:blipFill>
+        <p:spPr>
+          <a:xfrm>
+            <a:off x="10858477" y="75851"/>
+            <a:ext cx="1231599" cy="224700"/>
+          </a:xfrm>
+          <a:prstGeom prst="rect">
+            <a:avLst/>
+          </a:prstGeom>
+        </p:spPr>
+      </p:pic>
+      <p:pic>
+        <p:nvPicPr>
+          <p:cNvPr id="7" name="Picture 2" descr="Image result for zhaw ias logo burkhard">
+            <a:extLst>
+              <a:ext uri="{FF2B5EF4-FFF2-40B4-BE49-F238E27FC236}">
+                <a16:creationId xmlns:a16="http://schemas.microsoft.com/office/drawing/2014/main" id="{A2108E60-9843-4513-B53A-47514E7CC1F0}"/>
+              </a:ext>
+            </a:extLst>
+          </p:cNvPr>
+          <p:cNvPicPr>
+            <a:picLocks noChangeAspect="1" noChangeArrowheads="1"/>
+          </p:cNvPicPr>
+          <p:nvPr/>
+        </p:nvPicPr>
+        <p:blipFill>
+          <a:blip r:embed="rId3">
+            <a:extLst>
+              <a:ext uri="{28A0092B-C50C-407E-A947-70E740481C1C}">
+                <a14:useLocalDpi xmlns:a14="http://schemas.microsoft.com/office/drawing/2010/main" val="0"/>
+              </a:ext>
+            </a:extLst>
+          </a:blip>
+          <a:srcRect/>
+          <a:stretch>
+            <a:fillRect/>
+          </a:stretch>
+        </p:blipFill>
+        <p:spPr bwMode="auto">
+          <a:xfrm>
+            <a:off x="10858477" y="368326"/>
+            <a:ext cx="1127067" cy="516197"/>
+          </a:xfrm>
+          <a:prstGeom prst="rect">
+            <a:avLst/>
+          </a:prstGeom>
+          <a:noFill/>
+          <a:extLst>
+            <a:ext uri="{909E8E84-426E-40DD-AFC4-6F175D3DCCD1}">
+              <a14:hiddenFill xmlns:a14="http://schemas.microsoft.com/office/drawing/2010/main">
+                <a:solidFill>
+                  <a:srgbClr val="FFFFFF"/>
+                </a:solidFill>
+              </a14:hiddenFill>
+            </a:ext>
+          </a:extLst>
+        </p:spPr>
+      </p:pic>
     </p:spTree>
     <p:extLst>
       <p:ext uri="{BB962C8B-B14F-4D97-AF65-F5344CB8AC3E}">
@@ -4777,7 +6540,7 @@
             </a:br>
             <a:r>
               <a:rPr lang="en-GB" sz="4400" b="1" dirty="0"/>
-              <a:t>Introduction to linear algebra and numpy/Python</a:t>
+              <a:t>Introduction to linear algebra and numpy/Python/matplotlib</a:t>
             </a:r>
             <a:endParaRPr lang="en-CH" sz="7200" dirty="0"/>
           </a:p>
@@ -4854,6 +6617,89 @@
           </a:p>
         </p:txBody>
       </p:sp>
+      <p:pic>
+        <p:nvPicPr>
+          <p:cNvPr id="5" name="Picture 4" descr="A close up of a logo&#10;&#10;Description generated with very high confidence">
+            <a:extLst>
+              <a:ext uri="{FF2B5EF4-FFF2-40B4-BE49-F238E27FC236}">
+                <a16:creationId xmlns:a16="http://schemas.microsoft.com/office/drawing/2014/main" id="{D274619A-64B0-42FB-A551-F4B9F58B1549}"/>
+              </a:ext>
+            </a:extLst>
+          </p:cNvPr>
+          <p:cNvPicPr>
+            <a:picLocks noChangeAspect="1"/>
+          </p:cNvPicPr>
+          <p:nvPr/>
+        </p:nvPicPr>
+        <p:blipFill>
+          <a:blip r:embed="rId2">
+            <a:extLst>
+              <a:ext uri="{28A0092B-C50C-407E-A947-70E740481C1C}">
+                <a14:useLocalDpi xmlns:a14="http://schemas.microsoft.com/office/drawing/2010/main" val="0"/>
+              </a:ext>
+            </a:extLst>
+          </a:blip>
+          <a:stretch>
+            <a:fillRect/>
+          </a:stretch>
+        </p:blipFill>
+        <p:spPr>
+          <a:xfrm>
+            <a:off x="10858477" y="75851"/>
+            <a:ext cx="1231599" cy="224700"/>
+          </a:xfrm>
+          <a:prstGeom prst="rect">
+            <a:avLst/>
+          </a:prstGeom>
+        </p:spPr>
+      </p:pic>
+      <p:pic>
+        <p:nvPicPr>
+          <p:cNvPr id="6" name="Picture 2" descr="Image result for zhaw ias logo burkhard">
+            <a:extLst>
+              <a:ext uri="{FF2B5EF4-FFF2-40B4-BE49-F238E27FC236}">
+                <a16:creationId xmlns:a16="http://schemas.microsoft.com/office/drawing/2014/main" id="{EF17535A-6BE8-4934-9204-500C8F1BDAE0}"/>
+              </a:ext>
+            </a:extLst>
+          </p:cNvPr>
+          <p:cNvPicPr>
+            <a:picLocks noChangeAspect="1" noChangeArrowheads="1"/>
+          </p:cNvPicPr>
+          <p:nvPr/>
+        </p:nvPicPr>
+        <p:blipFill>
+          <a:blip r:embed="rId3">
+            <a:extLst>
+              <a:ext uri="{28A0092B-C50C-407E-A947-70E740481C1C}">
+                <a14:useLocalDpi xmlns:a14="http://schemas.microsoft.com/office/drawing/2010/main" val="0"/>
+              </a:ext>
+            </a:extLst>
+          </a:blip>
+          <a:srcRect/>
+          <a:stretch>
+            <a:fillRect/>
+          </a:stretch>
+        </p:blipFill>
+        <p:spPr bwMode="auto">
+          <a:xfrm>
+            <a:off x="10858477" y="368326"/>
+            <a:ext cx="1127067" cy="516197"/>
+          </a:xfrm>
+          <a:prstGeom prst="rect">
+            <a:avLst/>
+          </a:prstGeom>
+          <a:noFill/>
+          <a:extLst>
+            <a:ext uri="{909E8E84-426E-40DD-AFC4-6F175D3DCCD1}">
+              <a14:hiddenFill xmlns:a14="http://schemas.microsoft.com/office/drawing/2010/main">
+                <a:solidFill>
+                  <a:srgbClr val="FFFFFF"/>
+                </a:solidFill>
+              </a14:hiddenFill>
+            </a:ext>
+          </a:extLst>
+        </p:spPr>
+      </p:pic>
     </p:spTree>
     <p:extLst>
       <p:ext uri="{BB962C8B-B14F-4D97-AF65-F5344CB8AC3E}">
@@ -5185,6 +7031,32 @@
             <a:endParaRPr lang="de-CH" dirty="0"/>
           </a:p>
           <a:p>
+            <a:pPr>
+              <a:buFont typeface="Wingdings" panose="05000000000000000000" pitchFamily="2" charset="2"/>
+              <a:buChar char="q"/>
+            </a:pPr>
+            <a:r>
+              <a:rPr lang="de-CH" dirty="0"/>
+              <a:t>Basic </a:t>
+            </a:r>
+            <a:r>
+              <a:rPr lang="de-CH" dirty="0" err="1"/>
+              <a:t>plotting</a:t>
+            </a:r>
+            <a:r>
+              <a:rPr lang="de-CH" dirty="0"/>
+              <a:t> </a:t>
+            </a:r>
+            <a:r>
+              <a:rPr lang="de-CH" dirty="0" err="1"/>
+              <a:t>functionalities</a:t>
+            </a:r>
+            <a:r>
+              <a:rPr lang="de-CH" dirty="0"/>
+              <a:t> in matplotlib</a:t>
+            </a:r>
+          </a:p>
+          <a:p>
             <a:pPr marL="0" indent="0">
               <a:buNone/>
             </a:pPr>
@@ -5228,6 +7100,89 @@
           </a:p>
         </p:txBody>
       </p:sp>
+      <p:pic>
+        <p:nvPicPr>
+          <p:cNvPr id="5" name="Picture 4" descr="A close up of a logo&#10;&#10;Description generated with very high confidence">
+            <a:extLst>
+              <a:ext uri="{FF2B5EF4-FFF2-40B4-BE49-F238E27FC236}">
+                <a16:creationId xmlns:a16="http://schemas.microsoft.com/office/drawing/2014/main" id="{C31BE5B5-64B2-4592-B6A9-2A0AD8E3EF1C}"/>
+              </a:ext>
+            </a:extLst>
+          </p:cNvPr>
+          <p:cNvPicPr>
+            <a:picLocks noChangeAspect="1"/>
+          </p:cNvPicPr>
+          <p:nvPr/>
+        </p:nvPicPr>
+        <p:blipFill>
+          <a:blip r:embed="rId2">
+            <a:extLst>
+              <a:ext uri="{28A0092B-C50C-407E-A947-70E740481C1C}">
+                <a14:useLocalDpi xmlns:a14="http://schemas.microsoft.com/office/drawing/2010/main" val="0"/>
+              </a:ext>
+            </a:extLst>
+          </a:blip>
+          <a:stretch>
+            <a:fillRect/>
+          </a:stretch>
+        </p:blipFill>
+        <p:spPr>
+          <a:xfrm>
+            <a:off x="10858477" y="75851"/>
+            <a:ext cx="1231599" cy="224700"/>
+          </a:xfrm>
+          <a:prstGeom prst="rect">
+            <a:avLst/>
+          </a:prstGeom>
+        </p:spPr>
+      </p:pic>
+      <p:pic>
+        <p:nvPicPr>
+          <p:cNvPr id="6" name="Picture 2" descr="Image result for zhaw ias logo burkhard">
+            <a:extLst>
+              <a:ext uri="{FF2B5EF4-FFF2-40B4-BE49-F238E27FC236}">
+                <a16:creationId xmlns:a16="http://schemas.microsoft.com/office/drawing/2014/main" id="{61B1B7BB-FD25-4FCD-98FB-E295E230F8E8}"/>
+              </a:ext>
+            </a:extLst>
+          </p:cNvPr>
+          <p:cNvPicPr>
+            <a:picLocks noChangeAspect="1" noChangeArrowheads="1"/>
+          </p:cNvPicPr>
+          <p:nvPr/>
+        </p:nvPicPr>
+        <p:blipFill>
+          <a:blip r:embed="rId3">
+            <a:extLst>
+              <a:ext uri="{28A0092B-C50C-407E-A947-70E740481C1C}">
+                <a14:useLocalDpi xmlns:a14="http://schemas.microsoft.com/office/drawing/2010/main" val="0"/>
+              </a:ext>
+            </a:extLst>
+          </a:blip>
+          <a:srcRect/>
+          <a:stretch>
+            <a:fillRect/>
+          </a:stretch>
+        </p:blipFill>
+        <p:spPr bwMode="auto">
+          <a:xfrm>
+            <a:off x="10858477" y="368326"/>
+            <a:ext cx="1127067" cy="516197"/>
+          </a:xfrm>
+          <a:prstGeom prst="rect">
+            <a:avLst/>
+          </a:prstGeom>
+          <a:noFill/>
+          <a:extLst>
+            <a:ext uri="{909E8E84-426E-40DD-AFC4-6F175D3DCCD1}">
+              <a14:hiddenFill xmlns:a14="http://schemas.microsoft.com/office/drawing/2010/main">
+                <a:solidFill>
+                  <a:srgbClr val="FFFFFF"/>
+                </a:solidFill>
+              </a14:hiddenFill>
+            </a:ext>
+          </a:extLst>
+        </p:spPr>
+      </p:pic>
     </p:spTree>
     <p:extLst>
       <p:ext uri="{BB962C8B-B14F-4D97-AF65-F5344CB8AC3E}">
@@ -5372,6 +7327,89 @@
           </a:p>
         </p:txBody>
       </p:sp>
+      <p:pic>
+        <p:nvPicPr>
+          <p:cNvPr id="6" name="Picture 5" descr="A close up of a logo&#10;&#10;Description generated with very high confidence">
+            <a:extLst>
+              <a:ext uri="{FF2B5EF4-FFF2-40B4-BE49-F238E27FC236}">
+                <a16:creationId xmlns:a16="http://schemas.microsoft.com/office/drawing/2014/main" id="{837224AD-F1EF-4E20-96A1-4132ABCAAA0A}"/>
+              </a:ext>
+            </a:extLst>
+          </p:cNvPr>
+          <p:cNvPicPr>
+            <a:picLocks noChangeAspect="1"/>
+          </p:cNvPicPr>
+          <p:nvPr/>
+        </p:nvPicPr>
+        <p:blipFill>
+          <a:blip r:embed="rId2">
+            <a:extLst>
+              <a:ext uri="{28A0092B-C50C-407E-A947-70E740481C1C}">
+                <a14:useLocalDpi xmlns:a14="http://schemas.microsoft.com/office/drawing/2010/main" val="0"/>
+              </a:ext>
+            </a:extLst>
+          </a:blip>
+          <a:stretch>
+            <a:fillRect/>
+          </a:stretch>
+        </p:blipFill>
+        <p:spPr>
+          <a:xfrm>
+            <a:off x="10858477" y="75851"/>
+            <a:ext cx="1231599" cy="224700"/>
+          </a:xfrm>
+          <a:prstGeom prst="rect">
+            <a:avLst/>
+          </a:prstGeom>
+        </p:spPr>
+      </p:pic>
+      <p:pic>
+        <p:nvPicPr>
+          <p:cNvPr id="7" name="Picture 2" descr="Image result for zhaw ias logo burkhard">
+            <a:extLst>
+              <a:ext uri="{FF2B5EF4-FFF2-40B4-BE49-F238E27FC236}">
+                <a16:creationId xmlns:a16="http://schemas.microsoft.com/office/drawing/2014/main" id="{AA553C0D-FAAF-4C1B-9065-2EB4FCEAB233}"/>
+              </a:ext>
+            </a:extLst>
+          </p:cNvPr>
+          <p:cNvPicPr>
+            <a:picLocks noChangeAspect="1" noChangeArrowheads="1"/>
+          </p:cNvPicPr>
+          <p:nvPr/>
+        </p:nvPicPr>
+        <p:blipFill>
+          <a:blip r:embed="rId3">
+            <a:extLst>
+              <a:ext uri="{28A0092B-C50C-407E-A947-70E740481C1C}">
+                <a14:useLocalDpi xmlns:a14="http://schemas.microsoft.com/office/drawing/2010/main" val="0"/>
+              </a:ext>
+            </a:extLst>
+          </a:blip>
+          <a:srcRect/>
+          <a:stretch>
+            <a:fillRect/>
+          </a:stretch>
+        </p:blipFill>
+        <p:spPr bwMode="auto">
+          <a:xfrm>
+            <a:off x="10858477" y="368326"/>
+            <a:ext cx="1127067" cy="516197"/>
+          </a:xfrm>
+          <a:prstGeom prst="rect">
+            <a:avLst/>
+          </a:prstGeom>
+          <a:noFill/>
+          <a:extLst>
+            <a:ext uri="{909E8E84-426E-40DD-AFC4-6F175D3DCCD1}">
+              <a14:hiddenFill xmlns:a14="http://schemas.microsoft.com/office/drawing/2010/main">
+                <a:solidFill>
+                  <a:srgbClr val="FFFFFF"/>
+                </a:solidFill>
+              </a14:hiddenFill>
+            </a:ext>
+          </a:extLst>
+        </p:spPr>
+      </p:pic>
     </p:spTree>
     <p:extLst>
       <p:ext uri="{BB962C8B-B14F-4D97-AF65-F5344CB8AC3E}">
@@ -5783,6 +7821,89 @@
           </a:p>
         </p:txBody>
       </p:sp>
+      <p:pic>
+        <p:nvPicPr>
+          <p:cNvPr id="5" name="Picture 4" descr="A close up of a logo&#10;&#10;Description generated with very high confidence">
+            <a:extLst>
+              <a:ext uri="{FF2B5EF4-FFF2-40B4-BE49-F238E27FC236}">
+                <a16:creationId xmlns:a16="http://schemas.microsoft.com/office/drawing/2014/main" id="{5D8A1807-30E2-4D61-B79F-AA1313DB4577}"/>
+              </a:ext>
+            </a:extLst>
+          </p:cNvPr>
+          <p:cNvPicPr>
+            <a:picLocks noChangeAspect="1"/>
+          </p:cNvPicPr>
+          <p:nvPr/>
+        </p:nvPicPr>
+        <p:blipFill>
+          <a:blip r:embed="rId2">
+            <a:extLst>
+              <a:ext uri="{28A0092B-C50C-407E-A947-70E740481C1C}">
+                <a14:useLocalDpi xmlns:a14="http://schemas.microsoft.com/office/drawing/2010/main" val="0"/>
+              </a:ext>
+            </a:extLst>
+          </a:blip>
+          <a:stretch>
+            <a:fillRect/>
+          </a:stretch>
+        </p:blipFill>
+        <p:spPr>
+          <a:xfrm>
+            <a:off x="10858477" y="75851"/>
+            <a:ext cx="1231599" cy="224700"/>
+          </a:xfrm>
+          <a:prstGeom prst="rect">
+            <a:avLst/>
+          </a:prstGeom>
+        </p:spPr>
+      </p:pic>
+      <p:pic>
+        <p:nvPicPr>
+          <p:cNvPr id="6" name="Picture 2" descr="Image result for zhaw ias logo burkhard">
+            <a:extLst>
+              <a:ext uri="{FF2B5EF4-FFF2-40B4-BE49-F238E27FC236}">
+                <a16:creationId xmlns:a16="http://schemas.microsoft.com/office/drawing/2014/main" id="{E54425C4-063B-4E0E-A165-2FB6AD072729}"/>
+              </a:ext>
+            </a:extLst>
+          </p:cNvPr>
+          <p:cNvPicPr>
+            <a:picLocks noChangeAspect="1" noChangeArrowheads="1"/>
+          </p:cNvPicPr>
+          <p:nvPr/>
+        </p:nvPicPr>
+        <p:blipFill>
+          <a:blip r:embed="rId3">
+            <a:extLst>
+              <a:ext uri="{28A0092B-C50C-407E-A947-70E740481C1C}">
+                <a14:useLocalDpi xmlns:a14="http://schemas.microsoft.com/office/drawing/2010/main" val="0"/>
+              </a:ext>
+            </a:extLst>
+          </a:blip>
+          <a:srcRect/>
+          <a:stretch>
+            <a:fillRect/>
+          </a:stretch>
+        </p:blipFill>
+        <p:spPr bwMode="auto">
+          <a:xfrm>
+            <a:off x="10858477" y="368326"/>
+            <a:ext cx="1127067" cy="516197"/>
+          </a:xfrm>
+          <a:prstGeom prst="rect">
+            <a:avLst/>
+          </a:prstGeom>
+          <a:noFill/>
+          <a:extLst>
+            <a:ext uri="{909E8E84-426E-40DD-AFC4-6F175D3DCCD1}">
+              <a14:hiddenFill xmlns:a14="http://schemas.microsoft.com/office/drawing/2010/main">
+                <a:solidFill>
+                  <a:srgbClr val="FFFFFF"/>
+                </a:solidFill>
+              </a14:hiddenFill>
+            </a:ext>
+          </a:extLst>
+        </p:spPr>
+      </p:pic>
     </p:spTree>
     <p:extLst>
       <p:ext uri="{BB962C8B-B14F-4D97-AF65-F5344CB8AC3E}">
@@ -5927,6 +8048,89 @@
           </a:p>
         </p:txBody>
       </p:sp>
+      <p:pic>
+        <p:nvPicPr>
+          <p:cNvPr id="5" name="Picture 4" descr="A close up of a logo&#10;&#10;Description generated with very high confidence">
+            <a:extLst>
+              <a:ext uri="{FF2B5EF4-FFF2-40B4-BE49-F238E27FC236}">
+                <a16:creationId xmlns:a16="http://schemas.microsoft.com/office/drawing/2014/main" id="{1B6C5876-8055-4F91-9574-ADCF130847B2}"/>
+              </a:ext>
+            </a:extLst>
+          </p:cNvPr>
+          <p:cNvPicPr>
+            <a:picLocks noChangeAspect="1"/>
+          </p:cNvPicPr>
+          <p:nvPr/>
+        </p:nvPicPr>
+        <p:blipFill>
+          <a:blip r:embed="rId2">
+            <a:extLst>
+              <a:ext uri="{28A0092B-C50C-407E-A947-70E740481C1C}">
+                <a14:useLocalDpi xmlns:a14="http://schemas.microsoft.com/office/drawing/2010/main" val="0"/>
+              </a:ext>
+            </a:extLst>
+          </a:blip>
+          <a:stretch>
+            <a:fillRect/>
+          </a:stretch>
+        </p:blipFill>
+        <p:spPr>
+          <a:xfrm>
+            <a:off x="10858477" y="75851"/>
+            <a:ext cx="1231599" cy="224700"/>
+          </a:xfrm>
+          <a:prstGeom prst="rect">
+            <a:avLst/>
+          </a:prstGeom>
+        </p:spPr>
+      </p:pic>
+      <p:pic>
+        <p:nvPicPr>
+          <p:cNvPr id="6" name="Picture 2" descr="Image result for zhaw ias logo burkhard">
+            <a:extLst>
+              <a:ext uri="{FF2B5EF4-FFF2-40B4-BE49-F238E27FC236}">
+                <a16:creationId xmlns:a16="http://schemas.microsoft.com/office/drawing/2014/main" id="{3FAB369B-75BB-4A71-BC01-087153786207}"/>
+              </a:ext>
+            </a:extLst>
+          </p:cNvPr>
+          <p:cNvPicPr>
+            <a:picLocks noChangeAspect="1" noChangeArrowheads="1"/>
+          </p:cNvPicPr>
+          <p:nvPr/>
+        </p:nvPicPr>
+        <p:blipFill>
+          <a:blip r:embed="rId3">
+            <a:extLst>
+              <a:ext uri="{28A0092B-C50C-407E-A947-70E740481C1C}">
+                <a14:useLocalDpi xmlns:a14="http://schemas.microsoft.com/office/drawing/2010/main" val="0"/>
+              </a:ext>
+            </a:extLst>
+          </a:blip>
+          <a:srcRect/>
+          <a:stretch>
+            <a:fillRect/>
+          </a:stretch>
+        </p:blipFill>
+        <p:spPr bwMode="auto">
+          <a:xfrm>
+            <a:off x="10858477" y="368326"/>
+            <a:ext cx="1127067" cy="516197"/>
+          </a:xfrm>
+          <a:prstGeom prst="rect">
+            <a:avLst/>
+          </a:prstGeom>
+          <a:noFill/>
+          <a:extLst>
+            <a:ext uri="{909E8E84-426E-40DD-AFC4-6F175D3DCCD1}">
+              <a14:hiddenFill xmlns:a14="http://schemas.microsoft.com/office/drawing/2010/main">
+                <a:solidFill>
+                  <a:srgbClr val="FFFFFF"/>
+                </a:solidFill>
+              </a14:hiddenFill>
+            </a:ext>
+          </a:extLst>
+        </p:spPr>
+      </p:pic>
     </p:spTree>
     <p:extLst>
       <p:ext uri="{BB962C8B-B14F-4D97-AF65-F5344CB8AC3E}">
@@ -6058,6 +8262,31 @@
             </a:pPr>
             <a:r>
               <a:rPr lang="en-GB" dirty="0"/>
+              <a:t> Basic datatypes in tensorflow</a:t>
+            </a:r>
+          </a:p>
+          <a:p>
+            <a:pPr>
+              <a:buFont typeface="Wingdings" panose="05000000000000000000" pitchFamily="2" charset="2"/>
+              <a:buChar char="q"/>
+            </a:pPr>
+            <a:r>
+              <a:rPr lang="en-GB" dirty="0"/>
+              <a:t> Building and evaluating </a:t>
+            </a:r>
+            <a:r>
+              <a:rPr lang="en-GB"/>
+              <a:t>computational graphs in TF</a:t>
+            </a:r>
+            <a:endParaRPr lang="en-GB" dirty="0"/>
+          </a:p>
+          <a:p>
+            <a:pPr>
+              <a:buFont typeface="Wingdings" panose="05000000000000000000" pitchFamily="2" charset="2"/>
+              <a:buChar char="q"/>
+            </a:pPr>
+            <a:r>
+              <a:rPr lang="en-GB" dirty="0"/>
               <a:t> I</a:t>
             </a:r>
             <a:r>
@@ -6138,6 +8367,89 @@
           </a:p>
         </p:txBody>
       </p:sp>
+      <p:pic>
+        <p:nvPicPr>
+          <p:cNvPr id="5" name="Picture 4" descr="A close up of a logo&#10;&#10;Description generated with very high confidence">
+            <a:extLst>
+              <a:ext uri="{FF2B5EF4-FFF2-40B4-BE49-F238E27FC236}">
+                <a16:creationId xmlns:a16="http://schemas.microsoft.com/office/drawing/2014/main" id="{324E4525-9B22-40D0-BB07-FBDD596E4F87}"/>
+              </a:ext>
+            </a:extLst>
+          </p:cNvPr>
+          <p:cNvPicPr>
+            <a:picLocks noChangeAspect="1"/>
+          </p:cNvPicPr>
+          <p:nvPr/>
+        </p:nvPicPr>
+        <p:blipFill>
+          <a:blip r:embed="rId2">
+            <a:extLst>
+              <a:ext uri="{28A0092B-C50C-407E-A947-70E740481C1C}">
+                <a14:useLocalDpi xmlns:a14="http://schemas.microsoft.com/office/drawing/2010/main" val="0"/>
+              </a:ext>
+            </a:extLst>
+          </a:blip>
+          <a:stretch>
+            <a:fillRect/>
+          </a:stretch>
+        </p:blipFill>
+        <p:spPr>
+          <a:xfrm>
+            <a:off x="10858477" y="75851"/>
+            <a:ext cx="1231599" cy="224700"/>
+          </a:xfrm>
+          <a:prstGeom prst="rect">
+            <a:avLst/>
+          </a:prstGeom>
+        </p:spPr>
+      </p:pic>
+      <p:pic>
+        <p:nvPicPr>
+          <p:cNvPr id="6" name="Picture 2" descr="Image result for zhaw ias logo burkhard">
+            <a:extLst>
+              <a:ext uri="{FF2B5EF4-FFF2-40B4-BE49-F238E27FC236}">
+                <a16:creationId xmlns:a16="http://schemas.microsoft.com/office/drawing/2014/main" id="{452A0114-B22D-43D8-8D8D-BBF763042724}"/>
+              </a:ext>
+            </a:extLst>
+          </p:cNvPr>
+          <p:cNvPicPr>
+            <a:picLocks noChangeAspect="1" noChangeArrowheads="1"/>
+          </p:cNvPicPr>
+          <p:nvPr/>
+        </p:nvPicPr>
+        <p:blipFill>
+          <a:blip r:embed="rId3">
+            <a:extLst>
+              <a:ext uri="{28A0092B-C50C-407E-A947-70E740481C1C}">
+                <a14:useLocalDpi xmlns:a14="http://schemas.microsoft.com/office/drawing/2010/main" val="0"/>
+              </a:ext>
+            </a:extLst>
+          </a:blip>
+          <a:srcRect/>
+          <a:stretch>
+            <a:fillRect/>
+          </a:stretch>
+        </p:blipFill>
+        <p:spPr bwMode="auto">
+          <a:xfrm>
+            <a:off x="10858477" y="368326"/>
+            <a:ext cx="1127067" cy="516197"/>
+          </a:xfrm>
+          <a:prstGeom prst="rect">
+            <a:avLst/>
+          </a:prstGeom>
+          <a:noFill/>
+          <a:extLst>
+            <a:ext uri="{909E8E84-426E-40DD-AFC4-6F175D3DCCD1}">
+              <a14:hiddenFill xmlns:a14="http://schemas.microsoft.com/office/drawing/2010/main">
+                <a:solidFill>
+                  <a:srgbClr val="FFFFFF"/>
+                </a:solidFill>
+              </a14:hiddenFill>
+            </a:ext>
+          </a:extLst>
+        </p:spPr>
+      </p:pic>
     </p:spTree>
     <p:extLst>
       <p:ext uri="{BB962C8B-B14F-4D97-AF65-F5344CB8AC3E}">
@@ -6282,6 +8594,89 @@
           </a:p>
         </p:txBody>
       </p:sp>
+      <p:pic>
+        <p:nvPicPr>
+          <p:cNvPr id="6" name="Picture 5" descr="A close up of a logo&#10;&#10;Description generated with very high confidence">
+            <a:extLst>
+              <a:ext uri="{FF2B5EF4-FFF2-40B4-BE49-F238E27FC236}">
+                <a16:creationId xmlns:a16="http://schemas.microsoft.com/office/drawing/2014/main" id="{221EE2AE-700B-4CB4-8F20-EF42E2FAF75E}"/>
+              </a:ext>
+            </a:extLst>
+          </p:cNvPr>
+          <p:cNvPicPr>
+            <a:picLocks noChangeAspect="1"/>
+          </p:cNvPicPr>
+          <p:nvPr/>
+        </p:nvPicPr>
+        <p:blipFill>
+          <a:blip r:embed="rId2">
+            <a:extLst>
+              <a:ext uri="{28A0092B-C50C-407E-A947-70E740481C1C}">
+                <a14:useLocalDpi xmlns:a14="http://schemas.microsoft.com/office/drawing/2010/main" val="0"/>
+              </a:ext>
+            </a:extLst>
+          </a:blip>
+          <a:stretch>
+            <a:fillRect/>
+          </a:stretch>
+        </p:blipFill>
+        <p:spPr>
+          <a:xfrm>
+            <a:off x="10858477" y="75851"/>
+            <a:ext cx="1231599" cy="224700"/>
+          </a:xfrm>
+          <a:prstGeom prst="rect">
+            <a:avLst/>
+          </a:prstGeom>
+        </p:spPr>
+      </p:pic>
+      <p:pic>
+        <p:nvPicPr>
+          <p:cNvPr id="7" name="Picture 2" descr="Image result for zhaw ias logo burkhard">
+            <a:extLst>
+              <a:ext uri="{FF2B5EF4-FFF2-40B4-BE49-F238E27FC236}">
+                <a16:creationId xmlns:a16="http://schemas.microsoft.com/office/drawing/2014/main" id="{F1A86AD4-0907-489E-9D24-35C5BB7A1B7F}"/>
+              </a:ext>
+            </a:extLst>
+          </p:cNvPr>
+          <p:cNvPicPr>
+            <a:picLocks noChangeAspect="1" noChangeArrowheads="1"/>
+          </p:cNvPicPr>
+          <p:nvPr/>
+        </p:nvPicPr>
+        <p:blipFill>
+          <a:blip r:embed="rId3">
+            <a:extLst>
+              <a:ext uri="{28A0092B-C50C-407E-A947-70E740481C1C}">
+                <a14:useLocalDpi xmlns:a14="http://schemas.microsoft.com/office/drawing/2010/main" val="0"/>
+              </a:ext>
+            </a:extLst>
+          </a:blip>
+          <a:srcRect/>
+          <a:stretch>
+            <a:fillRect/>
+          </a:stretch>
+        </p:blipFill>
+        <p:spPr bwMode="auto">
+          <a:xfrm>
+            <a:off x="10858477" y="368326"/>
+            <a:ext cx="1127067" cy="516197"/>
+          </a:xfrm>
+          <a:prstGeom prst="rect">
+            <a:avLst/>
+          </a:prstGeom>
+          <a:noFill/>
+          <a:extLst>
+            <a:ext uri="{909E8E84-426E-40DD-AFC4-6F175D3DCCD1}">
+              <a14:hiddenFill xmlns:a14="http://schemas.microsoft.com/office/drawing/2010/main">
+                <a:solidFill>
+                  <a:srgbClr val="FFFFFF"/>
+                </a:solidFill>
+              </a14:hiddenFill>
+            </a:ext>
+          </a:extLst>
+        </p:spPr>
+      </p:pic>
     </p:spTree>
     <p:extLst>
       <p:ext uri="{BB962C8B-B14F-4D97-AF65-F5344CB8AC3E}">
@@ -6501,6 +8896,89 @@
           </a:p>
         </p:txBody>
       </p:sp>
+      <p:pic>
+        <p:nvPicPr>
+          <p:cNvPr id="6" name="Picture 5" descr="A close up of a logo&#10;&#10;Description generated with very high confidence">
+            <a:extLst>
+              <a:ext uri="{FF2B5EF4-FFF2-40B4-BE49-F238E27FC236}">
+                <a16:creationId xmlns:a16="http://schemas.microsoft.com/office/drawing/2014/main" id="{DD4F2DE5-0CCB-41C7-9ADC-D8845308427D}"/>
+              </a:ext>
+            </a:extLst>
+          </p:cNvPr>
+          <p:cNvPicPr>
+            <a:picLocks noChangeAspect="1"/>
+          </p:cNvPicPr>
+          <p:nvPr/>
+        </p:nvPicPr>
+        <p:blipFill>
+          <a:blip r:embed="rId2">
+            <a:extLst>
+              <a:ext uri="{28A0092B-C50C-407E-A947-70E740481C1C}">
+                <a14:useLocalDpi xmlns:a14="http://schemas.microsoft.com/office/drawing/2010/main" val="0"/>
+              </a:ext>
+            </a:extLst>
+          </a:blip>
+          <a:stretch>
+            <a:fillRect/>
+          </a:stretch>
+        </p:blipFill>
+        <p:spPr>
+          <a:xfrm>
+            <a:off x="10858477" y="75851"/>
+            <a:ext cx="1231599" cy="224700"/>
+          </a:xfrm>
+          <a:prstGeom prst="rect">
+            <a:avLst/>
+          </a:prstGeom>
+        </p:spPr>
+      </p:pic>
+      <p:pic>
+        <p:nvPicPr>
+          <p:cNvPr id="7" name="Picture 2" descr="Image result for zhaw ias logo burkhard">
+            <a:extLst>
+              <a:ext uri="{FF2B5EF4-FFF2-40B4-BE49-F238E27FC236}">
+                <a16:creationId xmlns:a16="http://schemas.microsoft.com/office/drawing/2014/main" id="{840F52FD-6B8A-4466-86F3-FA43833C7C08}"/>
+              </a:ext>
+            </a:extLst>
+          </p:cNvPr>
+          <p:cNvPicPr>
+            <a:picLocks noChangeAspect="1" noChangeArrowheads="1"/>
+          </p:cNvPicPr>
+          <p:nvPr/>
+        </p:nvPicPr>
+        <p:blipFill>
+          <a:blip r:embed="rId3">
+            <a:extLst>
+              <a:ext uri="{28A0092B-C50C-407E-A947-70E740481C1C}">
+                <a14:useLocalDpi xmlns:a14="http://schemas.microsoft.com/office/drawing/2010/main" val="0"/>
+              </a:ext>
+            </a:extLst>
+          </a:blip>
+          <a:srcRect/>
+          <a:stretch>
+            <a:fillRect/>
+          </a:stretch>
+        </p:blipFill>
+        <p:spPr bwMode="auto">
+          <a:xfrm>
+            <a:off x="10858477" y="368326"/>
+            <a:ext cx="1127067" cy="516197"/>
+          </a:xfrm>
+          <a:prstGeom prst="rect">
+            <a:avLst/>
+          </a:prstGeom>
+          <a:noFill/>
+          <a:extLst>
+            <a:ext uri="{909E8E84-426E-40DD-AFC4-6F175D3DCCD1}">
+              <a14:hiddenFill xmlns:a14="http://schemas.microsoft.com/office/drawing/2010/main">
+                <a:solidFill>
+                  <a:srgbClr val="FFFFFF"/>
+                </a:solidFill>
+              </a14:hiddenFill>
+            </a:ext>
+          </a:extLst>
+        </p:spPr>
+      </p:pic>
     </p:spTree>
     <p:extLst>
       <p:ext uri="{BB962C8B-B14F-4D97-AF65-F5344CB8AC3E}">

</xml_diff>